<commit_message>
Add find command sequence diagram picture
</commit_message>
<xml_diff>
--- a/docs/diagrams/LogicComponentSequenceDiagram.pptx
+++ b/docs/diagrams/LogicComponentSequenceDiagram.pptx
@@ -212,7 +212,7 @@
           <a:p>
             <a:fld id="{F5CC4B3F-88C1-4FFA-B1B6-F41C21DC6924}" type="datetimeFigureOut">
               <a:rPr lang="en-US" smtClean="0"/>
-              <a:t>7/11/2017</a:t>
+              <a:t>10/21/2017</a:t>
             </a:fld>
             <a:endParaRPr lang="en-US"/>
           </a:p>
@@ -658,7 +658,7 @@
           <a:p>
             <a:fld id="{78C97017-6FC3-485B-9764-EAC9E56C1D49}" type="datetimeFigureOut">
               <a:rPr lang="en-US" smtClean="0"/>
-              <a:t>7/11/2017</a:t>
+              <a:t>10/21/2017</a:t>
             </a:fld>
             <a:endParaRPr lang="en-US"/>
           </a:p>
@@ -826,7 +826,7 @@
           <a:p>
             <a:fld id="{78C97017-6FC3-485B-9764-EAC9E56C1D49}" type="datetimeFigureOut">
               <a:rPr lang="en-US" smtClean="0"/>
-              <a:t>7/11/2017</a:t>
+              <a:t>10/21/2017</a:t>
             </a:fld>
             <a:endParaRPr lang="en-US"/>
           </a:p>
@@ -1004,7 +1004,7 @@
           <a:p>
             <a:fld id="{78C97017-6FC3-485B-9764-EAC9E56C1D49}" type="datetimeFigureOut">
               <a:rPr lang="en-US" smtClean="0"/>
-              <a:t>7/11/2017</a:t>
+              <a:t>10/21/2017</a:t>
             </a:fld>
             <a:endParaRPr lang="en-US"/>
           </a:p>
@@ -1172,7 +1172,7 @@
           <a:p>
             <a:fld id="{78C97017-6FC3-485B-9764-EAC9E56C1D49}" type="datetimeFigureOut">
               <a:rPr lang="en-US" smtClean="0"/>
-              <a:t>7/11/2017</a:t>
+              <a:t>10/21/2017</a:t>
             </a:fld>
             <a:endParaRPr lang="en-US"/>
           </a:p>
@@ -1417,7 +1417,7 @@
           <a:p>
             <a:fld id="{78C97017-6FC3-485B-9764-EAC9E56C1D49}" type="datetimeFigureOut">
               <a:rPr lang="en-US" smtClean="0"/>
-              <a:t>7/11/2017</a:t>
+              <a:t>10/21/2017</a:t>
             </a:fld>
             <a:endParaRPr lang="en-US"/>
           </a:p>
@@ -1702,7 +1702,7 @@
           <a:p>
             <a:fld id="{78C97017-6FC3-485B-9764-EAC9E56C1D49}" type="datetimeFigureOut">
               <a:rPr lang="en-US" smtClean="0"/>
-              <a:t>7/11/2017</a:t>
+              <a:t>10/21/2017</a:t>
             </a:fld>
             <a:endParaRPr lang="en-US"/>
           </a:p>
@@ -2121,7 +2121,7 @@
           <a:p>
             <a:fld id="{78C97017-6FC3-485B-9764-EAC9E56C1D49}" type="datetimeFigureOut">
               <a:rPr lang="en-US" smtClean="0"/>
-              <a:t>7/11/2017</a:t>
+              <a:t>10/21/2017</a:t>
             </a:fld>
             <a:endParaRPr lang="en-US"/>
           </a:p>
@@ -2238,7 +2238,7 @@
           <a:p>
             <a:fld id="{78C97017-6FC3-485B-9764-EAC9E56C1D49}" type="datetimeFigureOut">
               <a:rPr lang="en-US" smtClean="0"/>
-              <a:t>7/11/2017</a:t>
+              <a:t>10/21/2017</a:t>
             </a:fld>
             <a:endParaRPr lang="en-US"/>
           </a:p>
@@ -2333,7 +2333,7 @@
           <a:p>
             <a:fld id="{78C97017-6FC3-485B-9764-EAC9E56C1D49}" type="datetimeFigureOut">
               <a:rPr lang="en-US" smtClean="0"/>
-              <a:t>7/11/2017</a:t>
+              <a:t>10/21/2017</a:t>
             </a:fld>
             <a:endParaRPr lang="en-US"/>
           </a:p>
@@ -2608,7 +2608,7 @@
           <a:p>
             <a:fld id="{78C97017-6FC3-485B-9764-EAC9E56C1D49}" type="datetimeFigureOut">
               <a:rPr lang="en-US" smtClean="0"/>
-              <a:t>7/11/2017</a:t>
+              <a:t>10/21/2017</a:t>
             </a:fld>
             <a:endParaRPr lang="en-US"/>
           </a:p>
@@ -2860,7 +2860,7 @@
           <a:p>
             <a:fld id="{78C97017-6FC3-485B-9764-EAC9E56C1D49}" type="datetimeFigureOut">
               <a:rPr lang="en-US" smtClean="0"/>
-              <a:t>7/11/2017</a:t>
+              <a:t>10/21/2017</a:t>
             </a:fld>
             <a:endParaRPr lang="en-US"/>
           </a:p>
@@ -3071,7 +3071,7 @@
           <a:p>
             <a:fld id="{78C97017-6FC3-485B-9764-EAC9E56C1D49}" type="datetimeFigureOut">
               <a:rPr lang="en-US" smtClean="0"/>
-              <a:t>7/11/2017</a:t>
+              <a:t>10/21/2017</a:t>
             </a:fld>
             <a:endParaRPr lang="en-US"/>
           </a:p>

</xml_diff>

<commit_message>
Added sequence diagram for UI for meeting Card
</commit_message>
<xml_diff>
--- a/docs/diagrams/LogicComponentSequenceDiagram.pptx
+++ b/docs/diagrams/LogicComponentSequenceDiagram.pptx
@@ -126,8 +126,593 @@
 </p:presentation>
 </file>
 
-<file path=ppt/revisionInfo.xml><?xml version="1.0" encoding="utf-8"?>
-<p1510:revInfo xmlns:a="http://schemas.openxmlformats.org/drawingml/2006/main" xmlns:r="http://schemas.openxmlformats.org/officeDocument/2006/relationships" xmlns:p1510="http://schemas.microsoft.com/office/powerpoint/2015/10/main"/>
+<file path=ppt/changesInfos/changesInfo1.xml><?xml version="1.0" encoding="utf-8"?>
+<pc:chgInfo xmlns:a="http://schemas.openxmlformats.org/drawingml/2006/main" xmlns:r="http://schemas.openxmlformats.org/officeDocument/2006/relationships" xmlns:ac="http://schemas.microsoft.com/office/drawing/2013/main/command" xmlns:pc="http://schemas.microsoft.com/office/powerpoint/2013/main/command">
+  <pc:docChgLst>
+    <pc:chgData name="Melvin Leo" userId="fc11bf49cac66023" providerId="LiveId" clId="{F9FBB1FD-67A9-487E-BB95-4FABBE1CCBB9}"/>
+    <pc:docChg chg="undo custSel modSld">
+      <pc:chgData name="Melvin Leo" userId="fc11bf49cac66023" providerId="LiveId" clId="{F9FBB1FD-67A9-487E-BB95-4FABBE1CCBB9}" dt="2017-10-22T11:21:22.654" v="451" actId="14100"/>
+      <pc:docMkLst>
+        <pc:docMk/>
+      </pc:docMkLst>
+      <pc:sldChg chg="addSp delSp modSp">
+        <pc:chgData name="Melvin Leo" userId="fc11bf49cac66023" providerId="LiveId" clId="{F9FBB1FD-67A9-487E-BB95-4FABBE1CCBB9}" dt="2017-10-22T11:21:22.654" v="451" actId="14100"/>
+        <pc:sldMkLst>
+          <pc:docMk/>
+          <pc:sldMk cId="3945898909" sldId="267"/>
+        </pc:sldMkLst>
+        <pc:spChg chg="mod">
+          <ac:chgData name="Melvin Leo" userId="fc11bf49cac66023" providerId="LiveId" clId="{F9FBB1FD-67A9-487E-BB95-4FABBE1CCBB9}" dt="2017-10-22T11:21:22.654" v="451" actId="14100"/>
+          <ac:spMkLst>
+            <pc:docMk/>
+            <pc:sldMk cId="3945898909" sldId="267"/>
+            <ac:spMk id="2" creationId="{00000000-0000-0000-0000-000000000000}"/>
+          </ac:spMkLst>
+        </pc:spChg>
+        <pc:spChg chg="del mod">
+          <ac:chgData name="Melvin Leo" userId="fc11bf49cac66023" providerId="LiveId" clId="{F9FBB1FD-67A9-487E-BB95-4FABBE1CCBB9}" dt="2017-10-22T11:18:21.034" v="406"/>
+          <ac:spMkLst>
+            <pc:docMk/>
+            <pc:sldMk cId="3945898909" sldId="267"/>
+            <ac:spMk id="4" creationId="{00000000-0000-0000-0000-000000000000}"/>
+          </ac:spMkLst>
+        </pc:spChg>
+        <pc:spChg chg="mod">
+          <ac:chgData name="Melvin Leo" userId="fc11bf49cac66023" providerId="LiveId" clId="{F9FBB1FD-67A9-487E-BB95-4FABBE1CCBB9}" dt="2017-10-22T11:21:22.654" v="451" actId="14100"/>
+          <ac:spMkLst>
+            <pc:docMk/>
+            <pc:sldMk cId="3945898909" sldId="267"/>
+            <ac:spMk id="6" creationId="{00000000-0000-0000-0000-000000000000}"/>
+          </ac:spMkLst>
+        </pc:spChg>
+        <pc:spChg chg="add del">
+          <ac:chgData name="Melvin Leo" userId="fc11bf49cac66023" providerId="LiveId" clId="{F9FBB1FD-67A9-487E-BB95-4FABBE1CCBB9}" dt="2017-10-22T11:06:43.461" v="218"/>
+          <ac:spMkLst>
+            <pc:docMk/>
+            <pc:sldMk cId="3945898909" sldId="267"/>
+            <ac:spMk id="14" creationId="{DE3B6D7E-E018-4408-80C6-D5507C66ABDA}"/>
+          </ac:spMkLst>
+        </pc:spChg>
+        <pc:spChg chg="mod">
+          <ac:chgData name="Melvin Leo" userId="fc11bf49cac66023" providerId="LiveId" clId="{F9FBB1FD-67A9-487E-BB95-4FABBE1CCBB9}" dt="2017-10-22T11:21:22.654" v="451" actId="14100"/>
+          <ac:spMkLst>
+            <pc:docMk/>
+            <pc:sldMk cId="3945898909" sldId="267"/>
+            <ac:spMk id="16" creationId="{00000000-0000-0000-0000-000000000000}"/>
+          </ac:spMkLst>
+        </pc:spChg>
+        <pc:spChg chg="mod">
+          <ac:chgData name="Melvin Leo" userId="fc11bf49cac66023" providerId="LiveId" clId="{F9FBB1FD-67A9-487E-BB95-4FABBE1CCBB9}" dt="2017-10-22T11:21:22.654" v="451" actId="14100"/>
+          <ac:spMkLst>
+            <pc:docMk/>
+            <pc:sldMk cId="3945898909" sldId="267"/>
+            <ac:spMk id="18" creationId="{00000000-0000-0000-0000-000000000000}"/>
+          </ac:spMkLst>
+        </pc:spChg>
+        <pc:spChg chg="mod">
+          <ac:chgData name="Melvin Leo" userId="fc11bf49cac66023" providerId="LiveId" clId="{F9FBB1FD-67A9-487E-BB95-4FABBE1CCBB9}" dt="2017-10-22T11:21:22.654" v="451" actId="14100"/>
+          <ac:spMkLst>
+            <pc:docMk/>
+            <pc:sldMk cId="3945898909" sldId="267"/>
+            <ac:spMk id="19" creationId="{00000000-0000-0000-0000-000000000000}"/>
+          </ac:spMkLst>
+        </pc:spChg>
+        <pc:spChg chg="mod">
+          <ac:chgData name="Melvin Leo" userId="fc11bf49cac66023" providerId="LiveId" clId="{F9FBB1FD-67A9-487E-BB95-4FABBE1CCBB9}" dt="2017-10-22T11:21:22.654" v="451" actId="14100"/>
+          <ac:spMkLst>
+            <pc:docMk/>
+            <pc:sldMk cId="3945898909" sldId="267"/>
+            <ac:spMk id="21" creationId="{00000000-0000-0000-0000-000000000000}"/>
+          </ac:spMkLst>
+        </pc:spChg>
+        <pc:spChg chg="add del mod">
+          <ac:chgData name="Melvin Leo" userId="fc11bf49cac66023" providerId="LiveId" clId="{F9FBB1FD-67A9-487E-BB95-4FABBE1CCBB9}" dt="2017-10-22T10:58:27.383" v="75" actId="1076"/>
+          <ac:spMkLst>
+            <pc:docMk/>
+            <pc:sldMk cId="3945898909" sldId="267"/>
+            <ac:spMk id="26" creationId="{00000000-0000-0000-0000-000000000000}"/>
+          </ac:spMkLst>
+        </pc:spChg>
+        <pc:spChg chg="del">
+          <ac:chgData name="Melvin Leo" userId="fc11bf49cac66023" providerId="LiveId" clId="{F9FBB1FD-67A9-487E-BB95-4FABBE1CCBB9}" dt="2017-10-22T11:10:13.783" v="252" actId="478"/>
+          <ac:spMkLst>
+            <pc:docMk/>
+            <pc:sldMk cId="3945898909" sldId="267"/>
+            <ac:spMk id="29" creationId="{00000000-0000-0000-0000-000000000000}"/>
+          </ac:spMkLst>
+        </pc:spChg>
+        <pc:spChg chg="del">
+          <ac:chgData name="Melvin Leo" userId="fc11bf49cac66023" providerId="LiveId" clId="{F9FBB1FD-67A9-487E-BB95-4FABBE1CCBB9}" dt="2017-10-22T11:09:35.851" v="247" actId="478"/>
+          <ac:spMkLst>
+            <pc:docMk/>
+            <pc:sldMk cId="3945898909" sldId="267"/>
+            <ac:spMk id="39" creationId="{00000000-0000-0000-0000-000000000000}"/>
+          </ac:spMkLst>
+        </pc:spChg>
+        <pc:spChg chg="mod">
+          <ac:chgData name="Melvin Leo" userId="fc11bf49cac66023" providerId="LiveId" clId="{F9FBB1FD-67A9-487E-BB95-4FABBE1CCBB9}" dt="2017-10-22T11:21:22.654" v="451" actId="14100"/>
+          <ac:spMkLst>
+            <pc:docMk/>
+            <pc:sldMk cId="3945898909" sldId="267"/>
+            <ac:spMk id="40" creationId="{00000000-0000-0000-0000-000000000000}"/>
+          </ac:spMkLst>
+        </pc:spChg>
+        <pc:spChg chg="mod">
+          <ac:chgData name="Melvin Leo" userId="fc11bf49cac66023" providerId="LiveId" clId="{F9FBB1FD-67A9-487E-BB95-4FABBE1CCBB9}" dt="2017-10-22T11:21:22.654" v="451" actId="14100"/>
+          <ac:spMkLst>
+            <pc:docMk/>
+            <pc:sldMk cId="3945898909" sldId="267"/>
+            <ac:spMk id="45" creationId="{00000000-0000-0000-0000-000000000000}"/>
+          </ac:spMkLst>
+        </pc:spChg>
+        <pc:spChg chg="mod">
+          <ac:chgData name="Melvin Leo" userId="fc11bf49cac66023" providerId="LiveId" clId="{F9FBB1FD-67A9-487E-BB95-4FABBE1CCBB9}" dt="2017-10-22T11:21:22.654" v="451" actId="14100"/>
+          <ac:spMkLst>
+            <pc:docMk/>
+            <pc:sldMk cId="3945898909" sldId="267"/>
+            <ac:spMk id="49" creationId="{00000000-0000-0000-0000-000000000000}"/>
+          </ac:spMkLst>
+        </pc:spChg>
+        <pc:spChg chg="add mod">
+          <ac:chgData name="Melvin Leo" userId="fc11bf49cac66023" providerId="LiveId" clId="{F9FBB1FD-67A9-487E-BB95-4FABBE1CCBB9}" dt="2017-10-22T11:21:22.654" v="451" actId="14100"/>
+          <ac:spMkLst>
+            <pc:docMk/>
+            <pc:sldMk cId="3945898909" sldId="267"/>
+            <ac:spMk id="53" creationId="{FBF7D20E-9590-477A-BD3A-28A63A17DD10}"/>
+          </ac:spMkLst>
+        </pc:spChg>
+        <pc:spChg chg="add mod">
+          <ac:chgData name="Melvin Leo" userId="fc11bf49cac66023" providerId="LiveId" clId="{F9FBB1FD-67A9-487E-BB95-4FABBE1CCBB9}" dt="2017-10-22T11:21:22.654" v="451" actId="14100"/>
+          <ac:spMkLst>
+            <pc:docMk/>
+            <pc:sldMk cId="3945898909" sldId="267"/>
+            <ac:spMk id="55" creationId="{E04FFA3B-C00A-4412-AF6B-7E62817ADD00}"/>
+          </ac:spMkLst>
+        </pc:spChg>
+        <pc:spChg chg="add mod">
+          <ac:chgData name="Melvin Leo" userId="fc11bf49cac66023" providerId="LiveId" clId="{F9FBB1FD-67A9-487E-BB95-4FABBE1CCBB9}" dt="2017-10-22T11:21:22.654" v="451" actId="14100"/>
+          <ac:spMkLst>
+            <pc:docMk/>
+            <pc:sldMk cId="3945898909" sldId="267"/>
+            <ac:spMk id="58" creationId="{1BBECE94-2054-45B9-B0E8-EF92A1A60448}"/>
+          </ac:spMkLst>
+        </pc:spChg>
+        <pc:spChg chg="mod">
+          <ac:chgData name="Melvin Leo" userId="fc11bf49cac66023" providerId="LiveId" clId="{F9FBB1FD-67A9-487E-BB95-4FABBE1CCBB9}" dt="2017-10-22T11:21:22.654" v="451" actId="14100"/>
+          <ac:spMkLst>
+            <pc:docMk/>
+            <pc:sldMk cId="3945898909" sldId="267"/>
+            <ac:spMk id="65" creationId="{00000000-0000-0000-0000-000000000000}"/>
+          </ac:spMkLst>
+        </pc:spChg>
+        <pc:spChg chg="add mod">
+          <ac:chgData name="Melvin Leo" userId="fc11bf49cac66023" providerId="LiveId" clId="{F9FBB1FD-67A9-487E-BB95-4FABBE1CCBB9}" dt="2017-10-22T11:21:22.654" v="451" actId="14100"/>
+          <ac:spMkLst>
+            <pc:docMk/>
+            <pc:sldMk cId="3945898909" sldId="267"/>
+            <ac:spMk id="72" creationId="{27DBF2A5-CB4B-401D-8F8D-7FBA78038A18}"/>
+          </ac:spMkLst>
+        </pc:spChg>
+        <pc:spChg chg="del">
+          <ac:chgData name="Melvin Leo" userId="fc11bf49cac66023" providerId="LiveId" clId="{F9FBB1FD-67A9-487E-BB95-4FABBE1CCBB9}" dt="2017-10-22T11:09:42.365" v="248" actId="478"/>
+          <ac:spMkLst>
+            <pc:docMk/>
+            <pc:sldMk cId="3945898909" sldId="267"/>
+            <ac:spMk id="73" creationId="{00000000-0000-0000-0000-000000000000}"/>
+          </ac:spMkLst>
+        </pc:spChg>
+        <pc:spChg chg="del">
+          <ac:chgData name="Melvin Leo" userId="fc11bf49cac66023" providerId="LiveId" clId="{F9FBB1FD-67A9-487E-BB95-4FABBE1CCBB9}" dt="2017-10-22T11:09:45.335" v="249" actId="478"/>
+          <ac:spMkLst>
+            <pc:docMk/>
+            <pc:sldMk cId="3945898909" sldId="267"/>
+            <ac:spMk id="78" creationId="{00000000-0000-0000-0000-000000000000}"/>
+          </ac:spMkLst>
+        </pc:spChg>
+        <pc:spChg chg="del mod">
+          <ac:chgData name="Melvin Leo" userId="fc11bf49cac66023" providerId="LiveId" clId="{F9FBB1FD-67A9-487E-BB95-4FABBE1CCBB9}" dt="2017-10-22T11:05:16.533" v="208" actId="478"/>
+          <ac:spMkLst>
+            <pc:docMk/>
+            <pc:sldMk cId="3945898909" sldId="267"/>
+            <ac:spMk id="79" creationId="{00000000-0000-0000-0000-000000000000}"/>
+          </ac:spMkLst>
+        </pc:spChg>
+        <pc:spChg chg="del mod">
+          <ac:chgData name="Melvin Leo" userId="fc11bf49cac66023" providerId="LiveId" clId="{F9FBB1FD-67A9-487E-BB95-4FABBE1CCBB9}" dt="2017-10-22T11:01:22.762" v="98" actId="478"/>
+          <ac:spMkLst>
+            <pc:docMk/>
+            <pc:sldMk cId="3945898909" sldId="267"/>
+            <ac:spMk id="80" creationId="{00000000-0000-0000-0000-000000000000}"/>
+          </ac:spMkLst>
+        </pc:spChg>
+        <pc:spChg chg="mod">
+          <ac:chgData name="Melvin Leo" userId="fc11bf49cac66023" providerId="LiveId" clId="{F9FBB1FD-67A9-487E-BB95-4FABBE1CCBB9}" dt="2017-10-22T11:21:22.654" v="451" actId="14100"/>
+          <ac:spMkLst>
+            <pc:docMk/>
+            <pc:sldMk cId="3945898909" sldId="267"/>
+            <ac:spMk id="81" creationId="{00000000-0000-0000-0000-000000000000}"/>
+          </ac:spMkLst>
+        </pc:spChg>
+        <pc:spChg chg="del">
+          <ac:chgData name="Melvin Leo" userId="fc11bf49cac66023" providerId="LiveId" clId="{F9FBB1FD-67A9-487E-BB95-4FABBE1CCBB9}" dt="2017-10-22T11:21:01.027" v="449" actId="478"/>
+          <ac:spMkLst>
+            <pc:docMk/>
+            <pc:sldMk cId="3945898909" sldId="267"/>
+            <ac:spMk id="82" creationId="{00000000-0000-0000-0000-000000000000}"/>
+          </ac:spMkLst>
+        </pc:spChg>
+        <pc:spChg chg="del">
+          <ac:chgData name="Melvin Leo" userId="fc11bf49cac66023" providerId="LiveId" clId="{F9FBB1FD-67A9-487E-BB95-4FABBE1CCBB9}" dt="2017-10-22T11:21:05.864" v="450" actId="478"/>
+          <ac:spMkLst>
+            <pc:docMk/>
+            <pc:sldMk cId="3945898909" sldId="267"/>
+            <ac:spMk id="83" creationId="{00000000-0000-0000-0000-000000000000}"/>
+          </ac:spMkLst>
+        </pc:spChg>
+        <pc:spChg chg="mod">
+          <ac:chgData name="Melvin Leo" userId="fc11bf49cac66023" providerId="LiveId" clId="{F9FBB1FD-67A9-487E-BB95-4FABBE1CCBB9}" dt="2017-10-22T11:21:22.654" v="451" actId="14100"/>
+          <ac:spMkLst>
+            <pc:docMk/>
+            <pc:sldMk cId="3945898909" sldId="267"/>
+            <ac:spMk id="84" creationId="{00000000-0000-0000-0000-000000000000}"/>
+          </ac:spMkLst>
+        </pc:spChg>
+        <pc:spChg chg="add mod">
+          <ac:chgData name="Melvin Leo" userId="fc11bf49cac66023" providerId="LiveId" clId="{F9FBB1FD-67A9-487E-BB95-4FABBE1CCBB9}" dt="2017-10-22T11:21:22.654" v="451" actId="14100"/>
+          <ac:spMkLst>
+            <pc:docMk/>
+            <pc:sldMk cId="3945898909" sldId="267"/>
+            <ac:spMk id="85" creationId="{BC881ECB-73E0-4CB0-9190-4F60750FF1B8}"/>
+          </ac:spMkLst>
+        </pc:spChg>
+        <pc:spChg chg="del">
+          <ac:chgData name="Melvin Leo" userId="fc11bf49cac66023" providerId="LiveId" clId="{F9FBB1FD-67A9-487E-BB95-4FABBE1CCBB9}" dt="2017-10-22T11:12:47.569" v="301" actId="478"/>
+          <ac:spMkLst>
+            <pc:docMk/>
+            <pc:sldMk cId="3945898909" sldId="267"/>
+            <ac:spMk id="86" creationId="{00000000-0000-0000-0000-000000000000}"/>
+          </ac:spMkLst>
+        </pc:spChg>
+        <pc:spChg chg="del mod">
+          <ac:chgData name="Melvin Leo" userId="fc11bf49cac66023" providerId="LiveId" clId="{F9FBB1FD-67A9-487E-BB95-4FABBE1CCBB9}" dt="2017-10-22T11:18:53.668" v="413" actId="478"/>
+          <ac:spMkLst>
+            <pc:docMk/>
+            <pc:sldMk cId="3945898909" sldId="267"/>
+            <ac:spMk id="93" creationId="{00000000-0000-0000-0000-000000000000}"/>
+          </ac:spMkLst>
+        </pc:spChg>
+        <pc:spChg chg="add del">
+          <ac:chgData name="Melvin Leo" userId="fc11bf49cac66023" providerId="LiveId" clId="{F9FBB1FD-67A9-487E-BB95-4FABBE1CCBB9}" dt="2017-10-22T11:16:34.410" v="391" actId="478"/>
+          <ac:spMkLst>
+            <pc:docMk/>
+            <pc:sldMk cId="3945898909" sldId="267"/>
+            <ac:spMk id="98" creationId="{C91B15A9-8D88-446E-9F84-200F8C6A5F8E}"/>
+          </ac:spMkLst>
+        </pc:spChg>
+        <pc:spChg chg="add mod">
+          <ac:chgData name="Melvin Leo" userId="fc11bf49cac66023" providerId="LiveId" clId="{F9FBB1FD-67A9-487E-BB95-4FABBE1CCBB9}" dt="2017-10-22T11:21:22.654" v="451" actId="14100"/>
+          <ac:spMkLst>
+            <pc:docMk/>
+            <pc:sldMk cId="3945898909" sldId="267"/>
+            <ac:spMk id="99" creationId="{907D9DF0-6C04-40B6-BCF0-732BB4023101}"/>
+          </ac:spMkLst>
+        </pc:spChg>
+        <pc:spChg chg="add mod">
+          <ac:chgData name="Melvin Leo" userId="fc11bf49cac66023" providerId="LiveId" clId="{F9FBB1FD-67A9-487E-BB95-4FABBE1CCBB9}" dt="2017-10-22T11:21:22.654" v="451" actId="14100"/>
+          <ac:spMkLst>
+            <pc:docMk/>
+            <pc:sldMk cId="3945898909" sldId="267"/>
+            <ac:spMk id="100" creationId="{964AC095-4E4E-4726-BE6C-2DAD8A41F604}"/>
+          </ac:spMkLst>
+        </pc:spChg>
+        <pc:spChg chg="add mod">
+          <ac:chgData name="Melvin Leo" userId="fc11bf49cac66023" providerId="LiveId" clId="{F9FBB1FD-67A9-487E-BB95-4FABBE1CCBB9}" dt="2017-10-22T11:21:22.654" v="451" actId="14100"/>
+          <ac:spMkLst>
+            <pc:docMk/>
+            <pc:sldMk cId="3945898909" sldId="267"/>
+            <ac:spMk id="101" creationId="{38E4ABE1-6660-4D39-98D5-670119D969A6}"/>
+          </ac:spMkLst>
+        </pc:spChg>
+        <pc:spChg chg="add mod">
+          <ac:chgData name="Melvin Leo" userId="fc11bf49cac66023" providerId="LiveId" clId="{F9FBB1FD-67A9-487E-BB95-4FABBE1CCBB9}" dt="2017-10-22T11:21:22.654" v="451" actId="14100"/>
+          <ac:spMkLst>
+            <pc:docMk/>
+            <pc:sldMk cId="3945898909" sldId="267"/>
+            <ac:spMk id="102" creationId="{89AC86D6-E4E0-4ACD-9D34-1C3CD09A1281}"/>
+          </ac:spMkLst>
+        </pc:spChg>
+        <pc:spChg chg="add mod">
+          <ac:chgData name="Melvin Leo" userId="fc11bf49cac66023" providerId="LiveId" clId="{F9FBB1FD-67A9-487E-BB95-4FABBE1CCBB9}" dt="2017-10-22T11:21:22.654" v="451" actId="14100"/>
+          <ac:spMkLst>
+            <pc:docMk/>
+            <pc:sldMk cId="3945898909" sldId="267"/>
+            <ac:spMk id="104" creationId="{8901A785-2CE2-4B92-B2DA-914344C1A2A1}"/>
+          </ac:spMkLst>
+        </pc:spChg>
+        <pc:cxnChg chg="mod">
+          <ac:chgData name="Melvin Leo" userId="fc11bf49cac66023" providerId="LiveId" clId="{F9FBB1FD-67A9-487E-BB95-4FABBE1CCBB9}" dt="2017-10-22T11:21:22.654" v="451" actId="14100"/>
+          <ac:cxnSpMkLst>
+            <pc:docMk/>
+            <pc:sldMk cId="3945898909" sldId="267"/>
+            <ac:cxnSpMk id="5" creationId="{00000000-0000-0000-0000-000000000000}"/>
+          </ac:cxnSpMkLst>
+        </pc:cxnChg>
+        <pc:cxnChg chg="del mod">
+          <ac:chgData name="Melvin Leo" userId="fc11bf49cac66023" providerId="LiveId" clId="{F9FBB1FD-67A9-487E-BB95-4FABBE1CCBB9}" dt="2017-10-22T11:10:24.511" v="255" actId="478"/>
+          <ac:cxnSpMkLst>
+            <pc:docMk/>
+            <pc:sldMk cId="3945898909" sldId="267"/>
+            <ac:cxnSpMk id="8" creationId="{00000000-0000-0000-0000-000000000000}"/>
+          </ac:cxnSpMkLst>
+        </pc:cxnChg>
+        <pc:cxnChg chg="mod">
+          <ac:chgData name="Melvin Leo" userId="fc11bf49cac66023" providerId="LiveId" clId="{F9FBB1FD-67A9-487E-BB95-4FABBE1CCBB9}" dt="2017-10-22T11:21:22.654" v="451" actId="14100"/>
+          <ac:cxnSpMkLst>
+            <pc:docMk/>
+            <pc:sldMk cId="3945898909" sldId="267"/>
+            <ac:cxnSpMk id="13" creationId="{00000000-0000-0000-0000-000000000000}"/>
+          </ac:cxnSpMkLst>
+        </pc:cxnChg>
+        <pc:cxnChg chg="mod">
+          <ac:chgData name="Melvin Leo" userId="fc11bf49cac66023" providerId="LiveId" clId="{F9FBB1FD-67A9-487E-BB95-4FABBE1CCBB9}" dt="2017-10-22T11:21:22.654" v="451" actId="14100"/>
+          <ac:cxnSpMkLst>
+            <pc:docMk/>
+            <pc:sldMk cId="3945898909" sldId="267"/>
+            <ac:cxnSpMk id="17" creationId="{00000000-0000-0000-0000-000000000000}"/>
+          </ac:cxnSpMkLst>
+        </pc:cxnChg>
+        <pc:cxnChg chg="mod">
+          <ac:chgData name="Melvin Leo" userId="fc11bf49cac66023" providerId="LiveId" clId="{F9FBB1FD-67A9-487E-BB95-4FABBE1CCBB9}" dt="2017-10-22T11:21:22.654" v="451" actId="14100"/>
+          <ac:cxnSpMkLst>
+            <pc:docMk/>
+            <pc:sldMk cId="3945898909" sldId="267"/>
+            <ac:cxnSpMk id="20" creationId="{00000000-0000-0000-0000-000000000000}"/>
+          </ac:cxnSpMkLst>
+        </pc:cxnChg>
+        <pc:cxnChg chg="mod">
+          <ac:chgData name="Melvin Leo" userId="fc11bf49cac66023" providerId="LiveId" clId="{F9FBB1FD-67A9-487E-BB95-4FABBE1CCBB9}" dt="2017-10-22T11:21:22.654" v="451" actId="14100"/>
+          <ac:cxnSpMkLst>
+            <pc:docMk/>
+            <pc:sldMk cId="3945898909" sldId="267"/>
+            <ac:cxnSpMk id="23" creationId="{00000000-0000-0000-0000-000000000000}"/>
+          </ac:cxnSpMkLst>
+        </pc:cxnChg>
+        <pc:cxnChg chg="mod">
+          <ac:chgData name="Melvin Leo" userId="fc11bf49cac66023" providerId="LiveId" clId="{F9FBB1FD-67A9-487E-BB95-4FABBE1CCBB9}" dt="2017-10-22T11:21:22.654" v="451" actId="14100"/>
+          <ac:cxnSpMkLst>
+            <pc:docMk/>
+            <pc:sldMk cId="3945898909" sldId="267"/>
+            <ac:cxnSpMk id="25" creationId="{00000000-0000-0000-0000-000000000000}"/>
+          </ac:cxnSpMkLst>
+        </pc:cxnChg>
+        <pc:cxnChg chg="mod">
+          <ac:chgData name="Melvin Leo" userId="fc11bf49cac66023" providerId="LiveId" clId="{F9FBB1FD-67A9-487E-BB95-4FABBE1CCBB9}" dt="2017-10-22T11:21:22.654" v="451" actId="14100"/>
+          <ac:cxnSpMkLst>
+            <pc:docMk/>
+            <pc:sldMk cId="3945898909" sldId="267"/>
+            <ac:cxnSpMk id="28" creationId="{00000000-0000-0000-0000-000000000000}"/>
+          </ac:cxnSpMkLst>
+        </pc:cxnChg>
+        <pc:cxnChg chg="mod">
+          <ac:chgData name="Melvin Leo" userId="fc11bf49cac66023" providerId="LiveId" clId="{F9FBB1FD-67A9-487E-BB95-4FABBE1CCBB9}" dt="2017-10-22T11:21:22.654" v="451" actId="14100"/>
+          <ac:cxnSpMkLst>
+            <pc:docMk/>
+            <pc:sldMk cId="3945898909" sldId="267"/>
+            <ac:cxnSpMk id="34" creationId="{00000000-0000-0000-0000-000000000000}"/>
+          </ac:cxnSpMkLst>
+        </pc:cxnChg>
+        <pc:cxnChg chg="del">
+          <ac:chgData name="Melvin Leo" userId="fc11bf49cac66023" providerId="LiveId" clId="{F9FBB1FD-67A9-487E-BB95-4FABBE1CCBB9}" dt="2017-10-22T11:18:55.171" v="414" actId="478"/>
+          <ac:cxnSpMkLst>
+            <pc:docMk/>
+            <pc:sldMk cId="3945898909" sldId="267"/>
+            <ac:cxnSpMk id="35" creationId="{00000000-0000-0000-0000-000000000000}"/>
+          </ac:cxnSpMkLst>
+        </pc:cxnChg>
+        <pc:cxnChg chg="mod">
+          <ac:chgData name="Melvin Leo" userId="fc11bf49cac66023" providerId="LiveId" clId="{F9FBB1FD-67A9-487E-BB95-4FABBE1CCBB9}" dt="2017-10-22T11:21:22.654" v="451" actId="14100"/>
+          <ac:cxnSpMkLst>
+            <pc:docMk/>
+            <pc:sldMk cId="3945898909" sldId="267"/>
+            <ac:cxnSpMk id="37" creationId="{00000000-0000-0000-0000-000000000000}"/>
+          </ac:cxnSpMkLst>
+        </pc:cxnChg>
+        <pc:cxnChg chg="mod">
+          <ac:chgData name="Melvin Leo" userId="fc11bf49cac66023" providerId="LiveId" clId="{F9FBB1FD-67A9-487E-BB95-4FABBE1CCBB9}" dt="2017-10-22T11:21:22.654" v="451" actId="14100"/>
+          <ac:cxnSpMkLst>
+            <pc:docMk/>
+            <pc:sldMk cId="3945898909" sldId="267"/>
+            <ac:cxnSpMk id="46" creationId="{00000000-0000-0000-0000-000000000000}"/>
+          </ac:cxnSpMkLst>
+        </pc:cxnChg>
+        <pc:cxnChg chg="add mod">
+          <ac:chgData name="Melvin Leo" userId="fc11bf49cac66023" providerId="LiveId" clId="{F9FBB1FD-67A9-487E-BB95-4FABBE1CCBB9}" dt="2017-10-22T11:21:22.654" v="451" actId="14100"/>
+          <ac:cxnSpMkLst>
+            <pc:docMk/>
+            <pc:sldMk cId="3945898909" sldId="267"/>
+            <ac:cxnSpMk id="47" creationId="{FFBDFE60-7726-4B56-90C1-2FA9D05FB099}"/>
+          </ac:cxnSpMkLst>
+        </pc:cxnChg>
+        <pc:cxnChg chg="add del">
+          <ac:chgData name="Melvin Leo" userId="fc11bf49cac66023" providerId="LiveId" clId="{F9FBB1FD-67A9-487E-BB95-4FABBE1CCBB9}" dt="2017-10-22T10:57:56.597" v="71"/>
+          <ac:cxnSpMkLst>
+            <pc:docMk/>
+            <pc:sldMk cId="3945898909" sldId="267"/>
+            <ac:cxnSpMk id="48" creationId="{478A26DA-585A-4420-8AF9-C57B670862DD}"/>
+          </ac:cxnSpMkLst>
+        </pc:cxnChg>
+        <pc:cxnChg chg="mod">
+          <ac:chgData name="Melvin Leo" userId="fc11bf49cac66023" providerId="LiveId" clId="{F9FBB1FD-67A9-487E-BB95-4FABBE1CCBB9}" dt="2017-10-22T11:21:22.654" v="451" actId="14100"/>
+          <ac:cxnSpMkLst>
+            <pc:docMk/>
+            <pc:sldMk cId="3945898909" sldId="267"/>
+            <ac:cxnSpMk id="50" creationId="{00000000-0000-0000-0000-000000000000}"/>
+          </ac:cxnSpMkLst>
+        </pc:cxnChg>
+        <pc:cxnChg chg="del mod">
+          <ac:chgData name="Melvin Leo" userId="fc11bf49cac66023" providerId="LiveId" clId="{F9FBB1FD-67A9-487E-BB95-4FABBE1CCBB9}" dt="2017-10-22T11:10:22.340" v="254" actId="478"/>
+          <ac:cxnSpMkLst>
+            <pc:docMk/>
+            <pc:sldMk cId="3945898909" sldId="267"/>
+            <ac:cxnSpMk id="51" creationId="{00000000-0000-0000-0000-000000000000}"/>
+          </ac:cxnSpMkLst>
+        </pc:cxnChg>
+        <pc:cxnChg chg="mod">
+          <ac:chgData name="Melvin Leo" userId="fc11bf49cac66023" providerId="LiveId" clId="{F9FBB1FD-67A9-487E-BB95-4FABBE1CCBB9}" dt="2017-10-22T11:21:22.654" v="451" actId="14100"/>
+          <ac:cxnSpMkLst>
+            <pc:docMk/>
+            <pc:sldMk cId="3945898909" sldId="267"/>
+            <ac:cxnSpMk id="52" creationId="{00000000-0000-0000-0000-000000000000}"/>
+          </ac:cxnSpMkLst>
+        </pc:cxnChg>
+        <pc:cxnChg chg="add mod">
+          <ac:chgData name="Melvin Leo" userId="fc11bf49cac66023" providerId="LiveId" clId="{F9FBB1FD-67A9-487E-BB95-4FABBE1CCBB9}" dt="2017-10-22T11:21:22.654" v="451" actId="14100"/>
+          <ac:cxnSpMkLst>
+            <pc:docMk/>
+            <pc:sldMk cId="3945898909" sldId="267"/>
+            <ac:cxnSpMk id="54" creationId="{C123D980-C643-4DBD-952F-EC5727846F17}"/>
+          </ac:cxnSpMkLst>
+        </pc:cxnChg>
+        <pc:cxnChg chg="del mod">
+          <ac:chgData name="Melvin Leo" userId="fc11bf49cac66023" providerId="LiveId" clId="{F9FBB1FD-67A9-487E-BB95-4FABBE1CCBB9}" dt="2017-10-22T11:10:09.632" v="251" actId="478"/>
+          <ac:cxnSpMkLst>
+            <pc:docMk/>
+            <pc:sldMk cId="3945898909" sldId="267"/>
+            <ac:cxnSpMk id="64" creationId="{00000000-0000-0000-0000-000000000000}"/>
+          </ac:cxnSpMkLst>
+        </pc:cxnChg>
+        <pc:cxnChg chg="del">
+          <ac:chgData name="Melvin Leo" userId="fc11bf49cac66023" providerId="LiveId" clId="{F9FBB1FD-67A9-487E-BB95-4FABBE1CCBB9}" dt="2017-10-22T11:11:07.346" v="266" actId="478"/>
+          <ac:cxnSpMkLst>
+            <pc:docMk/>
+            <pc:sldMk cId="3945898909" sldId="267"/>
+            <ac:cxnSpMk id="71" creationId="{00000000-0000-0000-0000-000000000000}"/>
+          </ac:cxnSpMkLst>
+        </pc:cxnChg>
+        <pc:cxnChg chg="add mod">
+          <ac:chgData name="Melvin Leo" userId="fc11bf49cac66023" providerId="LiveId" clId="{F9FBB1FD-67A9-487E-BB95-4FABBE1CCBB9}" dt="2017-10-22T11:21:22.654" v="451" actId="14100"/>
+          <ac:cxnSpMkLst>
+            <pc:docMk/>
+            <pc:sldMk cId="3945898909" sldId="267"/>
+            <ac:cxnSpMk id="74" creationId="{FE4EBA88-AA6C-4568-8D61-B317EB2C29B2}"/>
+          </ac:cxnSpMkLst>
+        </pc:cxnChg>
+        <pc:cxnChg chg="mod">
+          <ac:chgData name="Melvin Leo" userId="fc11bf49cac66023" providerId="LiveId" clId="{F9FBB1FD-67A9-487E-BB95-4FABBE1CCBB9}" dt="2017-10-22T11:21:22.654" v="451" actId="14100"/>
+          <ac:cxnSpMkLst>
+            <pc:docMk/>
+            <pc:sldMk cId="3945898909" sldId="267"/>
+            <ac:cxnSpMk id="75" creationId="{00000000-0000-0000-0000-000000000000}"/>
+          </ac:cxnSpMkLst>
+        </pc:cxnChg>
+        <pc:cxnChg chg="del">
+          <ac:chgData name="Melvin Leo" userId="fc11bf49cac66023" providerId="LiveId" clId="{F9FBB1FD-67A9-487E-BB95-4FABBE1CCBB9}" dt="2017-10-22T11:11:09.456" v="267" actId="478"/>
+          <ac:cxnSpMkLst>
+            <pc:docMk/>
+            <pc:sldMk cId="3945898909" sldId="267"/>
+            <ac:cxnSpMk id="76" creationId="{00000000-0000-0000-0000-000000000000}"/>
+          </ac:cxnSpMkLst>
+        </pc:cxnChg>
+        <pc:cxnChg chg="mod">
+          <ac:chgData name="Melvin Leo" userId="fc11bf49cac66023" providerId="LiveId" clId="{F9FBB1FD-67A9-487E-BB95-4FABBE1CCBB9}" dt="2017-10-22T11:21:22.654" v="451" actId="14100"/>
+          <ac:cxnSpMkLst>
+            <pc:docMk/>
+            <pc:sldMk cId="3945898909" sldId="267"/>
+            <ac:cxnSpMk id="77" creationId="{00000000-0000-0000-0000-000000000000}"/>
+          </ac:cxnSpMkLst>
+        </pc:cxnChg>
+        <pc:cxnChg chg="add mod">
+          <ac:chgData name="Melvin Leo" userId="fc11bf49cac66023" providerId="LiveId" clId="{F9FBB1FD-67A9-487E-BB95-4FABBE1CCBB9}" dt="2017-10-22T11:21:22.654" v="451" actId="14100"/>
+          <ac:cxnSpMkLst>
+            <pc:docMk/>
+            <pc:sldMk cId="3945898909" sldId="267"/>
+            <ac:cxnSpMk id="87" creationId="{2EE1B2E7-AB87-47FD-9862-8934F97F2DB3}"/>
+          </ac:cxnSpMkLst>
+        </pc:cxnChg>
+        <pc:cxnChg chg="add mod">
+          <ac:chgData name="Melvin Leo" userId="fc11bf49cac66023" providerId="LiveId" clId="{F9FBB1FD-67A9-487E-BB95-4FABBE1CCBB9}" dt="2017-10-22T11:21:22.654" v="451" actId="14100"/>
+          <ac:cxnSpMkLst>
+            <pc:docMk/>
+            <pc:sldMk cId="3945898909" sldId="267"/>
+            <ac:cxnSpMk id="88" creationId="{7B3FD093-3F6C-488F-BBB1-0826209A6E07}"/>
+          </ac:cxnSpMkLst>
+        </pc:cxnChg>
+        <pc:cxnChg chg="add mod">
+          <ac:chgData name="Melvin Leo" userId="fc11bf49cac66023" providerId="LiveId" clId="{F9FBB1FD-67A9-487E-BB95-4FABBE1CCBB9}" dt="2017-10-22T11:21:22.654" v="451" actId="14100"/>
+          <ac:cxnSpMkLst>
+            <pc:docMk/>
+            <pc:sldMk cId="3945898909" sldId="267"/>
+            <ac:cxnSpMk id="89" creationId="{754618BB-D36A-4E78-A54E-197A9A10E854}"/>
+          </ac:cxnSpMkLst>
+        </pc:cxnChg>
+        <pc:cxnChg chg="mod">
+          <ac:chgData name="Melvin Leo" userId="fc11bf49cac66023" providerId="LiveId" clId="{F9FBB1FD-67A9-487E-BB95-4FABBE1CCBB9}" dt="2017-10-22T11:21:22.654" v="451" actId="14100"/>
+          <ac:cxnSpMkLst>
+            <pc:docMk/>
+            <pc:sldMk cId="3945898909" sldId="267"/>
+            <ac:cxnSpMk id="90" creationId="{00000000-0000-0000-0000-000000000000}"/>
+          </ac:cxnSpMkLst>
+        </pc:cxnChg>
+        <pc:cxnChg chg="add del mod">
+          <ac:chgData name="Melvin Leo" userId="fc11bf49cac66023" providerId="LiveId" clId="{F9FBB1FD-67A9-487E-BB95-4FABBE1CCBB9}" dt="2017-10-22T11:16:51.158" v="394" actId="478"/>
+          <ac:cxnSpMkLst>
+            <pc:docMk/>
+            <pc:sldMk cId="3945898909" sldId="267"/>
+            <ac:cxnSpMk id="91" creationId="{F830618B-8AF5-4B68-871D-0154D81BF0C3}"/>
+          </ac:cxnSpMkLst>
+        </pc:cxnChg>
+        <pc:cxnChg chg="add del mod">
+          <ac:chgData name="Melvin Leo" userId="fc11bf49cac66023" providerId="LiveId" clId="{F9FBB1FD-67A9-487E-BB95-4FABBE1CCBB9}" dt="2017-10-22T11:16:49.985" v="393" actId="478"/>
+          <ac:cxnSpMkLst>
+            <pc:docMk/>
+            <pc:sldMk cId="3945898909" sldId="267"/>
+            <ac:cxnSpMk id="92" creationId="{84C6B873-7C1E-4E99-84CD-D8C2856AAD4F}"/>
+          </ac:cxnSpMkLst>
+        </pc:cxnChg>
+        <pc:cxnChg chg="add mod">
+          <ac:chgData name="Melvin Leo" userId="fc11bf49cac66023" providerId="LiveId" clId="{F9FBB1FD-67A9-487E-BB95-4FABBE1CCBB9}" dt="2017-10-22T11:21:22.654" v="451" actId="14100"/>
+          <ac:cxnSpMkLst>
+            <pc:docMk/>
+            <pc:sldMk cId="3945898909" sldId="267"/>
+            <ac:cxnSpMk id="94" creationId="{4932F99B-F0C3-4719-89B9-3545796D137B}"/>
+          </ac:cxnSpMkLst>
+        </pc:cxnChg>
+        <pc:cxnChg chg="add mod">
+          <ac:chgData name="Melvin Leo" userId="fc11bf49cac66023" providerId="LiveId" clId="{F9FBB1FD-67A9-487E-BB95-4FABBE1CCBB9}" dt="2017-10-22T11:21:22.654" v="451" actId="14100"/>
+          <ac:cxnSpMkLst>
+            <pc:docMk/>
+            <pc:sldMk cId="3945898909" sldId="267"/>
+            <ac:cxnSpMk id="95" creationId="{0AABEDA5-124E-41AA-A3AF-FB4B0BB03262}"/>
+          </ac:cxnSpMkLst>
+        </pc:cxnChg>
+        <pc:cxnChg chg="add mod">
+          <ac:chgData name="Melvin Leo" userId="fc11bf49cac66023" providerId="LiveId" clId="{F9FBB1FD-67A9-487E-BB95-4FABBE1CCBB9}" dt="2017-10-22T11:21:22.654" v="451" actId="14100"/>
+          <ac:cxnSpMkLst>
+            <pc:docMk/>
+            <pc:sldMk cId="3945898909" sldId="267"/>
+            <ac:cxnSpMk id="96" creationId="{9CB15655-ED21-4CCF-BA5D-1D277BE55C20}"/>
+          </ac:cxnSpMkLst>
+        </pc:cxnChg>
+        <pc:cxnChg chg="add mod">
+          <ac:chgData name="Melvin Leo" userId="fc11bf49cac66023" providerId="LiveId" clId="{F9FBB1FD-67A9-487E-BB95-4FABBE1CCBB9}" dt="2017-10-22T11:21:22.654" v="451" actId="14100"/>
+          <ac:cxnSpMkLst>
+            <pc:docMk/>
+            <pc:sldMk cId="3945898909" sldId="267"/>
+            <ac:cxnSpMk id="97" creationId="{C54CA46B-DF40-4A7D-98BB-760A45897223}"/>
+          </ac:cxnSpMkLst>
+        </pc:cxnChg>
+        <pc:cxnChg chg="add mod">
+          <ac:chgData name="Melvin Leo" userId="fc11bf49cac66023" providerId="LiveId" clId="{F9FBB1FD-67A9-487E-BB95-4FABBE1CCBB9}" dt="2017-10-22T11:21:22.654" v="451" actId="14100"/>
+          <ac:cxnSpMkLst>
+            <pc:docMk/>
+            <pc:sldMk cId="3945898909" sldId="267"/>
+            <ac:cxnSpMk id="103" creationId="{D58534BF-6AB2-48D8-9007-B92609318895}"/>
+          </ac:cxnSpMkLst>
+        </pc:cxnChg>
+      </pc:sldChg>
+    </pc:docChg>
+  </pc:docChgLst>
+</pc:chgInfo>
 </file>
 
 <file path=ppt/notesMasters/notesMaster1.xml><?xml version="1.0" encoding="utf-8"?>
@@ -212,7 +797,7 @@
           <a:p>
             <a:fld id="{F5CC4B3F-88C1-4FFA-B1B6-F41C21DC6924}" type="datetimeFigureOut">
               <a:rPr lang="en-US" smtClean="0"/>
-              <a:t>7/11/2017</a:t>
+              <a:t>10/22/2017</a:t>
             </a:fld>
             <a:endParaRPr lang="en-US"/>
           </a:p>
@@ -658,7 +1243,7 @@
           <a:p>
             <a:fld id="{78C97017-6FC3-485B-9764-EAC9E56C1D49}" type="datetimeFigureOut">
               <a:rPr lang="en-US" smtClean="0"/>
-              <a:t>7/11/2017</a:t>
+              <a:t>10/22/2017</a:t>
             </a:fld>
             <a:endParaRPr lang="en-US"/>
           </a:p>
@@ -826,7 +1411,7 @@
           <a:p>
             <a:fld id="{78C97017-6FC3-485B-9764-EAC9E56C1D49}" type="datetimeFigureOut">
               <a:rPr lang="en-US" smtClean="0"/>
-              <a:t>7/11/2017</a:t>
+              <a:t>10/22/2017</a:t>
             </a:fld>
             <a:endParaRPr lang="en-US"/>
           </a:p>
@@ -1004,7 +1589,7 @@
           <a:p>
             <a:fld id="{78C97017-6FC3-485B-9764-EAC9E56C1D49}" type="datetimeFigureOut">
               <a:rPr lang="en-US" smtClean="0"/>
-              <a:t>7/11/2017</a:t>
+              <a:t>10/22/2017</a:t>
             </a:fld>
             <a:endParaRPr lang="en-US"/>
           </a:p>
@@ -1172,7 +1757,7 @@
           <a:p>
             <a:fld id="{78C97017-6FC3-485B-9764-EAC9E56C1D49}" type="datetimeFigureOut">
               <a:rPr lang="en-US" smtClean="0"/>
-              <a:t>7/11/2017</a:t>
+              <a:t>10/22/2017</a:t>
             </a:fld>
             <a:endParaRPr lang="en-US"/>
           </a:p>
@@ -1417,7 +2002,7 @@
           <a:p>
             <a:fld id="{78C97017-6FC3-485B-9764-EAC9E56C1D49}" type="datetimeFigureOut">
               <a:rPr lang="en-US" smtClean="0"/>
-              <a:t>7/11/2017</a:t>
+              <a:t>10/22/2017</a:t>
             </a:fld>
             <a:endParaRPr lang="en-US"/>
           </a:p>
@@ -1702,7 +2287,7 @@
           <a:p>
             <a:fld id="{78C97017-6FC3-485B-9764-EAC9E56C1D49}" type="datetimeFigureOut">
               <a:rPr lang="en-US" smtClean="0"/>
-              <a:t>7/11/2017</a:t>
+              <a:t>10/22/2017</a:t>
             </a:fld>
             <a:endParaRPr lang="en-US"/>
           </a:p>
@@ -2121,7 +2706,7 @@
           <a:p>
             <a:fld id="{78C97017-6FC3-485B-9764-EAC9E56C1D49}" type="datetimeFigureOut">
               <a:rPr lang="en-US" smtClean="0"/>
-              <a:t>7/11/2017</a:t>
+              <a:t>10/22/2017</a:t>
             </a:fld>
             <a:endParaRPr lang="en-US"/>
           </a:p>
@@ -2238,7 +2823,7 @@
           <a:p>
             <a:fld id="{78C97017-6FC3-485B-9764-EAC9E56C1D49}" type="datetimeFigureOut">
               <a:rPr lang="en-US" smtClean="0"/>
-              <a:t>7/11/2017</a:t>
+              <a:t>10/22/2017</a:t>
             </a:fld>
             <a:endParaRPr lang="en-US"/>
           </a:p>
@@ -2333,7 +2918,7 @@
           <a:p>
             <a:fld id="{78C97017-6FC3-485B-9764-EAC9E56C1D49}" type="datetimeFigureOut">
               <a:rPr lang="en-US" smtClean="0"/>
-              <a:t>7/11/2017</a:t>
+              <a:t>10/22/2017</a:t>
             </a:fld>
             <a:endParaRPr lang="en-US"/>
           </a:p>
@@ -2608,7 +3193,7 @@
           <a:p>
             <a:fld id="{78C97017-6FC3-485B-9764-EAC9E56C1D49}" type="datetimeFigureOut">
               <a:rPr lang="en-US" smtClean="0"/>
-              <a:t>7/11/2017</a:t>
+              <a:t>10/22/2017</a:t>
             </a:fld>
             <a:endParaRPr lang="en-US"/>
           </a:p>
@@ -2860,7 +3445,7 @@
           <a:p>
             <a:fld id="{78C97017-6FC3-485B-9764-EAC9E56C1D49}" type="datetimeFigureOut">
               <a:rPr lang="en-US" smtClean="0"/>
-              <a:t>7/11/2017</a:t>
+              <a:t>10/22/2017</a:t>
             </a:fld>
             <a:endParaRPr lang="en-US"/>
           </a:p>
@@ -3071,7 +3656,7 @@
           <a:p>
             <a:fld id="{78C97017-6FC3-485B-9764-EAC9E56C1D49}" type="datetimeFigureOut">
               <a:rPr lang="en-US" smtClean="0"/>
-              <a:t>7/11/2017</a:t>
+              <a:t>10/22/2017</a:t>
             </a:fld>
             <a:endParaRPr lang="en-US"/>
           </a:p>
@@ -3454,8 +4039,8 @@
         </p:nvSpPr>
         <p:spPr>
           <a:xfrm>
-            <a:off x="685800" y="1981200"/>
-            <a:ext cx="7252956" cy="4000286"/>
+            <a:off x="685800" y="1905000"/>
+            <a:ext cx="8229600" cy="4648200"/>
           </a:xfrm>
           <a:prstGeom prst="roundRect">
             <a:avLst>
@@ -3497,7 +4082,7 @@
                   <a:srgbClr val="0070C0"/>
                 </a:solidFill>
               </a:rPr>
-              <a:t>Logic</a:t>
+              <a:t>UI</a:t>
             </a:r>
             <a:endParaRPr lang="en-SG" sz="1200" b="1" dirty="0">
               <a:solidFill>
@@ -3515,8 +4100,8 @@
         </p:nvSpPr>
         <p:spPr>
           <a:xfrm>
-            <a:off x="845045" y="2296546"/>
-            <a:ext cx="1455629" cy="346760"/>
+            <a:off x="845045" y="2296545"/>
+            <a:ext cx="1497218" cy="352539"/>
           </a:xfrm>
           <a:prstGeom prst="rect">
             <a:avLst/>
@@ -3564,7 +4149,7 @@
                   <a:schemeClr val="bg1"/>
                 </a:solidFill>
               </a:rPr>
-              <a:t>LogicManager</a:t>
+              <a:t>UiManager</a:t>
             </a:r>
             <a:endParaRPr lang="en-SG" sz="1600" dirty="0">
               <a:solidFill>
@@ -3577,13 +4162,15 @@
       <p:cxnSp>
         <p:nvCxnSpPr>
           <p:cNvPr id="5" name="Straight Connector 4"/>
-          <p:cNvCxnSpPr/>
+          <p:cNvCxnSpPr>
+            <a:cxnSpLocks/>
+          </p:cNvCxnSpPr>
           <p:nvPr/>
         </p:nvCxnSpPr>
         <p:spPr>
           <a:xfrm>
             <a:off x="1572859" y="2660217"/>
-            <a:ext cx="0" cy="2597583"/>
+            <a:ext cx="0" cy="2640876"/>
           </a:xfrm>
           <a:prstGeom prst="line">
             <a:avLst/>
@@ -3620,7 +4207,7 @@
         <p:spPr>
           <a:xfrm>
             <a:off x="1500851" y="3010911"/>
-            <a:ext cx="152400" cy="2780287"/>
+            <a:ext cx="156754" cy="2826625"/>
           </a:xfrm>
           <a:prstGeom prst="rect">
             <a:avLst/>
@@ -3666,8 +4253,8 @@
         </p:nvSpPr>
         <p:spPr>
           <a:xfrm>
-            <a:off x="2743200" y="2179309"/>
-            <a:ext cx="1219200" cy="467684"/>
+            <a:off x="2668573" y="2785763"/>
+            <a:ext cx="1410789" cy="475479"/>
           </a:xfrm>
           <a:prstGeom prst="rect">
             <a:avLst/>
@@ -3707,18 +4294,15 @@
                   <a:schemeClr val="bg1"/>
                 </a:solidFill>
               </a:rPr>
-              <a:t>:Address</a:t>
-            </a:r>
-          </a:p>
-          <a:p>
-            <a:pPr algn="ctr"/>
+              <a:t>:</a:t>
+            </a:r>
             <a:r>
               <a:rPr lang="en-US" sz="1600" dirty="0" err="1">
                 <a:solidFill>
                   <a:schemeClr val="bg1"/>
                 </a:solidFill>
               </a:rPr>
-              <a:t>BookParser</a:t>
+              <a:t>MainWindow</a:t>
             </a:r>
             <a:endParaRPr lang="en-SG" sz="1600" dirty="0">
               <a:solidFill>
@@ -3731,13 +4315,15 @@
       <p:cxnSp>
         <p:nvCxnSpPr>
           <p:cNvPr id="17" name="Straight Connector 16"/>
-          <p:cNvCxnSpPr/>
+          <p:cNvCxnSpPr>
+            <a:cxnSpLocks/>
+          </p:cNvCxnSpPr>
           <p:nvPr/>
         </p:nvCxnSpPr>
         <p:spPr>
           <a:xfrm>
-            <a:off x="3356599" y="2663904"/>
-            <a:ext cx="0" cy="1695374"/>
+            <a:off x="8153400" y="3454660"/>
+            <a:ext cx="0" cy="2604113"/>
           </a:xfrm>
           <a:prstGeom prst="line">
             <a:avLst/>
@@ -3773,8 +4359,8 @@
         </p:nvSpPr>
         <p:spPr>
           <a:xfrm>
-            <a:off x="3284590" y="3122096"/>
-            <a:ext cx="174929" cy="1129459"/>
+            <a:off x="3227954" y="3542705"/>
+            <a:ext cx="173418" cy="2828260"/>
           </a:xfrm>
           <a:prstGeom prst="rect">
             <a:avLst/>
@@ -3824,8 +4410,8 @@
         </p:nvSpPr>
         <p:spPr>
           <a:xfrm>
-            <a:off x="6221565" y="3312740"/>
-            <a:ext cx="1093635" cy="461538"/>
+            <a:off x="6141341" y="3646959"/>
+            <a:ext cx="1379159" cy="435412"/>
           </a:xfrm>
           <a:prstGeom prst="rect">
             <a:avLst/>
@@ -3865,22 +4451,7 @@
                   <a:schemeClr val="bg1"/>
                 </a:solidFill>
               </a:rPr>
-              <a:t>d:Delete</a:t>
-            </a:r>
-            <a:br>
-              <a:rPr lang="en-US" sz="1600" dirty="0">
-                <a:solidFill>
-                  <a:schemeClr val="bg1"/>
-                </a:solidFill>
-              </a:rPr>
-            </a:br>
-            <a:r>
-              <a:rPr lang="en-US" sz="1600" dirty="0">
-                <a:solidFill>
-                  <a:schemeClr val="bg1"/>
-                </a:solidFill>
-              </a:rPr>
-              <a:t>Command</a:t>
+              <a:t>:MeetingCard</a:t>
             </a:r>
             <a:endParaRPr lang="en-SG" sz="1600" dirty="0">
               <a:solidFill>
@@ -3894,14 +4465,15 @@
         <p:nvCxnSpPr>
           <p:cNvPr id="20" name="Straight Connector 19"/>
           <p:cNvCxnSpPr>
+            <a:cxnSpLocks/>
             <a:stCxn id="21" idx="0"/>
           </p:cNvCxnSpPr>
           <p:nvPr/>
         </p:nvCxnSpPr>
         <p:spPr>
-          <a:xfrm>
-            <a:off x="6772574" y="3774278"/>
-            <a:ext cx="0" cy="1940722"/>
+          <a:xfrm flipH="1">
+            <a:off x="6772574" y="4075361"/>
+            <a:ext cx="2177" cy="2249239"/>
           </a:xfrm>
           <a:prstGeom prst="line">
             <a:avLst/>
@@ -3937,8 +4509,8 @@
         </p:nvSpPr>
         <p:spPr>
           <a:xfrm>
-            <a:off x="6696374" y="3774278"/>
-            <a:ext cx="152400" cy="276003"/>
+            <a:off x="6696374" y="4075361"/>
+            <a:ext cx="156754" cy="280603"/>
           </a:xfrm>
           <a:prstGeom prst="rect">
             <a:avLst/>
@@ -3972,20 +4544,22 @@
           <a:lstStyle/>
           <a:p>
             <a:pPr algn="ctr"/>
-            <a:endParaRPr lang="en-SG" sz="1400"/>
+            <a:endParaRPr lang="en-SG" sz="1400" dirty="0"/>
           </a:p>
         </p:txBody>
       </p:sp>
       <p:cxnSp>
         <p:nvCxnSpPr>
           <p:cNvPr id="23" name="Straight Arrow Connector 22"/>
-          <p:cNvCxnSpPr/>
+          <p:cNvCxnSpPr>
+            <a:cxnSpLocks/>
+          </p:cNvCxnSpPr>
           <p:nvPr/>
         </p:nvCxnSpPr>
         <p:spPr>
           <a:xfrm>
-            <a:off x="381000" y="3014599"/>
-            <a:ext cx="1119851" cy="0"/>
+            <a:off x="330306" y="2709771"/>
+            <a:ext cx="1151847" cy="0"/>
           </a:xfrm>
           <a:prstGeom prst="straightConnector1">
             <a:avLst/>
@@ -4015,13 +4589,15 @@
       <p:cxnSp>
         <p:nvCxnSpPr>
           <p:cNvPr id="25" name="Straight Arrow Connector 24"/>
-          <p:cNvCxnSpPr/>
+          <p:cNvCxnSpPr>
+            <a:cxnSpLocks/>
+          </p:cNvCxnSpPr>
           <p:nvPr/>
         </p:nvCxnSpPr>
         <p:spPr>
           <a:xfrm flipV="1">
-            <a:off x="1653251" y="3122097"/>
-            <a:ext cx="1596514" cy="1"/>
+            <a:off x="1653251" y="3122099"/>
+            <a:ext cx="1049754" cy="1"/>
           </a:xfrm>
           <a:prstGeom prst="straightConnector1">
             <a:avLst/>
@@ -4056,7 +4632,7 @@
         </p:nvSpPr>
         <p:spPr>
           <a:xfrm>
-            <a:off x="0" y="2743200"/>
+            <a:off x="-744608" y="2440488"/>
             <a:ext cx="1424846" cy="215444"/>
           </a:xfrm>
           <a:prstGeom prst="rect">
@@ -4072,26 +4648,33 @@
           <a:p>
             <a:pPr algn="r"/>
             <a:r>
-              <a:rPr lang="en-US" sz="1400" dirty="0">
+              <a:rPr lang="en-US" sz="1400" dirty="0" err="1">
                 <a:solidFill>
                   <a:srgbClr val="0070C0"/>
                 </a:solidFill>
               </a:rPr>
-              <a:t>execute(“delete 1”)</a:t>
-            </a:r>
+              <a:t>MainApp</a:t>
+            </a:r>
+            <a:endParaRPr lang="en-US" sz="1400" dirty="0">
+              <a:solidFill>
+                <a:srgbClr val="0070C0"/>
+              </a:solidFill>
+            </a:endParaRPr>
           </a:p>
         </p:txBody>
       </p:sp>
       <p:cxnSp>
         <p:nvCxnSpPr>
           <p:cNvPr id="28" name="Straight Arrow Connector 27"/>
-          <p:cNvCxnSpPr/>
+          <p:cNvCxnSpPr>
+            <a:cxnSpLocks/>
+          </p:cNvCxnSpPr>
           <p:nvPr/>
         </p:nvCxnSpPr>
         <p:spPr>
-          <a:xfrm flipV="1">
-            <a:off x="5257218" y="3703214"/>
-            <a:ext cx="922392" cy="1"/>
+          <a:xfrm>
+            <a:off x="5249574" y="3959008"/>
+            <a:ext cx="917246" cy="0"/>
           </a:xfrm>
           <a:prstGeom prst="straightConnector1">
             <a:avLst/>
@@ -4118,16 +4701,840 @@
           </a:fontRef>
         </p:style>
       </p:cxnSp>
-      <p:sp>
-        <p:nvSpPr>
-          <p:cNvPr id="29" name="TextBox 28"/>
+      <p:cxnSp>
+        <p:nvCxnSpPr>
+          <p:cNvPr id="34" name="Straight Arrow Connector 33"/>
+          <p:cNvCxnSpPr>
+            <a:cxnSpLocks/>
+          </p:cNvCxnSpPr>
+          <p:nvPr/>
+        </p:nvCxnSpPr>
+        <p:spPr>
+          <a:xfrm>
+            <a:off x="5249574" y="4186165"/>
+            <a:ext cx="1535630" cy="0"/>
+          </a:xfrm>
+          <a:prstGeom prst="straightConnector1">
+            <a:avLst/>
+          </a:prstGeom>
+          <a:ln w="19050">
+            <a:solidFill>
+              <a:srgbClr val="0070C0"/>
+            </a:solidFill>
+            <a:prstDash val="sysDash"/>
+            <a:headEnd type="arrow" w="med" len="med"/>
+            <a:tailEnd type="none" w="med" len="med"/>
+          </a:ln>
+        </p:spPr>
+        <p:style>
+          <a:lnRef idx="1">
+            <a:schemeClr val="accent1"/>
+          </a:lnRef>
+          <a:fillRef idx="0">
+            <a:schemeClr val="accent1"/>
+          </a:fillRef>
+          <a:effectRef idx="0">
+            <a:schemeClr val="accent1"/>
+          </a:effectRef>
+          <a:fontRef idx="minor">
+            <a:schemeClr val="tx1"/>
+          </a:fontRef>
+        </p:style>
+      </p:cxnSp>
+      <p:cxnSp>
+        <p:nvCxnSpPr>
+          <p:cNvPr id="37" name="Straight Arrow Connector 36"/>
+          <p:cNvCxnSpPr>
+            <a:cxnSpLocks/>
+          </p:cNvCxnSpPr>
+          <p:nvPr/>
+        </p:nvCxnSpPr>
+        <p:spPr>
+          <a:xfrm>
+            <a:off x="304800" y="5791200"/>
+            <a:ext cx="1230224" cy="0"/>
+          </a:xfrm>
+          <a:prstGeom prst="straightConnector1">
+            <a:avLst/>
+          </a:prstGeom>
+          <a:ln w="19050">
+            <a:solidFill>
+              <a:schemeClr val="accent1"/>
+            </a:solidFill>
+            <a:prstDash val="sysDash"/>
+            <a:headEnd type="arrow" w="med" len="med"/>
+            <a:tailEnd type="none" w="med" len="med"/>
+          </a:ln>
+        </p:spPr>
+        <p:style>
+          <a:lnRef idx="1">
+            <a:schemeClr val="accent1"/>
+          </a:lnRef>
+          <a:fillRef idx="0">
+            <a:schemeClr val="accent1"/>
+          </a:fillRef>
+          <a:effectRef idx="0">
+            <a:schemeClr val="accent1"/>
+          </a:effectRef>
+          <a:fontRef idx="minor">
+            <a:schemeClr val="tx1"/>
+          </a:fontRef>
+        </p:style>
+      </p:cxnSp>
+      <p:sp>
+        <p:nvSpPr>
+          <p:cNvPr id="65" name="Rectangle 64"/>
+          <p:cNvSpPr/>
+          <p:nvPr/>
+        </p:nvSpPr>
+        <p:spPr>
+          <a:xfrm>
+            <a:off x="6705599" y="4466999"/>
+            <a:ext cx="149208" cy="1687553"/>
+          </a:xfrm>
+          <a:prstGeom prst="rect">
+            <a:avLst/>
+          </a:prstGeom>
+          <a:solidFill>
+            <a:srgbClr val="0070C0"/>
+          </a:solidFill>
+          <a:ln>
+            <a:solidFill>
+              <a:srgbClr val="0070C0"/>
+            </a:solidFill>
+          </a:ln>
+          <a:effectLst/>
+        </p:spPr>
+        <p:style>
+          <a:lnRef idx="1">
+            <a:schemeClr val="accent3"/>
+          </a:lnRef>
+          <a:fillRef idx="2">
+            <a:schemeClr val="accent3"/>
+          </a:fillRef>
+          <a:effectRef idx="1">
+            <a:schemeClr val="accent3"/>
+          </a:effectRef>
+          <a:fontRef idx="minor">
+            <a:schemeClr val="dk1"/>
+          </a:fontRef>
+        </p:style>
+        <p:txBody>
+          <a:bodyPr rtlCol="0" anchor="ctr"/>
+          <a:lstStyle/>
+          <a:p>
+            <a:pPr algn="ctr"/>
+            <a:endParaRPr lang="en-SG" sz="1400"/>
+          </a:p>
+        </p:txBody>
+      </p:sp>
+      <p:cxnSp>
+        <p:nvCxnSpPr>
+          <p:cNvPr id="75" name="Straight Arrow Connector 74"/>
+          <p:cNvCxnSpPr>
+            <a:cxnSpLocks/>
+          </p:cNvCxnSpPr>
+          <p:nvPr/>
+        </p:nvCxnSpPr>
+        <p:spPr>
+          <a:xfrm>
+            <a:off x="6850663" y="4524597"/>
+            <a:ext cx="1245670" cy="0"/>
+          </a:xfrm>
+          <a:prstGeom prst="straightConnector1">
+            <a:avLst/>
+          </a:prstGeom>
+          <a:ln w="19050">
+            <a:solidFill>
+              <a:srgbClr val="0070C0"/>
+            </a:solidFill>
+            <a:tailEnd type="arrow"/>
+          </a:ln>
+        </p:spPr>
+        <p:style>
+          <a:lnRef idx="1">
+            <a:schemeClr val="accent1"/>
+          </a:lnRef>
+          <a:fillRef idx="0">
+            <a:schemeClr val="accent1"/>
+          </a:fillRef>
+          <a:effectRef idx="0">
+            <a:schemeClr val="accent1"/>
+          </a:effectRef>
+          <a:fontRef idx="minor">
+            <a:schemeClr val="tx1"/>
+          </a:fontRef>
+        </p:style>
+      </p:cxnSp>
+      <p:cxnSp>
+        <p:nvCxnSpPr>
+          <p:cNvPr id="77" name="Straight Arrow Connector 76"/>
+          <p:cNvCxnSpPr>
+            <a:cxnSpLocks/>
+          </p:cNvCxnSpPr>
+          <p:nvPr/>
+        </p:nvCxnSpPr>
+        <p:spPr>
+          <a:xfrm flipV="1">
+            <a:off x="1653251" y="5486401"/>
+            <a:ext cx="1612147" cy="1"/>
+          </a:xfrm>
+          <a:prstGeom prst="straightConnector1">
+            <a:avLst/>
+          </a:prstGeom>
+          <a:ln w="19050">
+            <a:solidFill>
+              <a:srgbClr val="0070C0"/>
+            </a:solidFill>
+            <a:prstDash val="sysDash"/>
+            <a:headEnd type="arrow" w="med" len="med"/>
+            <a:tailEnd type="none" w="med" len="med"/>
+          </a:ln>
+        </p:spPr>
+        <p:style>
+          <a:lnRef idx="1">
+            <a:schemeClr val="accent1"/>
+          </a:lnRef>
+          <a:fillRef idx="0">
+            <a:schemeClr val="accent1"/>
+          </a:fillRef>
+          <a:effectRef idx="0">
+            <a:schemeClr val="accent1"/>
+          </a:effectRef>
+          <a:fontRef idx="minor">
+            <a:schemeClr val="tx1"/>
+          </a:fontRef>
+        </p:style>
+      </p:cxnSp>
+      <p:sp>
+        <p:nvSpPr>
+          <p:cNvPr id="84" name="Rectangle 62"/>
+          <p:cNvSpPr/>
+          <p:nvPr/>
+        </p:nvSpPr>
+        <p:spPr>
+          <a:xfrm>
+            <a:off x="7535112" y="3010911"/>
+            <a:ext cx="1268015" cy="469230"/>
+          </a:xfrm>
+          <a:prstGeom prst="rect">
+            <a:avLst/>
+          </a:prstGeom>
+          <a:solidFill>
+            <a:srgbClr val="0070C0"/>
+          </a:solidFill>
+          <a:ln w="19050">
+            <a:solidFill>
+              <a:srgbClr val="0070C0"/>
+            </a:solidFill>
+          </a:ln>
+          <a:effectLst/>
+        </p:spPr>
+        <p:style>
+          <a:lnRef idx="1">
+            <a:schemeClr val="accent2"/>
+          </a:lnRef>
+          <a:fillRef idx="2">
+            <a:schemeClr val="accent2"/>
+          </a:fillRef>
+          <a:effectRef idx="1">
+            <a:schemeClr val="accent2"/>
+          </a:effectRef>
+          <a:fontRef idx="minor">
+            <a:schemeClr val="dk1"/>
+          </a:fontRef>
+        </p:style>
+        <p:txBody>
+          <a:bodyPr rtlCol="0" anchor="ctr"/>
+          <a:lstStyle/>
+          <a:p>
+            <a:pPr algn="ctr"/>
+            <a:r>
+              <a:rPr lang="en-US" sz="1600" dirty="0">
+                <a:solidFill>
+                  <a:schemeClr val="bg1"/>
+                </a:solidFill>
+              </a:rPr>
+              <a:t>:Meeting</a:t>
+            </a:r>
+            <a:endParaRPr lang="en-SG" sz="1600" dirty="0">
+              <a:solidFill>
+                <a:schemeClr val="bg1"/>
+              </a:solidFill>
+            </a:endParaRPr>
+          </a:p>
+        </p:txBody>
+      </p:sp>
+      <p:cxnSp>
+        <p:nvCxnSpPr>
+          <p:cNvPr id="90" name="Straight Arrow Connector 89"/>
+          <p:cNvCxnSpPr>
+            <a:cxnSpLocks/>
+          </p:cNvCxnSpPr>
+          <p:nvPr/>
+        </p:nvCxnSpPr>
+        <p:spPr>
+          <a:xfrm>
+            <a:off x="5277983" y="6005197"/>
+            <a:ext cx="1458916" cy="0"/>
+          </a:xfrm>
+          <a:prstGeom prst="straightConnector1">
+            <a:avLst/>
+          </a:prstGeom>
+          <a:ln w="19050">
+            <a:solidFill>
+              <a:srgbClr val="0070C0"/>
+            </a:solidFill>
+            <a:prstDash val="sysDash"/>
+            <a:headEnd type="arrow" w="med" len="med"/>
+            <a:tailEnd type="none" w="med" len="med"/>
+          </a:ln>
+        </p:spPr>
+        <p:style>
+          <a:lnRef idx="1">
+            <a:schemeClr val="accent1"/>
+          </a:lnRef>
+          <a:fillRef idx="0">
+            <a:schemeClr val="accent1"/>
+          </a:fillRef>
+          <a:effectRef idx="0">
+            <a:schemeClr val="accent1"/>
+          </a:effectRef>
+          <a:fontRef idx="minor">
+            <a:schemeClr val="tx1"/>
+          </a:fontRef>
+        </p:style>
+      </p:cxnSp>
+      <p:sp>
+        <p:nvSpPr>
+          <p:cNvPr id="40" name="Rectangle 62"/>
+          <p:cNvSpPr/>
+          <p:nvPr/>
+        </p:nvSpPr>
+        <p:spPr>
+          <a:xfrm>
+            <a:off x="4290964" y="3229246"/>
+            <a:ext cx="1829007" cy="439236"/>
+          </a:xfrm>
+          <a:prstGeom prst="rect">
+            <a:avLst/>
+          </a:prstGeom>
+          <a:solidFill>
+            <a:srgbClr val="0070C0"/>
+          </a:solidFill>
+          <a:ln w="19050">
+            <a:solidFill>
+              <a:srgbClr val="0070C0"/>
+            </a:solidFill>
+          </a:ln>
+          <a:effectLst/>
+        </p:spPr>
+        <p:style>
+          <a:lnRef idx="1">
+            <a:schemeClr val="accent2"/>
+          </a:lnRef>
+          <a:fillRef idx="2">
+            <a:schemeClr val="accent2"/>
+          </a:fillRef>
+          <a:effectRef idx="1">
+            <a:schemeClr val="accent2"/>
+          </a:effectRef>
+          <a:fontRef idx="minor">
+            <a:schemeClr val="dk1"/>
+          </a:fontRef>
+        </p:style>
+        <p:txBody>
+          <a:bodyPr rtlCol="0" anchor="ctr"/>
+          <a:lstStyle/>
+          <a:p>
+            <a:pPr algn="ctr"/>
+            <a:r>
+              <a:rPr lang="en-US" sz="1600" dirty="0">
+                <a:solidFill>
+                  <a:schemeClr val="bg1"/>
+                </a:solidFill>
+              </a:rPr>
+              <a:t>:</a:t>
+            </a:r>
+            <a:r>
+              <a:rPr lang="en-US" sz="1600" dirty="0" err="1">
+                <a:solidFill>
+                  <a:schemeClr val="bg1"/>
+                </a:solidFill>
+              </a:rPr>
+              <a:t>MeetingListPanel</a:t>
+            </a:r>
+            <a:endParaRPr lang="en-US" sz="1600" dirty="0">
+              <a:solidFill>
+                <a:schemeClr val="bg1"/>
+              </a:solidFill>
+            </a:endParaRPr>
+          </a:p>
+        </p:txBody>
+      </p:sp>
+      <p:sp>
+        <p:nvSpPr>
+          <p:cNvPr id="45" name="Rectangle 44"/>
+          <p:cNvSpPr/>
+          <p:nvPr/>
+        </p:nvSpPr>
+        <p:spPr>
+          <a:xfrm>
+            <a:off x="5074474" y="3651664"/>
+            <a:ext cx="211724" cy="125218"/>
+          </a:xfrm>
+          <a:prstGeom prst="rect">
+            <a:avLst/>
+          </a:prstGeom>
+          <a:solidFill>
+            <a:srgbClr val="0070C0"/>
+          </a:solidFill>
+          <a:ln>
+            <a:solidFill>
+              <a:srgbClr val="0070C0"/>
+            </a:solidFill>
+          </a:ln>
+          <a:effectLst/>
+        </p:spPr>
+        <p:style>
+          <a:lnRef idx="1">
+            <a:schemeClr val="accent3"/>
+          </a:lnRef>
+          <a:fillRef idx="2">
+            <a:schemeClr val="accent3"/>
+          </a:fillRef>
+          <a:effectRef idx="1">
+            <a:schemeClr val="accent3"/>
+          </a:effectRef>
+          <a:fontRef idx="minor">
+            <a:schemeClr val="dk1"/>
+          </a:fontRef>
+        </p:style>
+        <p:txBody>
+          <a:bodyPr rtlCol="0" anchor="ctr"/>
+          <a:lstStyle/>
+          <a:p>
+            <a:pPr algn="ctr"/>
+            <a:endParaRPr lang="en-SG" sz="1400" dirty="0"/>
+          </a:p>
+        </p:txBody>
+      </p:sp>
+      <p:cxnSp>
+        <p:nvCxnSpPr>
+          <p:cNvPr id="46" name="Straight Connector 45"/>
+          <p:cNvCxnSpPr>
+            <a:cxnSpLocks/>
+            <a:stCxn id="45" idx="0"/>
+          </p:cNvCxnSpPr>
+          <p:nvPr/>
+        </p:nvCxnSpPr>
+        <p:spPr>
+          <a:xfrm flipH="1">
+            <a:off x="5177396" y="3651664"/>
+            <a:ext cx="2940" cy="2672936"/>
+          </a:xfrm>
+          <a:prstGeom prst="line">
+            <a:avLst/>
+          </a:prstGeom>
+          <a:ln w="19050">
+            <a:solidFill>
+              <a:srgbClr val="0070C0"/>
+            </a:solidFill>
+            <a:prstDash val="sysDash"/>
+          </a:ln>
+          <a:effectLst/>
+        </p:spPr>
+        <p:style>
+          <a:lnRef idx="1">
+            <a:schemeClr val="accent1"/>
+          </a:lnRef>
+          <a:fillRef idx="2">
+            <a:schemeClr val="accent1"/>
+          </a:fillRef>
+          <a:effectRef idx="1">
+            <a:schemeClr val="accent1"/>
+          </a:effectRef>
+          <a:fontRef idx="minor">
+            <a:schemeClr val="dk1"/>
+          </a:fontRef>
+        </p:style>
+      </p:cxnSp>
+      <p:sp>
+        <p:nvSpPr>
+          <p:cNvPr id="49" name="Rectangle 48"/>
+          <p:cNvSpPr/>
+          <p:nvPr/>
+        </p:nvSpPr>
+        <p:spPr>
+          <a:xfrm>
+            <a:off x="5078561" y="3886199"/>
+            <a:ext cx="205120" cy="2278033"/>
+          </a:xfrm>
+          <a:prstGeom prst="rect">
+            <a:avLst/>
+          </a:prstGeom>
+          <a:solidFill>
+            <a:srgbClr val="0070C0"/>
+          </a:solidFill>
+          <a:ln>
+            <a:solidFill>
+              <a:srgbClr val="0070C0"/>
+            </a:solidFill>
+          </a:ln>
+          <a:effectLst/>
+        </p:spPr>
+        <p:style>
+          <a:lnRef idx="1">
+            <a:schemeClr val="accent3"/>
+          </a:lnRef>
+          <a:fillRef idx="2">
+            <a:schemeClr val="accent3"/>
+          </a:fillRef>
+          <a:effectRef idx="1">
+            <a:schemeClr val="accent3"/>
+          </a:effectRef>
+          <a:fontRef idx="minor">
+            <a:schemeClr val="dk1"/>
+          </a:fontRef>
+        </p:style>
+        <p:txBody>
+          <a:bodyPr rtlCol="0" anchor="ctr"/>
+          <a:lstStyle/>
+          <a:p>
+            <a:pPr algn="ctr"/>
+            <a:endParaRPr lang="en-SG" sz="1400"/>
+          </a:p>
+        </p:txBody>
+      </p:sp>
+      <p:cxnSp>
+        <p:nvCxnSpPr>
+          <p:cNvPr id="13" name="Straight Arrow Connector 12"/>
+          <p:cNvCxnSpPr>
+            <a:cxnSpLocks/>
+          </p:cNvCxnSpPr>
+          <p:nvPr/>
+        </p:nvCxnSpPr>
+        <p:spPr>
+          <a:xfrm>
+            <a:off x="6858000" y="5181600"/>
+            <a:ext cx="1238123" cy="0"/>
+          </a:xfrm>
+          <a:prstGeom prst="straightConnector1">
+            <a:avLst/>
+          </a:prstGeom>
+          <a:ln w="19050">
+            <a:headEnd type="none" w="med" len="med"/>
+            <a:tailEnd type="arrow" w="med" len="med"/>
+          </a:ln>
+        </p:spPr>
+        <p:style>
+          <a:lnRef idx="1">
+            <a:schemeClr val="accent1"/>
+          </a:lnRef>
+          <a:fillRef idx="0">
+            <a:schemeClr val="accent1"/>
+          </a:fillRef>
+          <a:effectRef idx="0">
+            <a:schemeClr val="accent1"/>
+          </a:effectRef>
+          <a:fontRef idx="minor">
+            <a:schemeClr val="tx1"/>
+          </a:fontRef>
+        </p:style>
+      </p:cxnSp>
+      <p:cxnSp>
+        <p:nvCxnSpPr>
+          <p:cNvPr id="50" name="Straight Arrow Connector 49"/>
+          <p:cNvCxnSpPr>
+            <a:cxnSpLocks/>
+          </p:cNvCxnSpPr>
+          <p:nvPr/>
+        </p:nvCxnSpPr>
+        <p:spPr>
+          <a:xfrm>
+            <a:off x="3407978" y="3592392"/>
+            <a:ext cx="951442" cy="0"/>
+          </a:xfrm>
+          <a:prstGeom prst="straightConnector1">
+            <a:avLst/>
+          </a:prstGeom>
+          <a:ln w="19050">
+            <a:solidFill>
+              <a:srgbClr val="0070C0"/>
+            </a:solidFill>
+            <a:tailEnd type="arrow"/>
+          </a:ln>
+        </p:spPr>
+        <p:style>
+          <a:lnRef idx="1">
+            <a:schemeClr val="accent1"/>
+          </a:lnRef>
+          <a:fillRef idx="0">
+            <a:schemeClr val="accent1"/>
+          </a:fillRef>
+          <a:effectRef idx="0">
+            <a:schemeClr val="accent1"/>
+          </a:effectRef>
+          <a:fontRef idx="minor">
+            <a:schemeClr val="tx1"/>
+          </a:fontRef>
+        </p:style>
+      </p:cxnSp>
+      <p:cxnSp>
+        <p:nvCxnSpPr>
+          <p:cNvPr id="52" name="Straight Arrow Connector 51"/>
+          <p:cNvCxnSpPr>
+            <a:cxnSpLocks/>
+            <a:endCxn id="45" idx="1"/>
+          </p:cNvCxnSpPr>
+          <p:nvPr/>
+        </p:nvCxnSpPr>
+        <p:spPr>
+          <a:xfrm flipV="1">
+            <a:off x="3412425" y="3714273"/>
+            <a:ext cx="1662049" cy="3250"/>
+          </a:xfrm>
+          <a:prstGeom prst="straightConnector1">
+            <a:avLst/>
+          </a:prstGeom>
+          <a:ln w="19050">
+            <a:solidFill>
+              <a:srgbClr val="0070C0"/>
+            </a:solidFill>
+            <a:prstDash val="sysDash"/>
+            <a:headEnd type="arrow" w="med" len="med"/>
+            <a:tailEnd type="none" w="med" len="med"/>
+          </a:ln>
+        </p:spPr>
+        <p:style>
+          <a:lnRef idx="1">
+            <a:schemeClr val="accent1"/>
+          </a:lnRef>
+          <a:fillRef idx="0">
+            <a:schemeClr val="accent1"/>
+          </a:fillRef>
+          <a:effectRef idx="0">
+            <a:schemeClr val="accent1"/>
+          </a:effectRef>
+          <a:fontRef idx="minor">
+            <a:schemeClr val="tx1"/>
+          </a:fontRef>
+        </p:style>
+      </p:cxnSp>
+      <p:cxnSp>
+        <p:nvCxnSpPr>
+          <p:cNvPr id="47" name="Straight Connector 46">
+            <a:extLst>
+              <a:ext uri="{FF2B5EF4-FFF2-40B4-BE49-F238E27FC236}">
+                <a16:creationId xmlns:a16="http://schemas.microsoft.com/office/drawing/2014/main" id="{FFBDFE60-7726-4B56-90C1-2FA9D05FB099}"/>
+              </a:ext>
+            </a:extLst>
+          </p:cNvPr>
+          <p:cNvCxnSpPr>
+            <a:cxnSpLocks/>
+          </p:cNvCxnSpPr>
+          <p:nvPr/>
+        </p:nvCxnSpPr>
+        <p:spPr>
+          <a:xfrm>
+            <a:off x="3302503" y="3235394"/>
+            <a:ext cx="0" cy="1007110"/>
+          </a:xfrm>
+          <a:prstGeom prst="line">
+            <a:avLst/>
+          </a:prstGeom>
+          <a:ln w="19050">
+            <a:solidFill>
+              <a:srgbClr val="0070C0"/>
+            </a:solidFill>
+            <a:prstDash val="sysDash"/>
+          </a:ln>
+          <a:effectLst/>
+        </p:spPr>
+        <p:style>
+          <a:lnRef idx="1">
+            <a:schemeClr val="accent1"/>
+          </a:lnRef>
+          <a:fillRef idx="2">
+            <a:schemeClr val="accent1"/>
+          </a:fillRef>
+          <a:effectRef idx="1">
+            <a:schemeClr val="accent1"/>
+          </a:effectRef>
+          <a:fontRef idx="minor">
+            <a:schemeClr val="dk1"/>
+          </a:fontRef>
+        </p:style>
+      </p:cxnSp>
+      <p:sp>
+        <p:nvSpPr>
+          <p:cNvPr id="53" name="Rectangle 52">
+            <a:extLst>
+              <a:ext uri="{FF2B5EF4-FFF2-40B4-BE49-F238E27FC236}">
+                <a16:creationId xmlns:a16="http://schemas.microsoft.com/office/drawing/2014/main" id="{FBF7D20E-9590-477A-BD3A-28A63A17DD10}"/>
+              </a:ext>
+            </a:extLst>
+          </p:cNvPr>
+          <p:cNvSpPr/>
+          <p:nvPr/>
+        </p:nvSpPr>
+        <p:spPr>
+          <a:xfrm>
+            <a:off x="1460651" y="2645389"/>
+            <a:ext cx="211724" cy="125218"/>
+          </a:xfrm>
+          <a:prstGeom prst="rect">
+            <a:avLst/>
+          </a:prstGeom>
+          <a:solidFill>
+            <a:srgbClr val="0070C0"/>
+          </a:solidFill>
+          <a:ln>
+            <a:solidFill>
+              <a:srgbClr val="0070C0"/>
+            </a:solidFill>
+          </a:ln>
+          <a:effectLst/>
+        </p:spPr>
+        <p:style>
+          <a:lnRef idx="1">
+            <a:schemeClr val="accent3"/>
+          </a:lnRef>
+          <a:fillRef idx="2">
+            <a:schemeClr val="accent3"/>
+          </a:fillRef>
+          <a:effectRef idx="1">
+            <a:schemeClr val="accent3"/>
+          </a:effectRef>
+          <a:fontRef idx="minor">
+            <a:schemeClr val="dk1"/>
+          </a:fontRef>
+        </p:style>
+        <p:txBody>
+          <a:bodyPr rtlCol="0" anchor="ctr"/>
+          <a:lstStyle/>
+          <a:p>
+            <a:pPr algn="ctr"/>
+            <a:endParaRPr lang="en-SG" sz="1400" dirty="0"/>
+          </a:p>
+        </p:txBody>
+      </p:sp>
+      <p:cxnSp>
+        <p:nvCxnSpPr>
+          <p:cNvPr id="54" name="Straight Arrow Connector 53">
+            <a:extLst>
+              <a:ext uri="{FF2B5EF4-FFF2-40B4-BE49-F238E27FC236}">
+                <a16:creationId xmlns:a16="http://schemas.microsoft.com/office/drawing/2014/main" id="{C123D980-C643-4DBD-952F-EC5727846F17}"/>
+              </a:ext>
+            </a:extLst>
+          </p:cNvPr>
+          <p:cNvCxnSpPr>
+            <a:cxnSpLocks/>
+            <a:endCxn id="55" idx="1"/>
+          </p:cNvCxnSpPr>
+          <p:nvPr/>
+        </p:nvCxnSpPr>
+        <p:spPr>
+          <a:xfrm flipV="1">
+            <a:off x="1653251" y="3298297"/>
+            <a:ext cx="1583938" cy="14444"/>
+          </a:xfrm>
+          <a:prstGeom prst="straightConnector1">
+            <a:avLst/>
+          </a:prstGeom>
+          <a:ln w="19050">
+            <a:solidFill>
+              <a:srgbClr val="0070C0"/>
+            </a:solidFill>
+            <a:prstDash val="sysDash"/>
+            <a:headEnd type="arrow" w="med" len="med"/>
+            <a:tailEnd type="none" w="med" len="med"/>
+          </a:ln>
+        </p:spPr>
+        <p:style>
+          <a:lnRef idx="1">
+            <a:schemeClr val="accent1"/>
+          </a:lnRef>
+          <a:fillRef idx="0">
+            <a:schemeClr val="accent1"/>
+          </a:fillRef>
+          <a:effectRef idx="0">
+            <a:schemeClr val="accent1"/>
+          </a:effectRef>
+          <a:fontRef idx="minor">
+            <a:schemeClr val="tx1"/>
+          </a:fontRef>
+        </p:style>
+      </p:cxnSp>
+      <p:sp>
+        <p:nvSpPr>
+          <p:cNvPr id="55" name="Rectangle 54">
+            <a:extLst>
+              <a:ext uri="{FF2B5EF4-FFF2-40B4-BE49-F238E27FC236}">
+                <a16:creationId xmlns:a16="http://schemas.microsoft.com/office/drawing/2014/main" id="{E04FFA3B-C00A-4412-AF6B-7E62817ADD00}"/>
+              </a:ext>
+            </a:extLst>
+          </p:cNvPr>
+          <p:cNvSpPr/>
+          <p:nvPr/>
+        </p:nvSpPr>
+        <p:spPr>
+          <a:xfrm>
+            <a:off x="3237189" y="3157995"/>
+            <a:ext cx="156754" cy="280603"/>
+          </a:xfrm>
+          <a:prstGeom prst="rect">
+            <a:avLst/>
+          </a:prstGeom>
+          <a:solidFill>
+            <a:srgbClr val="0070C0"/>
+          </a:solidFill>
+          <a:ln>
+            <a:solidFill>
+              <a:srgbClr val="0070C0"/>
+            </a:solidFill>
+          </a:ln>
+          <a:effectLst/>
+        </p:spPr>
+        <p:style>
+          <a:lnRef idx="1">
+            <a:schemeClr val="accent3"/>
+          </a:lnRef>
+          <a:fillRef idx="2">
+            <a:schemeClr val="accent3"/>
+          </a:fillRef>
+          <a:effectRef idx="1">
+            <a:schemeClr val="accent3"/>
+          </a:effectRef>
+          <a:fontRef idx="minor">
+            <a:schemeClr val="dk1"/>
+          </a:fontRef>
+        </p:style>
+        <p:txBody>
+          <a:bodyPr rtlCol="0" anchor="ctr"/>
+          <a:lstStyle/>
+          <a:p>
+            <a:pPr algn="ctr"/>
+            <a:endParaRPr lang="en-SG" sz="1400" dirty="0"/>
+          </a:p>
+        </p:txBody>
+      </p:sp>
+      <p:sp>
+        <p:nvSpPr>
+          <p:cNvPr id="58" name="TextBox 57">
+            <a:extLst>
+              <a:ext uri="{FF2B5EF4-FFF2-40B4-BE49-F238E27FC236}">
+                <a16:creationId xmlns:a16="http://schemas.microsoft.com/office/drawing/2014/main" id="{1BBECE94-2054-45B9-B0E8-EF92A1A60448}"/>
+              </a:ext>
+            </a:extLst>
+          </p:cNvPr>
           <p:cNvSpPr txBox="1"/>
           <p:nvPr/>
         </p:nvSpPr>
         <p:spPr>
           <a:xfrm>
-            <a:off x="4257582" y="4251556"/>
-            <a:ext cx="855809" cy="215444"/>
+            <a:off x="3401773" y="3376182"/>
+            <a:ext cx="880261" cy="172098"/>
           </a:xfrm>
           <a:prstGeom prst="rect">
             <a:avLst/>
@@ -4152,237 +5559,32 @@
           </a:lstStyle>
           <a:p>
             <a:r>
-              <a:rPr lang="en-US" dirty="0"/>
-              <a:t>execute()</a:t>
-            </a:r>
-          </a:p>
-        </p:txBody>
-      </p:sp>
-      <p:cxnSp>
-        <p:nvCxnSpPr>
-          <p:cNvPr id="34" name="Straight Arrow Connector 33"/>
-          <p:cNvCxnSpPr/>
-          <p:nvPr/>
-        </p:nvCxnSpPr>
-        <p:spPr>
-          <a:xfrm>
-            <a:off x="5257800" y="4050281"/>
-            <a:ext cx="1492974" cy="0"/>
-          </a:xfrm>
-          <a:prstGeom prst="straightConnector1">
-            <a:avLst/>
-          </a:prstGeom>
-          <a:ln w="19050">
-            <a:solidFill>
-              <a:srgbClr val="0070C0"/>
-            </a:solidFill>
-            <a:prstDash val="sysDash"/>
-            <a:headEnd type="arrow" w="med" len="med"/>
-            <a:tailEnd type="none" w="med" len="med"/>
-          </a:ln>
-        </p:spPr>
-        <p:style>
-          <a:lnRef idx="1">
-            <a:schemeClr val="accent1"/>
-          </a:lnRef>
-          <a:fillRef idx="0">
-            <a:schemeClr val="accent1"/>
-          </a:fillRef>
-          <a:effectRef idx="0">
-            <a:schemeClr val="accent1"/>
-          </a:effectRef>
-          <a:fontRef idx="minor">
-            <a:schemeClr val="tx1"/>
-          </a:fontRef>
-        </p:style>
-      </p:cxnSp>
-      <p:cxnSp>
-        <p:nvCxnSpPr>
-          <p:cNvPr id="35" name="Straight Arrow Connector 34"/>
-          <p:cNvCxnSpPr/>
-          <p:nvPr/>
-        </p:nvCxnSpPr>
-        <p:spPr>
-          <a:xfrm flipV="1">
-            <a:off x="1670186" y="4243231"/>
-            <a:ext cx="1596514" cy="5378"/>
-          </a:xfrm>
-          <a:prstGeom prst="straightConnector1">
-            <a:avLst/>
-          </a:prstGeom>
-          <a:ln w="19050">
-            <a:solidFill>
-              <a:srgbClr val="0070C0"/>
-            </a:solidFill>
-            <a:prstDash val="sysDash"/>
-            <a:headEnd type="arrow" w="med" len="med"/>
-            <a:tailEnd type="none" w="med" len="med"/>
-          </a:ln>
-        </p:spPr>
-        <p:style>
-          <a:lnRef idx="1">
-            <a:schemeClr val="accent1"/>
-          </a:lnRef>
-          <a:fillRef idx="0">
-            <a:schemeClr val="accent1"/>
-          </a:fillRef>
-          <a:effectRef idx="0">
-            <a:schemeClr val="accent1"/>
-          </a:effectRef>
-          <a:fontRef idx="minor">
-            <a:schemeClr val="tx1"/>
-          </a:fontRef>
-        </p:style>
-      </p:cxnSp>
-      <p:cxnSp>
-        <p:nvCxnSpPr>
-          <p:cNvPr id="37" name="Straight Arrow Connector 36"/>
-          <p:cNvCxnSpPr/>
-          <p:nvPr/>
-        </p:nvCxnSpPr>
-        <p:spPr>
-          <a:xfrm>
-            <a:off x="304800" y="5791200"/>
-            <a:ext cx="1196051" cy="0"/>
-          </a:xfrm>
-          <a:prstGeom prst="straightConnector1">
-            <a:avLst/>
-          </a:prstGeom>
-          <a:ln w="19050">
-            <a:solidFill>
-              <a:schemeClr val="accent1"/>
-            </a:solidFill>
-            <a:prstDash val="sysDash"/>
-            <a:headEnd type="arrow" w="med" len="med"/>
-            <a:tailEnd type="none" w="med" len="med"/>
-          </a:ln>
-        </p:spPr>
-        <p:style>
-          <a:lnRef idx="1">
-            <a:schemeClr val="accent1"/>
-          </a:lnRef>
-          <a:fillRef idx="0">
-            <a:schemeClr val="accent1"/>
-          </a:fillRef>
-          <a:effectRef idx="0">
-            <a:schemeClr val="accent1"/>
-          </a:effectRef>
-          <a:fontRef idx="minor">
-            <a:schemeClr val="tx1"/>
-          </a:fontRef>
-        </p:style>
-      </p:cxnSp>
-      <p:sp>
-        <p:nvSpPr>
-          <p:cNvPr id="39" name="Rectangle 62"/>
+              <a:rPr lang="en-US" sz="1100" dirty="0" err="1"/>
+              <a:t>fillInnerParts</a:t>
+            </a:r>
+            <a:r>
+              <a:rPr lang="en-US" sz="1100" dirty="0"/>
+              <a:t>()</a:t>
+            </a:r>
+          </a:p>
+        </p:txBody>
+      </p:sp>
+      <p:sp>
+        <p:nvSpPr>
+          <p:cNvPr id="72" name="Rectangle 71">
+            <a:extLst>
+              <a:ext uri="{FF2B5EF4-FFF2-40B4-BE49-F238E27FC236}">
+                <a16:creationId xmlns:a16="http://schemas.microsoft.com/office/drawing/2014/main" id="{27DBF2A5-CB4B-401D-8F8D-7FBA78038A18}"/>
+              </a:ext>
+            </a:extLst>
+          </p:cNvPr>
           <p:cNvSpPr/>
           <p:nvPr/>
         </p:nvSpPr>
         <p:spPr>
           <a:xfrm>
-            <a:off x="8265896" y="2362200"/>
-            <a:ext cx="1030504" cy="346760"/>
-          </a:xfrm>
-          <a:prstGeom prst="rect">
-            <a:avLst/>
-          </a:prstGeom>
-          <a:solidFill>
-            <a:schemeClr val="accent4">
-              <a:lumMod val="60000"/>
-              <a:lumOff val="40000"/>
-            </a:schemeClr>
-          </a:solidFill>
-          <a:ln w="19050">
-            <a:solidFill>
-              <a:schemeClr val="accent4">
-                <a:lumMod val="60000"/>
-                <a:lumOff val="40000"/>
-              </a:schemeClr>
-            </a:solidFill>
-          </a:ln>
-          <a:effectLst/>
-        </p:spPr>
-        <p:style>
-          <a:lnRef idx="1">
-            <a:schemeClr val="accent2"/>
-          </a:lnRef>
-          <a:fillRef idx="2">
-            <a:schemeClr val="accent2"/>
-          </a:fillRef>
-          <a:effectRef idx="1">
-            <a:schemeClr val="accent2"/>
-          </a:effectRef>
-          <a:fontRef idx="minor">
-            <a:schemeClr val="dk1"/>
-          </a:fontRef>
-        </p:style>
-        <p:txBody>
-          <a:bodyPr rtlCol="0" anchor="ctr"/>
-          <a:lstStyle/>
-          <a:p>
-            <a:pPr algn="ctr"/>
-            <a:r>
-              <a:rPr lang="en-US" sz="1600" dirty="0">
-                <a:solidFill>
-                  <a:schemeClr val="bg1"/>
-                </a:solidFill>
-              </a:rPr>
-              <a:t>:Model</a:t>
-            </a:r>
-            <a:endParaRPr lang="en-SG" sz="1600" dirty="0">
-              <a:solidFill>
-                <a:schemeClr val="bg1"/>
-              </a:solidFill>
-            </a:endParaRPr>
-          </a:p>
-        </p:txBody>
-      </p:sp>
-      <p:cxnSp>
-        <p:nvCxnSpPr>
-          <p:cNvPr id="64" name="Straight Arrow Connector 63"/>
-          <p:cNvCxnSpPr/>
-          <p:nvPr/>
-        </p:nvCxnSpPr>
-        <p:spPr>
-          <a:xfrm>
-            <a:off x="1653251" y="4495317"/>
-            <a:ext cx="5043123" cy="0"/>
-          </a:xfrm>
-          <a:prstGeom prst="straightConnector1">
-            <a:avLst/>
-          </a:prstGeom>
-          <a:ln w="19050">
-            <a:solidFill>
-              <a:srgbClr val="0070C0"/>
-            </a:solidFill>
-            <a:tailEnd type="arrow"/>
-          </a:ln>
-        </p:spPr>
-        <p:style>
-          <a:lnRef idx="1">
-            <a:schemeClr val="accent1"/>
-          </a:lnRef>
-          <a:fillRef idx="0">
-            <a:schemeClr val="accent1"/>
-          </a:fillRef>
-          <a:effectRef idx="0">
-            <a:schemeClr val="accent1"/>
-          </a:effectRef>
-          <a:fontRef idx="minor">
-            <a:schemeClr val="tx1"/>
-          </a:fontRef>
-        </p:style>
-      </p:cxnSp>
-      <p:sp>
-        <p:nvSpPr>
-          <p:cNvPr id="65" name="Rectangle 64"/>
-          <p:cNvSpPr/>
-          <p:nvPr/>
-        </p:nvSpPr>
-        <p:spPr>
-          <a:xfrm>
-            <a:off x="6687452" y="4467000"/>
-            <a:ext cx="161322" cy="1019400"/>
+            <a:off x="8061730" y="3688574"/>
+            <a:ext cx="190981" cy="2447550"/>
           </a:xfrm>
           <a:prstGeom prst="rect">
             <a:avLst/>
@@ -4422,188 +5624,22 @@
       </p:sp>
       <p:cxnSp>
         <p:nvCxnSpPr>
-          <p:cNvPr id="71" name="Straight Connector 70"/>
-          <p:cNvCxnSpPr/>
+          <p:cNvPr id="74" name="Straight Arrow Connector 73">
+            <a:extLst>
+              <a:ext uri="{FF2B5EF4-FFF2-40B4-BE49-F238E27FC236}">
+                <a16:creationId xmlns:a16="http://schemas.microsoft.com/office/drawing/2014/main" id="{FE4EBA88-AA6C-4568-8D61-B317EB2C29B2}"/>
+              </a:ext>
+            </a:extLst>
+          </p:cNvPr>
+          <p:cNvCxnSpPr>
+            <a:cxnSpLocks/>
+          </p:cNvCxnSpPr>
           <p:nvPr/>
         </p:nvCxnSpPr>
         <p:spPr>
           <a:xfrm>
-            <a:off x="8781148" y="2700858"/>
-            <a:ext cx="0" cy="2830598"/>
-          </a:xfrm>
-          <a:prstGeom prst="line">
-            <a:avLst/>
-          </a:prstGeom>
-          <a:ln w="19050">
-            <a:solidFill>
-              <a:schemeClr val="accent4">
-                <a:lumMod val="60000"/>
-                <a:lumOff val="40000"/>
-              </a:schemeClr>
-            </a:solidFill>
-            <a:prstDash val="sysDash"/>
-          </a:ln>
-          <a:effectLst/>
-        </p:spPr>
-        <p:style>
-          <a:lnRef idx="1">
-            <a:schemeClr val="accent1"/>
-          </a:lnRef>
-          <a:fillRef idx="2">
-            <a:schemeClr val="accent1"/>
-          </a:fillRef>
-          <a:effectRef idx="1">
-            <a:schemeClr val="accent1"/>
-          </a:effectRef>
-          <a:fontRef idx="minor">
-            <a:schemeClr val="dk1"/>
-          </a:fontRef>
-        </p:style>
-      </p:cxnSp>
-      <p:sp>
-        <p:nvSpPr>
-          <p:cNvPr id="73" name="Rectangle 72"/>
-          <p:cNvSpPr/>
-          <p:nvPr/>
-        </p:nvSpPr>
-        <p:spPr>
-          <a:xfrm>
-            <a:off x="8686800" y="4524597"/>
-            <a:ext cx="152400" cy="199803"/>
-          </a:xfrm>
-          <a:prstGeom prst="rect">
-            <a:avLst/>
-          </a:prstGeom>
-          <a:solidFill>
-            <a:schemeClr val="accent4">
-              <a:lumMod val="60000"/>
-              <a:lumOff val="40000"/>
-            </a:schemeClr>
-          </a:solidFill>
-          <a:ln>
-            <a:solidFill>
-              <a:schemeClr val="accent4">
-                <a:lumMod val="60000"/>
-                <a:lumOff val="40000"/>
-              </a:schemeClr>
-            </a:solidFill>
-          </a:ln>
-          <a:effectLst/>
-        </p:spPr>
-        <p:style>
-          <a:lnRef idx="1">
-            <a:schemeClr val="accent3"/>
-          </a:lnRef>
-          <a:fillRef idx="2">
-            <a:schemeClr val="accent3"/>
-          </a:fillRef>
-          <a:effectRef idx="1">
-            <a:schemeClr val="accent3"/>
-          </a:effectRef>
-          <a:fontRef idx="minor">
-            <a:schemeClr val="dk1"/>
-          </a:fontRef>
-        </p:style>
-        <p:txBody>
-          <a:bodyPr rtlCol="0" anchor="ctr"/>
-          <a:lstStyle/>
-          <a:p>
-            <a:pPr algn="ctr"/>
-            <a:endParaRPr lang="en-SG" sz="1400">
-              <a:solidFill>
-                <a:schemeClr val="dk1"/>
-              </a:solidFill>
-            </a:endParaRPr>
-          </a:p>
-        </p:txBody>
-      </p:sp>
-      <p:cxnSp>
-        <p:nvCxnSpPr>
-          <p:cNvPr id="75" name="Straight Arrow Connector 74"/>
-          <p:cNvCxnSpPr/>
-          <p:nvPr/>
-        </p:nvCxnSpPr>
-        <p:spPr>
-          <a:xfrm>
-            <a:off x="6850663" y="4524597"/>
-            <a:ext cx="1836137" cy="0"/>
-          </a:xfrm>
-          <a:prstGeom prst="straightConnector1">
-            <a:avLst/>
-          </a:prstGeom>
-          <a:ln w="19050">
-            <a:solidFill>
-              <a:srgbClr val="0070C0"/>
-            </a:solidFill>
-            <a:tailEnd type="arrow"/>
-          </a:ln>
-        </p:spPr>
-        <p:style>
-          <a:lnRef idx="1">
-            <a:schemeClr val="accent1"/>
-          </a:lnRef>
-          <a:fillRef idx="0">
-            <a:schemeClr val="accent1"/>
-          </a:fillRef>
-          <a:effectRef idx="0">
-            <a:schemeClr val="accent1"/>
-          </a:effectRef>
-          <a:fontRef idx="minor">
-            <a:schemeClr val="tx1"/>
-          </a:fontRef>
-        </p:style>
-      </p:cxnSp>
-      <p:cxnSp>
-        <p:nvCxnSpPr>
-          <p:cNvPr id="76" name="Straight Arrow Connector 75"/>
-          <p:cNvCxnSpPr/>
-          <p:nvPr/>
-        </p:nvCxnSpPr>
-        <p:spPr>
-          <a:xfrm flipV="1">
-            <a:off x="6848774" y="4714650"/>
-            <a:ext cx="1838026" cy="9750"/>
-          </a:xfrm>
-          <a:prstGeom prst="straightConnector1">
-            <a:avLst/>
-          </a:prstGeom>
-          <a:ln w="19050">
-            <a:solidFill>
-              <a:schemeClr val="accent4">
-                <a:lumMod val="60000"/>
-                <a:lumOff val="40000"/>
-              </a:schemeClr>
-            </a:solidFill>
-            <a:prstDash val="sysDash"/>
-            <a:headEnd type="arrow" w="med" len="med"/>
-            <a:tailEnd type="none" w="med" len="med"/>
-          </a:ln>
-        </p:spPr>
-        <p:style>
-          <a:lnRef idx="1">
-            <a:schemeClr val="accent1"/>
-          </a:lnRef>
-          <a:fillRef idx="0">
-            <a:schemeClr val="accent1"/>
-          </a:fillRef>
-          <a:effectRef idx="0">
-            <a:schemeClr val="accent1"/>
-          </a:effectRef>
-          <a:fontRef idx="minor">
-            <a:schemeClr val="tx1"/>
-          </a:fontRef>
-        </p:style>
-      </p:cxnSp>
-      <p:cxnSp>
-        <p:nvCxnSpPr>
-          <p:cNvPr id="77" name="Straight Arrow Connector 76"/>
-          <p:cNvCxnSpPr/>
-          <p:nvPr/>
-        </p:nvCxnSpPr>
-        <p:spPr>
-          <a:xfrm>
-            <a:off x="1653251" y="5486400"/>
-            <a:ext cx="5052349" cy="0"/>
+            <a:off x="6858000" y="4643819"/>
+            <a:ext cx="1238123" cy="0"/>
           </a:xfrm>
           <a:prstGeom prst="straightConnector1">
             <a:avLst/>
@@ -4634,14 +5670,20 @@
       </p:cxnSp>
       <p:sp>
         <p:nvSpPr>
-          <p:cNvPr id="78" name="TextBox 77"/>
+          <p:cNvPr id="85" name="TextBox 84">
+            <a:extLst>
+              <a:ext uri="{FF2B5EF4-FFF2-40B4-BE49-F238E27FC236}">
+                <a16:creationId xmlns:a16="http://schemas.microsoft.com/office/drawing/2014/main" id="{BC881ECB-73E0-4CB0-9190-4F60750FF1B8}"/>
+              </a:ext>
+            </a:extLst>
+          </p:cNvPr>
           <p:cNvSpPr txBox="1"/>
           <p:nvPr/>
         </p:nvSpPr>
         <p:spPr>
           <a:xfrm>
-            <a:off x="6984957" y="4267200"/>
-            <a:ext cx="1424846" cy="215444"/>
+            <a:off x="6958251" y="4310619"/>
+            <a:ext cx="880261" cy="172098"/>
           </a:xfrm>
           <a:prstGeom prst="rect">
             <a:avLst/>
@@ -4666,34 +5708,342 @@
           </a:lstStyle>
           <a:p>
             <a:r>
-              <a:rPr lang="en-US" dirty="0" err="1">
-                <a:solidFill>
-                  <a:srgbClr val="7030A0"/>
-                </a:solidFill>
-              </a:rPr>
-              <a:t>deletePerson</a:t>
-            </a:r>
-            <a:r>
-              <a:rPr lang="en-US" dirty="0">
-                <a:solidFill>
-                  <a:srgbClr val="7030A0"/>
-                </a:solidFill>
-              </a:rPr>
-              <a:t>(p)</a:t>
-            </a:r>
-          </a:p>
-        </p:txBody>
-      </p:sp>
-      <p:sp>
-        <p:nvSpPr>
-          <p:cNvPr id="79" name="TextBox 78"/>
+              <a:rPr lang="en-US" sz="1100" dirty="0" err="1"/>
+              <a:t>getName</a:t>
+            </a:r>
+            <a:r>
+              <a:rPr lang="en-US" sz="1100" dirty="0"/>
+              <a:t>()</a:t>
+            </a:r>
+          </a:p>
+        </p:txBody>
+      </p:sp>
+      <p:cxnSp>
+        <p:nvCxnSpPr>
+          <p:cNvPr id="87" name="Straight Arrow Connector 86">
+            <a:extLst>
+              <a:ext uri="{FF2B5EF4-FFF2-40B4-BE49-F238E27FC236}">
+                <a16:creationId xmlns:a16="http://schemas.microsoft.com/office/drawing/2014/main" id="{2EE1B2E7-AB87-47FD-9862-8934F97F2DB3}"/>
+              </a:ext>
+            </a:extLst>
+          </p:cNvPr>
+          <p:cNvCxnSpPr>
+            <a:cxnSpLocks/>
+          </p:cNvCxnSpPr>
+          <p:nvPr/>
+        </p:nvCxnSpPr>
+        <p:spPr>
+          <a:xfrm>
+            <a:off x="6858000" y="4865684"/>
+            <a:ext cx="1246078" cy="0"/>
+          </a:xfrm>
+          <a:prstGeom prst="straightConnector1">
+            <a:avLst/>
+          </a:prstGeom>
+          <a:ln w="19050">
+            <a:headEnd type="none" w="med" len="med"/>
+            <a:tailEnd type="arrow" w="med" len="med"/>
+          </a:ln>
+        </p:spPr>
+        <p:style>
+          <a:lnRef idx="1">
+            <a:schemeClr val="accent1"/>
+          </a:lnRef>
+          <a:fillRef idx="0">
+            <a:schemeClr val="accent1"/>
+          </a:fillRef>
+          <a:effectRef idx="0">
+            <a:schemeClr val="accent1"/>
+          </a:effectRef>
+          <a:fontRef idx="minor">
+            <a:schemeClr val="tx1"/>
+          </a:fontRef>
+        </p:style>
+      </p:cxnSp>
+      <p:cxnSp>
+        <p:nvCxnSpPr>
+          <p:cNvPr id="88" name="Straight Arrow Connector 87">
+            <a:extLst>
+              <a:ext uri="{FF2B5EF4-FFF2-40B4-BE49-F238E27FC236}">
+                <a16:creationId xmlns:a16="http://schemas.microsoft.com/office/drawing/2014/main" id="{7B3FD093-3F6C-488F-BBB1-0826209A6E07}"/>
+              </a:ext>
+            </a:extLst>
+          </p:cNvPr>
+          <p:cNvCxnSpPr>
+            <a:cxnSpLocks/>
+          </p:cNvCxnSpPr>
+          <p:nvPr/>
+        </p:nvCxnSpPr>
+        <p:spPr>
+          <a:xfrm>
+            <a:off x="6865734" y="5470767"/>
+            <a:ext cx="1238123" cy="0"/>
+          </a:xfrm>
+          <a:prstGeom prst="straightConnector1">
+            <a:avLst/>
+          </a:prstGeom>
+          <a:ln w="19050">
+            <a:headEnd type="none" w="med" len="med"/>
+            <a:tailEnd type="arrow" w="med" len="med"/>
+          </a:ln>
+        </p:spPr>
+        <p:style>
+          <a:lnRef idx="1">
+            <a:schemeClr val="accent1"/>
+          </a:lnRef>
+          <a:fillRef idx="0">
+            <a:schemeClr val="accent1"/>
+          </a:fillRef>
+          <a:effectRef idx="0">
+            <a:schemeClr val="accent1"/>
+          </a:effectRef>
+          <a:fontRef idx="minor">
+            <a:schemeClr val="tx1"/>
+          </a:fontRef>
+        </p:style>
+      </p:cxnSp>
+      <p:cxnSp>
+        <p:nvCxnSpPr>
+          <p:cNvPr id="89" name="Straight Arrow Connector 88">
+            <a:extLst>
+              <a:ext uri="{FF2B5EF4-FFF2-40B4-BE49-F238E27FC236}">
+                <a16:creationId xmlns:a16="http://schemas.microsoft.com/office/drawing/2014/main" id="{754618BB-D36A-4E78-A54E-197A9A10E854}"/>
+              </a:ext>
+            </a:extLst>
+          </p:cNvPr>
+          <p:cNvCxnSpPr>
+            <a:cxnSpLocks/>
+          </p:cNvCxnSpPr>
+          <p:nvPr/>
+        </p:nvCxnSpPr>
+        <p:spPr>
+          <a:xfrm>
+            <a:off x="6865734" y="5791198"/>
+            <a:ext cx="1238123" cy="0"/>
+          </a:xfrm>
+          <a:prstGeom prst="straightConnector1">
+            <a:avLst/>
+          </a:prstGeom>
+          <a:ln w="19050">
+            <a:headEnd type="none" w="med" len="med"/>
+            <a:tailEnd type="arrow" w="med" len="med"/>
+          </a:ln>
+        </p:spPr>
+        <p:style>
+          <a:lnRef idx="1">
+            <a:schemeClr val="accent1"/>
+          </a:lnRef>
+          <a:fillRef idx="0">
+            <a:schemeClr val="accent1"/>
+          </a:fillRef>
+          <a:effectRef idx="0">
+            <a:schemeClr val="accent1"/>
+          </a:effectRef>
+          <a:fontRef idx="minor">
+            <a:schemeClr val="tx1"/>
+          </a:fontRef>
+        </p:style>
+      </p:cxnSp>
+      <p:cxnSp>
+        <p:nvCxnSpPr>
+          <p:cNvPr id="94" name="Straight Arrow Connector 93">
+            <a:extLst>
+              <a:ext uri="{FF2B5EF4-FFF2-40B4-BE49-F238E27FC236}">
+                <a16:creationId xmlns:a16="http://schemas.microsoft.com/office/drawing/2014/main" id="{4932F99B-F0C3-4719-89B9-3545796D137B}"/>
+              </a:ext>
+            </a:extLst>
+          </p:cNvPr>
+          <p:cNvCxnSpPr>
+            <a:cxnSpLocks/>
+          </p:cNvCxnSpPr>
+          <p:nvPr/>
+        </p:nvCxnSpPr>
+        <p:spPr>
+          <a:xfrm>
+            <a:off x="6848774" y="4953000"/>
+            <a:ext cx="1238123" cy="0"/>
+          </a:xfrm>
+          <a:prstGeom prst="straightConnector1">
+            <a:avLst/>
+          </a:prstGeom>
+          <a:ln w="19050">
+            <a:solidFill>
+              <a:srgbClr val="0070C0"/>
+            </a:solidFill>
+            <a:prstDash val="sysDash"/>
+            <a:headEnd type="arrow" w="med" len="med"/>
+            <a:tailEnd type="none" w="med" len="med"/>
+          </a:ln>
+        </p:spPr>
+        <p:style>
+          <a:lnRef idx="1">
+            <a:schemeClr val="accent1"/>
+          </a:lnRef>
+          <a:fillRef idx="0">
+            <a:schemeClr val="accent1"/>
+          </a:fillRef>
+          <a:effectRef idx="0">
+            <a:schemeClr val="accent1"/>
+          </a:effectRef>
+          <a:fontRef idx="minor">
+            <a:schemeClr val="tx1"/>
+          </a:fontRef>
+        </p:style>
+      </p:cxnSp>
+      <p:cxnSp>
+        <p:nvCxnSpPr>
+          <p:cNvPr id="95" name="Straight Arrow Connector 94">
+            <a:extLst>
+              <a:ext uri="{FF2B5EF4-FFF2-40B4-BE49-F238E27FC236}">
+                <a16:creationId xmlns:a16="http://schemas.microsoft.com/office/drawing/2014/main" id="{0AABEDA5-124E-41AA-A3AF-FB4B0BB03262}"/>
+              </a:ext>
+            </a:extLst>
+          </p:cNvPr>
+          <p:cNvCxnSpPr>
+            <a:cxnSpLocks/>
+          </p:cNvCxnSpPr>
+          <p:nvPr/>
+        </p:nvCxnSpPr>
+        <p:spPr>
+          <a:xfrm>
+            <a:off x="6848774" y="5253419"/>
+            <a:ext cx="1238123" cy="0"/>
+          </a:xfrm>
+          <a:prstGeom prst="straightConnector1">
+            <a:avLst/>
+          </a:prstGeom>
+          <a:ln w="19050">
+            <a:solidFill>
+              <a:srgbClr val="0070C0"/>
+            </a:solidFill>
+            <a:prstDash val="sysDash"/>
+            <a:headEnd type="arrow" w="med" len="med"/>
+            <a:tailEnd type="none" w="med" len="med"/>
+          </a:ln>
+        </p:spPr>
+        <p:style>
+          <a:lnRef idx="1">
+            <a:schemeClr val="accent1"/>
+          </a:lnRef>
+          <a:fillRef idx="0">
+            <a:schemeClr val="accent1"/>
+          </a:fillRef>
+          <a:effectRef idx="0">
+            <a:schemeClr val="accent1"/>
+          </a:effectRef>
+          <a:fontRef idx="minor">
+            <a:schemeClr val="tx1"/>
+          </a:fontRef>
+        </p:style>
+      </p:cxnSp>
+      <p:cxnSp>
+        <p:nvCxnSpPr>
+          <p:cNvPr id="96" name="Straight Arrow Connector 95">
+            <a:extLst>
+              <a:ext uri="{FF2B5EF4-FFF2-40B4-BE49-F238E27FC236}">
+                <a16:creationId xmlns:a16="http://schemas.microsoft.com/office/drawing/2014/main" id="{9CB15655-ED21-4CCF-BA5D-1D277BE55C20}"/>
+              </a:ext>
+            </a:extLst>
+          </p:cNvPr>
+          <p:cNvCxnSpPr>
+            <a:cxnSpLocks/>
+          </p:cNvCxnSpPr>
+          <p:nvPr/>
+        </p:nvCxnSpPr>
+        <p:spPr>
+          <a:xfrm>
+            <a:off x="6865734" y="5867400"/>
+            <a:ext cx="1238123" cy="0"/>
+          </a:xfrm>
+          <a:prstGeom prst="straightConnector1">
+            <a:avLst/>
+          </a:prstGeom>
+          <a:ln w="19050">
+            <a:solidFill>
+              <a:srgbClr val="0070C0"/>
+            </a:solidFill>
+            <a:prstDash val="sysDash"/>
+            <a:headEnd type="arrow" w="med" len="med"/>
+            <a:tailEnd type="none" w="med" len="med"/>
+          </a:ln>
+        </p:spPr>
+        <p:style>
+          <a:lnRef idx="1">
+            <a:schemeClr val="accent1"/>
+          </a:lnRef>
+          <a:fillRef idx="0">
+            <a:schemeClr val="accent1"/>
+          </a:fillRef>
+          <a:effectRef idx="0">
+            <a:schemeClr val="accent1"/>
+          </a:effectRef>
+          <a:fontRef idx="minor">
+            <a:schemeClr val="tx1"/>
+          </a:fontRef>
+        </p:style>
+      </p:cxnSp>
+      <p:cxnSp>
+        <p:nvCxnSpPr>
+          <p:cNvPr id="97" name="Straight Arrow Connector 96">
+            <a:extLst>
+              <a:ext uri="{FF2B5EF4-FFF2-40B4-BE49-F238E27FC236}">
+                <a16:creationId xmlns:a16="http://schemas.microsoft.com/office/drawing/2014/main" id="{C54CA46B-DF40-4A7D-98BB-760A45897223}"/>
+              </a:ext>
+            </a:extLst>
+          </p:cNvPr>
+          <p:cNvCxnSpPr>
+            <a:cxnSpLocks/>
+          </p:cNvCxnSpPr>
+          <p:nvPr/>
+        </p:nvCxnSpPr>
+        <p:spPr>
+          <a:xfrm>
+            <a:off x="6848774" y="5541883"/>
+            <a:ext cx="1238123" cy="0"/>
+          </a:xfrm>
+          <a:prstGeom prst="straightConnector1">
+            <a:avLst/>
+          </a:prstGeom>
+          <a:ln w="19050">
+            <a:solidFill>
+              <a:srgbClr val="0070C0"/>
+            </a:solidFill>
+            <a:prstDash val="sysDash"/>
+            <a:headEnd type="arrow" w="med" len="med"/>
+            <a:tailEnd type="none" w="med" len="med"/>
+          </a:ln>
+        </p:spPr>
+        <p:style>
+          <a:lnRef idx="1">
+            <a:schemeClr val="accent1"/>
+          </a:lnRef>
+          <a:fillRef idx="0">
+            <a:schemeClr val="accent1"/>
+          </a:fillRef>
+          <a:effectRef idx="0">
+            <a:schemeClr val="accent1"/>
+          </a:effectRef>
+          <a:fontRef idx="minor">
+            <a:schemeClr val="tx1"/>
+          </a:fontRef>
+        </p:style>
+      </p:cxnSp>
+      <p:sp>
+        <p:nvSpPr>
+          <p:cNvPr id="99" name="TextBox 98">
+            <a:extLst>
+              <a:ext uri="{FF2B5EF4-FFF2-40B4-BE49-F238E27FC236}">
+                <a16:creationId xmlns:a16="http://schemas.microsoft.com/office/drawing/2014/main" id="{907D9DF0-6C04-40B6-BCF0-732BB4023101}"/>
+              </a:ext>
+            </a:extLst>
+          </p:cNvPr>
           <p:cNvSpPr txBox="1"/>
           <p:nvPr/>
         </p:nvSpPr>
         <p:spPr>
           <a:xfrm>
-            <a:off x="3847551" y="3657600"/>
-            <a:ext cx="767033" cy="184666"/>
+            <a:off x="6890804" y="4960847"/>
+            <a:ext cx="880261" cy="172098"/>
           </a:xfrm>
           <a:prstGeom prst="rect">
             <a:avLst/>
@@ -4718,22 +6068,32 @@
           </a:lstStyle>
           <a:p>
             <a:r>
-              <a:rPr lang="en-US" sz="1200" dirty="0"/>
-              <a:t>parse(“1”)</a:t>
-            </a:r>
-          </a:p>
-        </p:txBody>
-      </p:sp>
-      <p:sp>
-        <p:nvSpPr>
-          <p:cNvPr id="80" name="TextBox 79"/>
+              <a:rPr lang="en-US" sz="1100" dirty="0" err="1"/>
+              <a:t>getDate</a:t>
+            </a:r>
+            <a:r>
+              <a:rPr lang="en-US" sz="1100" dirty="0"/>
+              <a:t>()</a:t>
+            </a:r>
+          </a:p>
+        </p:txBody>
+      </p:sp>
+      <p:sp>
+        <p:nvSpPr>
+          <p:cNvPr id="100" name="TextBox 99">
+            <a:extLst>
+              <a:ext uri="{FF2B5EF4-FFF2-40B4-BE49-F238E27FC236}">
+                <a16:creationId xmlns:a16="http://schemas.microsoft.com/office/drawing/2014/main" id="{964AC095-4E4E-4726-BE6C-2DAD8A41F604}"/>
+              </a:ext>
+            </a:extLst>
+          </p:cNvPr>
           <p:cNvSpPr txBox="1"/>
           <p:nvPr/>
         </p:nvSpPr>
         <p:spPr>
           <a:xfrm>
-            <a:off x="1742982" y="2850922"/>
-            <a:ext cx="1424846" cy="215444"/>
+            <a:off x="6917700" y="5262181"/>
+            <a:ext cx="1012007" cy="172098"/>
           </a:xfrm>
           <a:prstGeom prst="rect">
             <a:avLst/>
@@ -4758,22 +6118,32 @@
           </a:lstStyle>
           <a:p>
             <a:r>
-              <a:rPr lang="en-US" dirty="0"/>
-              <a:t>parse(“delete 1”)</a:t>
-            </a:r>
-          </a:p>
-        </p:txBody>
-      </p:sp>
-      <p:sp>
-        <p:nvSpPr>
-          <p:cNvPr id="82" name="TextBox 81"/>
+              <a:rPr lang="en-US" sz="1100" dirty="0" err="1"/>
+              <a:t>getPhoneNum</a:t>
+            </a:r>
+            <a:r>
+              <a:rPr lang="en-US" sz="1100" dirty="0"/>
+              <a:t>()</a:t>
+            </a:r>
+          </a:p>
+        </p:txBody>
+      </p:sp>
+      <p:sp>
+        <p:nvSpPr>
+          <p:cNvPr id="101" name="TextBox 100">
+            <a:extLst>
+              <a:ext uri="{FF2B5EF4-FFF2-40B4-BE49-F238E27FC236}">
+                <a16:creationId xmlns:a16="http://schemas.microsoft.com/office/drawing/2014/main" id="{38E4ABE1-6660-4D39-98D5-670119D969A6}"/>
+              </a:ext>
+            </a:extLst>
+          </p:cNvPr>
           <p:cNvSpPr txBox="1"/>
           <p:nvPr/>
         </p:nvSpPr>
         <p:spPr>
           <a:xfrm>
-            <a:off x="4340137" y="5255323"/>
-            <a:ext cx="621216" cy="215444"/>
+            <a:off x="6910249" y="5572944"/>
+            <a:ext cx="1086388" cy="172098"/>
           </a:xfrm>
           <a:prstGeom prst="rect">
             <a:avLst/>
@@ -4798,22 +6168,32 @@
           </a:lstStyle>
           <a:p>
             <a:r>
-              <a:rPr lang="en-US" dirty="0"/>
-              <a:t>result</a:t>
-            </a:r>
-          </a:p>
-        </p:txBody>
-      </p:sp>
-      <p:sp>
-        <p:nvSpPr>
-          <p:cNvPr id="83" name="TextBox 82"/>
+              <a:rPr lang="en-US" sz="1100" dirty="0" err="1"/>
+              <a:t>getPersonName</a:t>
+            </a:r>
+            <a:r>
+              <a:rPr lang="en-US" sz="1100" dirty="0"/>
+              <a:t>()</a:t>
+            </a:r>
+          </a:p>
+        </p:txBody>
+      </p:sp>
+      <p:sp>
+        <p:nvSpPr>
+          <p:cNvPr id="102" name="TextBox 101">
+            <a:extLst>
+              <a:ext uri="{FF2B5EF4-FFF2-40B4-BE49-F238E27FC236}">
+                <a16:creationId xmlns:a16="http://schemas.microsoft.com/office/drawing/2014/main" id="{89AC86D6-E4E0-4ACD-9D34-1C3CD09A1281}"/>
+              </a:ext>
+            </a:extLst>
+          </p:cNvPr>
           <p:cNvSpPr txBox="1"/>
           <p:nvPr/>
         </p:nvSpPr>
         <p:spPr>
           <a:xfrm>
-            <a:off x="599983" y="5538488"/>
-            <a:ext cx="762000" cy="215444"/>
+            <a:off x="6902641" y="4660984"/>
+            <a:ext cx="880261" cy="172098"/>
           </a:xfrm>
           <a:prstGeom prst="rect">
             <a:avLst/>
@@ -4838,136 +6218,34 @@
           </a:lstStyle>
           <a:p>
             <a:r>
-              <a:rPr lang="en-US" dirty="0"/>
-              <a:t>result</a:t>
-            </a:r>
-          </a:p>
-        </p:txBody>
-      </p:sp>
-      <p:sp>
-        <p:nvSpPr>
-          <p:cNvPr id="84" name="Rectangle 62"/>
-          <p:cNvSpPr/>
-          <p:nvPr/>
-        </p:nvSpPr>
-        <p:spPr>
-          <a:xfrm>
-            <a:off x="7020246" y="4777286"/>
-            <a:ext cx="1590354" cy="461538"/>
-          </a:xfrm>
-          <a:prstGeom prst="rect">
-            <a:avLst/>
-          </a:prstGeom>
-          <a:solidFill>
-            <a:srgbClr val="0070C0"/>
-          </a:solidFill>
-          <a:ln w="19050">
-            <a:solidFill>
-              <a:srgbClr val="0070C0"/>
-            </a:solidFill>
-          </a:ln>
-          <a:effectLst/>
-        </p:spPr>
-        <p:style>
-          <a:lnRef idx="1">
-            <a:schemeClr val="accent2"/>
-          </a:lnRef>
-          <a:fillRef idx="2">
-            <a:schemeClr val="accent2"/>
-          </a:fillRef>
-          <a:effectRef idx="1">
-            <a:schemeClr val="accent2"/>
-          </a:effectRef>
-          <a:fontRef idx="minor">
-            <a:schemeClr val="dk1"/>
-          </a:fontRef>
-        </p:style>
-        <p:txBody>
-          <a:bodyPr rtlCol="0" anchor="ctr"/>
-          <a:lstStyle/>
-          <a:p>
-            <a:pPr algn="ctr"/>
-            <a:r>
-              <a:rPr lang="en-US" sz="1600" dirty="0" err="1">
-                <a:solidFill>
-                  <a:schemeClr val="bg1"/>
-                </a:solidFill>
-              </a:rPr>
-              <a:t>result:Command</a:t>
-            </a:r>
-            <a:r>
-              <a:rPr lang="en-US" sz="1600" dirty="0">
-                <a:solidFill>
-                  <a:schemeClr val="bg1"/>
-                </a:solidFill>
-              </a:rPr>
-              <a:t> Result</a:t>
-            </a:r>
-            <a:endParaRPr lang="en-SG" sz="1600" dirty="0">
-              <a:solidFill>
-                <a:schemeClr val="bg1"/>
-              </a:solidFill>
-            </a:endParaRPr>
-          </a:p>
-        </p:txBody>
-      </p:sp>
-      <p:sp>
-        <p:nvSpPr>
-          <p:cNvPr id="86" name="Rectangle 85"/>
-          <p:cNvSpPr/>
-          <p:nvPr/>
-        </p:nvSpPr>
-        <p:spPr>
-          <a:xfrm>
-            <a:off x="7777323" y="5238824"/>
-            <a:ext cx="152400" cy="171376"/>
-          </a:xfrm>
-          <a:prstGeom prst="rect">
-            <a:avLst/>
-          </a:prstGeom>
-          <a:solidFill>
-            <a:srgbClr val="0070C0"/>
-          </a:solidFill>
-          <a:ln>
-            <a:solidFill>
-              <a:srgbClr val="0070C0"/>
-            </a:solidFill>
-          </a:ln>
-          <a:effectLst/>
-        </p:spPr>
-        <p:style>
-          <a:lnRef idx="1">
-            <a:schemeClr val="accent3"/>
-          </a:lnRef>
-          <a:fillRef idx="2">
-            <a:schemeClr val="accent3"/>
-          </a:fillRef>
-          <a:effectRef idx="1">
-            <a:schemeClr val="accent3"/>
-          </a:effectRef>
-          <a:fontRef idx="minor">
-            <a:schemeClr val="dk1"/>
-          </a:fontRef>
-        </p:style>
-        <p:txBody>
-          <a:bodyPr rtlCol="0" anchor="ctr"/>
-          <a:lstStyle/>
-          <a:p>
-            <a:pPr algn="ctr"/>
-            <a:endParaRPr lang="en-SG" sz="1400"/>
+              <a:rPr lang="en-US" sz="1100" dirty="0" err="1"/>
+              <a:t>getPlace</a:t>
+            </a:r>
+            <a:r>
+              <a:rPr lang="en-US" sz="1100" dirty="0"/>
+              <a:t>()</a:t>
+            </a:r>
           </a:p>
         </p:txBody>
       </p:sp>
       <p:cxnSp>
         <p:nvCxnSpPr>
-          <p:cNvPr id="90" name="Straight Arrow Connector 89"/>
-          <p:cNvCxnSpPr/>
+          <p:cNvPr id="103" name="Straight Arrow Connector 102">
+            <a:extLst>
+              <a:ext uri="{FF2B5EF4-FFF2-40B4-BE49-F238E27FC236}">
+                <a16:creationId xmlns:a16="http://schemas.microsoft.com/office/drawing/2014/main" id="{D58534BF-6AB2-48D8-9007-B92609318895}"/>
+              </a:ext>
+            </a:extLst>
+          </p:cNvPr>
+          <p:cNvCxnSpPr>
+            <a:cxnSpLocks/>
+          </p:cNvCxnSpPr>
           <p:nvPr/>
         </p:nvCxnSpPr>
         <p:spPr>
           <a:xfrm>
-            <a:off x="6858000" y="5410200"/>
-            <a:ext cx="966624" cy="0"/>
+            <a:off x="3407978" y="6086062"/>
+            <a:ext cx="1688250" cy="0"/>
           </a:xfrm>
           <a:prstGeom prst="straightConnector1">
             <a:avLst/>
@@ -4998,14 +6276,20 @@
       </p:cxnSp>
       <p:sp>
         <p:nvSpPr>
-          <p:cNvPr id="93" name="TextBox 92"/>
+          <p:cNvPr id="104" name="TextBox 103">
+            <a:extLst>
+              <a:ext uri="{FF2B5EF4-FFF2-40B4-BE49-F238E27FC236}">
+                <a16:creationId xmlns:a16="http://schemas.microsoft.com/office/drawing/2014/main" id="{8901A785-2CE2-4B92-B2DA-914344C1A2A1}"/>
+              </a:ext>
+            </a:extLst>
+          </p:cNvPr>
           <p:cNvSpPr txBox="1"/>
           <p:nvPr/>
         </p:nvSpPr>
         <p:spPr>
           <a:xfrm>
-            <a:off x="2673845" y="4027787"/>
-            <a:ext cx="220343" cy="215444"/>
+            <a:off x="5237896" y="3745876"/>
+            <a:ext cx="880261" cy="140807"/>
           </a:xfrm>
           <a:prstGeom prst="rect">
             <a:avLst/>
@@ -5030,437 +6314,12 @@
           </a:lstStyle>
           <a:p>
             <a:r>
-              <a:rPr lang="en-US" dirty="0"/>
-              <a:t>d</a:t>
-            </a:r>
-          </a:p>
-        </p:txBody>
-      </p:sp>
-      <p:sp>
-        <p:nvSpPr>
-          <p:cNvPr id="40" name="Rectangle 62"/>
-          <p:cNvSpPr/>
-          <p:nvPr/>
-        </p:nvSpPr>
-        <p:spPr>
-          <a:xfrm>
-            <a:off x="4231981" y="2929839"/>
-            <a:ext cx="1778201" cy="432035"/>
-          </a:xfrm>
-          <a:prstGeom prst="rect">
-            <a:avLst/>
-          </a:prstGeom>
-          <a:solidFill>
-            <a:srgbClr val="0070C0"/>
-          </a:solidFill>
-          <a:ln w="19050">
-            <a:solidFill>
-              <a:srgbClr val="0070C0"/>
-            </a:solidFill>
-          </a:ln>
-          <a:effectLst/>
-        </p:spPr>
-        <p:style>
-          <a:lnRef idx="1">
-            <a:schemeClr val="accent2"/>
-          </a:lnRef>
-          <a:fillRef idx="2">
-            <a:schemeClr val="accent2"/>
-          </a:fillRef>
-          <a:effectRef idx="1">
-            <a:schemeClr val="accent2"/>
-          </a:effectRef>
-          <a:fontRef idx="minor">
-            <a:schemeClr val="dk1"/>
-          </a:fontRef>
-        </p:style>
-        <p:txBody>
-          <a:bodyPr rtlCol="0" anchor="ctr"/>
-          <a:lstStyle/>
-          <a:p>
-            <a:pPr algn="ctr"/>
-            <a:r>
-              <a:rPr lang="en-US" sz="1600" dirty="0">
-                <a:solidFill>
-                  <a:schemeClr val="bg1"/>
-                </a:solidFill>
-              </a:rPr>
-              <a:t>:</a:t>
-            </a:r>
-            <a:r>
-              <a:rPr lang="en-US" sz="1600" dirty="0" err="1">
-                <a:solidFill>
-                  <a:schemeClr val="bg1"/>
-                </a:solidFill>
-              </a:rPr>
-              <a:t>DeleteCommand</a:t>
-            </a:r>
-            <a:endParaRPr lang="en-US" sz="1600" dirty="0">
-              <a:solidFill>
-                <a:schemeClr val="bg1"/>
-              </a:solidFill>
-            </a:endParaRPr>
-          </a:p>
-          <a:p>
-            <a:pPr algn="ctr"/>
-            <a:r>
-              <a:rPr lang="en-US" sz="1600" dirty="0">
-                <a:solidFill>
-                  <a:schemeClr val="bg1"/>
-                </a:solidFill>
-              </a:rPr>
-              <a:t>Parser</a:t>
-            </a:r>
-            <a:endParaRPr lang="en-SG" sz="1600" dirty="0">
-              <a:solidFill>
-                <a:schemeClr val="bg1"/>
-              </a:solidFill>
-            </a:endParaRPr>
-          </a:p>
-        </p:txBody>
-      </p:sp>
-      <p:cxnSp>
-        <p:nvCxnSpPr>
-          <p:cNvPr id="8" name="Straight Arrow Connector 7"/>
-          <p:cNvCxnSpPr/>
-          <p:nvPr/>
-        </p:nvCxnSpPr>
-        <p:spPr>
-          <a:xfrm>
-            <a:off x="3462591" y="3657600"/>
-            <a:ext cx="1597356" cy="1"/>
-          </a:xfrm>
-          <a:prstGeom prst="straightConnector1">
-            <a:avLst/>
-          </a:prstGeom>
-          <a:ln w="19050">
-            <a:headEnd type="none" w="med" len="med"/>
-            <a:tailEnd type="arrow" w="med" len="med"/>
-          </a:ln>
-        </p:spPr>
-        <p:style>
-          <a:lnRef idx="1">
-            <a:schemeClr val="accent1"/>
-          </a:lnRef>
-          <a:fillRef idx="0">
-            <a:schemeClr val="accent1"/>
-          </a:fillRef>
-          <a:effectRef idx="0">
-            <a:schemeClr val="accent1"/>
-          </a:effectRef>
-          <a:fontRef idx="minor">
-            <a:schemeClr val="tx1"/>
-          </a:fontRef>
-        </p:style>
-      </p:cxnSp>
-      <p:sp>
-        <p:nvSpPr>
-          <p:cNvPr id="45" name="Rectangle 44"/>
-          <p:cNvSpPr/>
-          <p:nvPr/>
-        </p:nvSpPr>
-        <p:spPr>
-          <a:xfrm>
-            <a:off x="5059947" y="3352800"/>
-            <a:ext cx="205843" cy="123165"/>
-          </a:xfrm>
-          <a:prstGeom prst="rect">
-            <a:avLst/>
-          </a:prstGeom>
-          <a:solidFill>
-            <a:srgbClr val="0070C0"/>
-          </a:solidFill>
-          <a:ln>
-            <a:solidFill>
-              <a:srgbClr val="0070C0"/>
-            </a:solidFill>
-          </a:ln>
-          <a:effectLst/>
-        </p:spPr>
-        <p:style>
-          <a:lnRef idx="1">
-            <a:schemeClr val="accent3"/>
-          </a:lnRef>
-          <a:fillRef idx="2">
-            <a:schemeClr val="accent3"/>
-          </a:fillRef>
-          <a:effectRef idx="1">
-            <a:schemeClr val="accent3"/>
-          </a:effectRef>
-          <a:fontRef idx="minor">
-            <a:schemeClr val="dk1"/>
-          </a:fontRef>
-        </p:style>
-        <p:txBody>
-          <a:bodyPr rtlCol="0" anchor="ctr"/>
-          <a:lstStyle/>
-          <a:p>
-            <a:pPr algn="ctr"/>
-            <a:endParaRPr lang="en-SG" sz="1400"/>
-          </a:p>
-        </p:txBody>
-      </p:sp>
-      <p:cxnSp>
-        <p:nvCxnSpPr>
-          <p:cNvPr id="46" name="Straight Connector 45"/>
-          <p:cNvCxnSpPr>
-            <a:stCxn id="45" idx="0"/>
-          </p:cNvCxnSpPr>
-          <p:nvPr/>
-        </p:nvCxnSpPr>
-        <p:spPr>
-          <a:xfrm>
-            <a:off x="5162869" y="3352800"/>
-            <a:ext cx="0" cy="990600"/>
-          </a:xfrm>
-          <a:prstGeom prst="line">
-            <a:avLst/>
-          </a:prstGeom>
-          <a:ln w="19050">
-            <a:solidFill>
-              <a:srgbClr val="0070C0"/>
-            </a:solidFill>
-            <a:prstDash val="sysDash"/>
-          </a:ln>
-          <a:effectLst/>
-        </p:spPr>
-        <p:style>
-          <a:lnRef idx="1">
-            <a:schemeClr val="accent1"/>
-          </a:lnRef>
-          <a:fillRef idx="2">
-            <a:schemeClr val="accent1"/>
-          </a:fillRef>
-          <a:effectRef idx="1">
-            <a:schemeClr val="accent1"/>
-          </a:effectRef>
-          <a:fontRef idx="minor">
-            <a:schemeClr val="dk1"/>
-          </a:fontRef>
-        </p:style>
-      </p:cxnSp>
-      <p:sp>
-        <p:nvSpPr>
-          <p:cNvPr id="49" name="Rectangle 48"/>
-          <p:cNvSpPr/>
-          <p:nvPr/>
-        </p:nvSpPr>
-        <p:spPr>
-          <a:xfrm>
-            <a:off x="5059947" y="3657601"/>
-            <a:ext cx="205843" cy="533400"/>
-          </a:xfrm>
-          <a:prstGeom prst="rect">
-            <a:avLst/>
-          </a:prstGeom>
-          <a:solidFill>
-            <a:srgbClr val="0070C0"/>
-          </a:solidFill>
-          <a:ln>
-            <a:solidFill>
-              <a:srgbClr val="0070C0"/>
-            </a:solidFill>
-          </a:ln>
-          <a:effectLst/>
-        </p:spPr>
-        <p:style>
-          <a:lnRef idx="1">
-            <a:schemeClr val="accent3"/>
-          </a:lnRef>
-          <a:fillRef idx="2">
-            <a:schemeClr val="accent3"/>
-          </a:fillRef>
-          <a:effectRef idx="1">
-            <a:schemeClr val="accent3"/>
-          </a:effectRef>
-          <a:fontRef idx="minor">
-            <a:schemeClr val="dk1"/>
-          </a:fontRef>
-        </p:style>
-        <p:txBody>
-          <a:bodyPr rtlCol="0" anchor="ctr"/>
-          <a:lstStyle/>
-          <a:p>
-            <a:pPr algn="ctr"/>
-            <a:endParaRPr lang="en-SG" sz="1400"/>
-          </a:p>
-        </p:txBody>
-      </p:sp>
-      <p:cxnSp>
-        <p:nvCxnSpPr>
-          <p:cNvPr id="51" name="Straight Arrow Connector 50"/>
-          <p:cNvCxnSpPr/>
-          <p:nvPr/>
-        </p:nvCxnSpPr>
-        <p:spPr>
-          <a:xfrm>
-            <a:off x="3499382" y="4185073"/>
-            <a:ext cx="1667219" cy="0"/>
-          </a:xfrm>
-          <a:prstGeom prst="straightConnector1">
-            <a:avLst/>
-          </a:prstGeom>
-          <a:ln w="19050">
-            <a:solidFill>
-              <a:srgbClr val="0070C0"/>
-            </a:solidFill>
-            <a:prstDash val="sysDash"/>
-            <a:headEnd type="arrow" w="med" len="med"/>
-            <a:tailEnd type="none" w="med" len="med"/>
-          </a:ln>
-        </p:spPr>
-        <p:style>
-          <a:lnRef idx="1">
-            <a:schemeClr val="accent1"/>
-          </a:lnRef>
-          <a:fillRef idx="0">
-            <a:schemeClr val="accent1"/>
-          </a:fillRef>
-          <a:effectRef idx="0">
-            <a:schemeClr val="accent1"/>
-          </a:effectRef>
-          <a:fontRef idx="minor">
-            <a:schemeClr val="tx1"/>
-          </a:fontRef>
-        </p:style>
-      </p:cxnSp>
-      <p:cxnSp>
-        <p:nvCxnSpPr>
-          <p:cNvPr id="13" name="Straight Arrow Connector 12"/>
-          <p:cNvCxnSpPr/>
-          <p:nvPr/>
-        </p:nvCxnSpPr>
-        <p:spPr>
-          <a:xfrm>
-            <a:off x="6858000" y="5029200"/>
-            <a:ext cx="162246" cy="0"/>
-          </a:xfrm>
-          <a:prstGeom prst="straightConnector1">
-            <a:avLst/>
-          </a:prstGeom>
-          <a:ln w="19050">
-            <a:headEnd type="none" w="med" len="med"/>
-            <a:tailEnd type="arrow" w="med" len="med"/>
-          </a:ln>
-        </p:spPr>
-        <p:style>
-          <a:lnRef idx="1">
-            <a:schemeClr val="accent1"/>
-          </a:lnRef>
-          <a:fillRef idx="0">
-            <a:schemeClr val="accent1"/>
-          </a:fillRef>
-          <a:effectRef idx="0">
-            <a:schemeClr val="accent1"/>
-          </a:effectRef>
-          <a:fontRef idx="minor">
-            <a:schemeClr val="tx1"/>
-          </a:fontRef>
-        </p:style>
-      </p:cxnSp>
-      <p:cxnSp>
-        <p:nvCxnSpPr>
-          <p:cNvPr id="50" name="Straight Arrow Connector 49"/>
-          <p:cNvCxnSpPr/>
-          <p:nvPr/>
-        </p:nvCxnSpPr>
-        <p:spPr>
-          <a:xfrm>
-            <a:off x="3412425" y="3173004"/>
-            <a:ext cx="819556" cy="1"/>
-          </a:xfrm>
-          <a:prstGeom prst="straightConnector1">
-            <a:avLst/>
-          </a:prstGeom>
-          <a:ln w="19050">
-            <a:solidFill>
-              <a:srgbClr val="0070C0"/>
-            </a:solidFill>
-            <a:tailEnd type="arrow"/>
-          </a:ln>
-        </p:spPr>
-        <p:style>
-          <a:lnRef idx="1">
-            <a:schemeClr val="accent1"/>
-          </a:lnRef>
-          <a:fillRef idx="0">
-            <a:schemeClr val="accent1"/>
-          </a:fillRef>
-          <a:effectRef idx="0">
-            <a:schemeClr val="accent1"/>
-          </a:effectRef>
-          <a:fontRef idx="minor">
-            <a:schemeClr val="tx1"/>
-          </a:fontRef>
-        </p:style>
-      </p:cxnSp>
-      <p:cxnSp>
-        <p:nvCxnSpPr>
-          <p:cNvPr id="52" name="Straight Arrow Connector 51"/>
-          <p:cNvCxnSpPr/>
-          <p:nvPr/>
-        </p:nvCxnSpPr>
-        <p:spPr>
-          <a:xfrm>
-            <a:off x="3459519" y="3475965"/>
-            <a:ext cx="1600428" cy="0"/>
-          </a:xfrm>
-          <a:prstGeom prst="straightConnector1">
-            <a:avLst/>
-          </a:prstGeom>
-          <a:ln w="19050">
-            <a:solidFill>
-              <a:srgbClr val="0070C0"/>
-            </a:solidFill>
-            <a:prstDash val="sysDash"/>
-            <a:headEnd type="arrow" w="med" len="med"/>
-            <a:tailEnd type="none" w="med" len="med"/>
-          </a:ln>
-        </p:spPr>
-        <p:style>
-          <a:lnRef idx="1">
-            <a:schemeClr val="accent1"/>
-          </a:lnRef>
-          <a:fillRef idx="0">
-            <a:schemeClr val="accent1"/>
-          </a:fillRef>
-          <a:effectRef idx="0">
-            <a:schemeClr val="accent1"/>
-          </a:effectRef>
-          <a:fontRef idx="minor">
-            <a:schemeClr val="tx1"/>
-          </a:fontRef>
-        </p:style>
-      </p:cxnSp>
-      <p:sp>
-        <p:nvSpPr>
-          <p:cNvPr id="4" name="TextBox 3"/>
-          <p:cNvSpPr txBox="1"/>
-          <p:nvPr/>
-        </p:nvSpPr>
-        <p:spPr>
-          <a:xfrm>
-            <a:off x="5033665" y="4199590"/>
-            <a:ext cx="258404" cy="261610"/>
-          </a:xfrm>
-          <a:prstGeom prst="rect">
-            <a:avLst/>
-          </a:prstGeom>
-          <a:noFill/>
-        </p:spPr>
-        <p:txBody>
-          <a:bodyPr wrap="none" rtlCol="0">
-            <a:spAutoFit/>
-          </a:bodyPr>
-          <a:lstStyle/>
-          <a:p>
-            <a:r>
-              <a:rPr lang="en-SG" sz="1100" dirty="0">
-                <a:solidFill>
-                  <a:srgbClr val="002060"/>
-                </a:solidFill>
-              </a:rPr>
-              <a:t>X</a:t>
+              <a:rPr lang="en-US" sz="900" dirty="0" err="1"/>
+              <a:t>setConnections</a:t>
+            </a:r>
+            <a:r>
+              <a:rPr lang="en-US" sz="900" dirty="0"/>
+              <a:t>()</a:t>
             </a:r>
           </a:p>
         </p:txBody>

</xml_diff>

<commit_message>
Edited UI sequence diagram in DG
</commit_message>
<xml_diff>
--- a/docs/diagrams/LogicComponentSequenceDiagram.pptx
+++ b/docs/diagrams/LogicComponentSequenceDiagram.pptx
@@ -131,12 +131,12 @@
   <pc:docChgLst>
     <pc:chgData name="Melvin Leo" userId="fc11bf49cac66023" providerId="LiveId" clId="{F9FBB1FD-67A9-487E-BB95-4FABBE1CCBB9}"/>
     <pc:docChg chg="undo custSel modSld">
-      <pc:chgData name="Melvin Leo" userId="fc11bf49cac66023" providerId="LiveId" clId="{F9FBB1FD-67A9-487E-BB95-4FABBE1CCBB9}" dt="2017-10-22T11:21:22.654" v="451" actId="14100"/>
+      <pc:chgData name="Melvin Leo" userId="fc11bf49cac66023" providerId="LiveId" clId="{F9FBB1FD-67A9-487E-BB95-4FABBE1CCBB9}" dt="2017-10-23T14:25:44.813" v="454" actId="1076"/>
       <pc:docMkLst>
         <pc:docMk/>
       </pc:docMkLst>
       <pc:sldChg chg="addSp delSp modSp">
-        <pc:chgData name="Melvin Leo" userId="fc11bf49cac66023" providerId="LiveId" clId="{F9FBB1FD-67A9-487E-BB95-4FABBE1CCBB9}" dt="2017-10-22T11:21:22.654" v="451" actId="14100"/>
+        <pc:chgData name="Melvin Leo" userId="fc11bf49cac66023" providerId="LiveId" clId="{F9FBB1FD-67A9-487E-BB95-4FABBE1CCBB9}" dt="2017-10-23T14:25:44.813" v="454" actId="1076"/>
         <pc:sldMkLst>
           <pc:docMk/>
           <pc:sldMk cId="3945898909" sldId="267"/>
@@ -150,7 +150,7 @@
           </ac:spMkLst>
         </pc:spChg>
         <pc:spChg chg="del mod">
-          <ac:chgData name="Melvin Leo" userId="fc11bf49cac66023" providerId="LiveId" clId="{F9FBB1FD-67A9-487E-BB95-4FABBE1CCBB9}" dt="2017-10-22T11:18:21.034" v="406"/>
+          <ac:chgData name="Melvin Leo" userId="fc11bf49cac66023" providerId="LiveId" clId="{F9FBB1FD-67A9-487E-BB95-4FABBE1CCBB9}" dt="2017-10-22T11:18:21.034" v="406" actId="14100"/>
           <ac:spMkLst>
             <pc:docMk/>
             <pc:sldMk cId="3945898909" sldId="267"/>
@@ -158,7 +158,7 @@
           </ac:spMkLst>
         </pc:spChg>
         <pc:spChg chg="mod">
-          <ac:chgData name="Melvin Leo" userId="fc11bf49cac66023" providerId="LiveId" clId="{F9FBB1FD-67A9-487E-BB95-4FABBE1CCBB9}" dt="2017-10-22T11:21:22.654" v="451" actId="14100"/>
+          <ac:chgData name="Melvin Leo" userId="fc11bf49cac66023" providerId="LiveId" clId="{F9FBB1FD-67A9-487E-BB95-4FABBE1CCBB9}" dt="2017-10-23T14:25:36.324" v="452" actId="14100"/>
           <ac:spMkLst>
             <pc:docMk/>
             <pc:sldMk cId="3945898909" sldId="267"/>
@@ -166,7 +166,7 @@
           </ac:spMkLst>
         </pc:spChg>
         <pc:spChg chg="add del">
-          <ac:chgData name="Melvin Leo" userId="fc11bf49cac66023" providerId="LiveId" clId="{F9FBB1FD-67A9-487E-BB95-4FABBE1CCBB9}" dt="2017-10-22T11:06:43.461" v="218"/>
+          <ac:chgData name="Melvin Leo" userId="fc11bf49cac66023" providerId="LiveId" clId="{F9FBB1FD-67A9-487E-BB95-4FABBE1CCBB9}" dt="2017-10-22T11:06:43.461" v="218" actId="14100"/>
           <ac:spMkLst>
             <pc:docMk/>
             <pc:sldMk cId="3945898909" sldId="267"/>
@@ -510,7 +510,7 @@
           </ac:cxnSpMkLst>
         </pc:cxnChg>
         <pc:cxnChg chg="mod">
-          <ac:chgData name="Melvin Leo" userId="fc11bf49cac66023" providerId="LiveId" clId="{F9FBB1FD-67A9-487E-BB95-4FABBE1CCBB9}" dt="2017-10-22T11:21:22.654" v="451" actId="14100"/>
+          <ac:chgData name="Melvin Leo" userId="fc11bf49cac66023" providerId="LiveId" clId="{F9FBB1FD-67A9-487E-BB95-4FABBE1CCBB9}" dt="2017-10-23T14:25:44.813" v="454" actId="1076"/>
           <ac:cxnSpMkLst>
             <pc:docMk/>
             <pc:sldMk cId="3945898909" sldId="267"/>
@@ -534,7 +534,7 @@
           </ac:cxnSpMkLst>
         </pc:cxnChg>
         <pc:cxnChg chg="add del">
-          <ac:chgData name="Melvin Leo" userId="fc11bf49cac66023" providerId="LiveId" clId="{F9FBB1FD-67A9-487E-BB95-4FABBE1CCBB9}" dt="2017-10-22T10:57:56.597" v="71"/>
+          <ac:chgData name="Melvin Leo" userId="fc11bf49cac66023" providerId="LiveId" clId="{F9FBB1FD-67A9-487E-BB95-4FABBE1CCBB9}" dt="2017-10-22T10:57:56.597" v="71" actId="14100"/>
           <ac:cxnSpMkLst>
             <pc:docMk/>
             <pc:sldMk cId="3945898909" sldId="267"/>
@@ -614,7 +614,7 @@
           </ac:cxnSpMkLst>
         </pc:cxnChg>
         <pc:cxnChg chg="mod">
-          <ac:chgData name="Melvin Leo" userId="fc11bf49cac66023" providerId="LiveId" clId="{F9FBB1FD-67A9-487E-BB95-4FABBE1CCBB9}" dt="2017-10-22T11:21:22.654" v="451" actId="14100"/>
+          <ac:chgData name="Melvin Leo" userId="fc11bf49cac66023" providerId="LiveId" clId="{F9FBB1FD-67A9-487E-BB95-4FABBE1CCBB9}" dt="2017-10-23T14:25:41.083" v="453" actId="1076"/>
           <ac:cxnSpMkLst>
             <pc:docMk/>
             <pc:sldMk cId="3945898909" sldId="267"/>
@@ -797,7 +797,7 @@
           <a:p>
             <a:fld id="{F5CC4B3F-88C1-4FFA-B1B6-F41C21DC6924}" type="datetimeFigureOut">
               <a:rPr lang="en-US" smtClean="0"/>
-              <a:t>10/22/2017</a:t>
+              <a:t>10/23/2017</a:t>
             </a:fld>
             <a:endParaRPr lang="en-US"/>
           </a:p>
@@ -1243,7 +1243,7 @@
           <a:p>
             <a:fld id="{78C97017-6FC3-485B-9764-EAC9E56C1D49}" type="datetimeFigureOut">
               <a:rPr lang="en-US" smtClean="0"/>
-              <a:t>10/22/2017</a:t>
+              <a:t>10/23/2017</a:t>
             </a:fld>
             <a:endParaRPr lang="en-US"/>
           </a:p>
@@ -1411,7 +1411,7 @@
           <a:p>
             <a:fld id="{78C97017-6FC3-485B-9764-EAC9E56C1D49}" type="datetimeFigureOut">
               <a:rPr lang="en-US" smtClean="0"/>
-              <a:t>10/22/2017</a:t>
+              <a:t>10/23/2017</a:t>
             </a:fld>
             <a:endParaRPr lang="en-US"/>
           </a:p>
@@ -1589,7 +1589,7 @@
           <a:p>
             <a:fld id="{78C97017-6FC3-485B-9764-EAC9E56C1D49}" type="datetimeFigureOut">
               <a:rPr lang="en-US" smtClean="0"/>
-              <a:t>10/22/2017</a:t>
+              <a:t>10/23/2017</a:t>
             </a:fld>
             <a:endParaRPr lang="en-US"/>
           </a:p>
@@ -1757,7 +1757,7 @@
           <a:p>
             <a:fld id="{78C97017-6FC3-485B-9764-EAC9E56C1D49}" type="datetimeFigureOut">
               <a:rPr lang="en-US" smtClean="0"/>
-              <a:t>10/22/2017</a:t>
+              <a:t>10/23/2017</a:t>
             </a:fld>
             <a:endParaRPr lang="en-US"/>
           </a:p>
@@ -2002,7 +2002,7 @@
           <a:p>
             <a:fld id="{78C97017-6FC3-485B-9764-EAC9E56C1D49}" type="datetimeFigureOut">
               <a:rPr lang="en-US" smtClean="0"/>
-              <a:t>10/22/2017</a:t>
+              <a:t>10/23/2017</a:t>
             </a:fld>
             <a:endParaRPr lang="en-US"/>
           </a:p>
@@ -2287,7 +2287,7 @@
           <a:p>
             <a:fld id="{78C97017-6FC3-485B-9764-EAC9E56C1D49}" type="datetimeFigureOut">
               <a:rPr lang="en-US" smtClean="0"/>
-              <a:t>10/22/2017</a:t>
+              <a:t>10/23/2017</a:t>
             </a:fld>
             <a:endParaRPr lang="en-US"/>
           </a:p>
@@ -2706,7 +2706,7 @@
           <a:p>
             <a:fld id="{78C97017-6FC3-485B-9764-EAC9E56C1D49}" type="datetimeFigureOut">
               <a:rPr lang="en-US" smtClean="0"/>
-              <a:t>10/22/2017</a:t>
+              <a:t>10/23/2017</a:t>
             </a:fld>
             <a:endParaRPr lang="en-US"/>
           </a:p>
@@ -2823,7 +2823,7 @@
           <a:p>
             <a:fld id="{78C97017-6FC3-485B-9764-EAC9E56C1D49}" type="datetimeFigureOut">
               <a:rPr lang="en-US" smtClean="0"/>
-              <a:t>10/22/2017</a:t>
+              <a:t>10/23/2017</a:t>
             </a:fld>
             <a:endParaRPr lang="en-US"/>
           </a:p>
@@ -2918,7 +2918,7 @@
           <a:p>
             <a:fld id="{78C97017-6FC3-485B-9764-EAC9E56C1D49}" type="datetimeFigureOut">
               <a:rPr lang="en-US" smtClean="0"/>
-              <a:t>10/22/2017</a:t>
+              <a:t>10/23/2017</a:t>
             </a:fld>
             <a:endParaRPr lang="en-US"/>
           </a:p>
@@ -3193,7 +3193,7 @@
           <a:p>
             <a:fld id="{78C97017-6FC3-485B-9764-EAC9E56C1D49}" type="datetimeFigureOut">
               <a:rPr lang="en-US" smtClean="0"/>
-              <a:t>10/22/2017</a:t>
+              <a:t>10/23/2017</a:t>
             </a:fld>
             <a:endParaRPr lang="en-US"/>
           </a:p>
@@ -3445,7 +3445,7 @@
           <a:p>
             <a:fld id="{78C97017-6FC3-485B-9764-EAC9E56C1D49}" type="datetimeFigureOut">
               <a:rPr lang="en-US" smtClean="0"/>
-              <a:t>10/22/2017</a:t>
+              <a:t>10/23/2017</a:t>
             </a:fld>
             <a:endParaRPr lang="en-US"/>
           </a:p>
@@ -3656,7 +3656,7 @@
           <a:p>
             <a:fld id="{78C97017-6FC3-485B-9764-EAC9E56C1D49}" type="datetimeFigureOut">
               <a:rPr lang="en-US" smtClean="0"/>
-              <a:t>10/22/2017</a:t>
+              <a:t>10/23/2017</a:t>
             </a:fld>
             <a:endParaRPr lang="en-US"/>
           </a:p>
@@ -4207,7 +4207,7 @@
         <p:spPr>
           <a:xfrm>
             <a:off x="1500851" y="3010911"/>
-            <a:ext cx="156754" cy="2826625"/>
+            <a:ext cx="140371" cy="3389889"/>
           </a:xfrm>
           <a:prstGeom prst="rect">
             <a:avLst/>
@@ -4751,7 +4751,7 @@
         </p:nvCxnSpPr>
         <p:spPr>
           <a:xfrm>
-            <a:off x="304800" y="5791200"/>
+            <a:off x="291117" y="6324600"/>
             <a:ext cx="1230224" cy="0"/>
           </a:xfrm>
           <a:prstGeom prst="straightConnector1">
@@ -4876,7 +4876,7 @@
         </p:nvCxnSpPr>
         <p:spPr>
           <a:xfrm flipV="1">
-            <a:off x="1653251" y="5486401"/>
+            <a:off x="1653251" y="6176591"/>
             <a:ext cx="1612147" cy="1"/>
           </a:xfrm>
           <a:prstGeom prst="straightConnector1">

</xml_diff>

<commit_message>
Finished implementation of HelpCommand
</commit_message>
<xml_diff>
--- a/docs/diagrams/LogicComponentSequenceDiagram.pptx
+++ b/docs/diagrams/LogicComponentSequenceDiagram.pptx
@@ -5,11 +5,12 @@
     <p:sldMasterId id="2147483648" r:id="rId1"/>
   </p:sldMasterIdLst>
   <p:notesMasterIdLst>
-    <p:notesMasterId r:id="rId4"/>
+    <p:notesMasterId r:id="rId5"/>
   </p:notesMasterIdLst>
   <p:sldIdLst>
     <p:sldId id="267" r:id="rId2"/>
     <p:sldId id="268" r:id="rId3"/>
+    <p:sldId id="269" r:id="rId4"/>
   </p:sldIdLst>
   <p:sldSz cx="9144000" cy="6858000" type="screen4x3"/>
   <p:notesSz cx="6858000" cy="9144000"/>
@@ -110,7 +111,7 @@
   </p:defaultTextStyle>
   <p:extLst>
     <p:ext uri="{EFAFB233-063F-42B5-8137-9DF3F51BA10A}">
-      <p15:sldGuideLst xmlns:p15="http://schemas.microsoft.com/office/powerpoint/2012/main" xmlns="">
+      <p15:sldGuideLst xmlns:p15="http://schemas.microsoft.com/office/powerpoint/2012/main">
         <p15:guide id="1" orient="horz" pos="1488">
           <p15:clr>
             <a:srgbClr val="A4A3A4"/>
@@ -213,7 +214,7 @@
           <a:p>
             <a:fld id="{F5CC4B3F-88C1-4FFA-B1B6-F41C21DC6924}" type="datetimeFigureOut">
               <a:rPr lang="en-US" smtClean="0"/>
-              <a:t>10/11/17</a:t>
+              <a:t>11/12/2017</a:t>
             </a:fld>
             <a:endParaRPr lang="en-US"/>
           </a:p>
@@ -659,7 +660,7 @@
           <a:p>
             <a:fld id="{78C97017-6FC3-485B-9764-EAC9E56C1D49}" type="datetimeFigureOut">
               <a:rPr lang="en-US" smtClean="0"/>
-              <a:t>10/11/17</a:t>
+              <a:t>11/12/2017</a:t>
             </a:fld>
             <a:endParaRPr lang="en-US"/>
           </a:p>
@@ -827,7 +828,7 @@
           <a:p>
             <a:fld id="{78C97017-6FC3-485B-9764-EAC9E56C1D49}" type="datetimeFigureOut">
               <a:rPr lang="en-US" smtClean="0"/>
-              <a:t>10/11/17</a:t>
+              <a:t>11/12/2017</a:t>
             </a:fld>
             <a:endParaRPr lang="en-US"/>
           </a:p>
@@ -1005,7 +1006,7 @@
           <a:p>
             <a:fld id="{78C97017-6FC3-485B-9764-EAC9E56C1D49}" type="datetimeFigureOut">
               <a:rPr lang="en-US" smtClean="0"/>
-              <a:t>10/11/17</a:t>
+              <a:t>11/12/2017</a:t>
             </a:fld>
             <a:endParaRPr lang="en-US"/>
           </a:p>
@@ -1173,7 +1174,7 @@
           <a:p>
             <a:fld id="{78C97017-6FC3-485B-9764-EAC9E56C1D49}" type="datetimeFigureOut">
               <a:rPr lang="en-US" smtClean="0"/>
-              <a:t>10/11/17</a:t>
+              <a:t>11/12/2017</a:t>
             </a:fld>
             <a:endParaRPr lang="en-US"/>
           </a:p>
@@ -1418,7 +1419,7 @@
           <a:p>
             <a:fld id="{78C97017-6FC3-485B-9764-EAC9E56C1D49}" type="datetimeFigureOut">
               <a:rPr lang="en-US" smtClean="0"/>
-              <a:t>10/11/17</a:t>
+              <a:t>11/12/2017</a:t>
             </a:fld>
             <a:endParaRPr lang="en-US"/>
           </a:p>
@@ -1703,7 +1704,7 @@
           <a:p>
             <a:fld id="{78C97017-6FC3-485B-9764-EAC9E56C1D49}" type="datetimeFigureOut">
               <a:rPr lang="en-US" smtClean="0"/>
-              <a:t>10/11/17</a:t>
+              <a:t>11/12/2017</a:t>
             </a:fld>
             <a:endParaRPr lang="en-US"/>
           </a:p>
@@ -2122,7 +2123,7 @@
           <a:p>
             <a:fld id="{78C97017-6FC3-485B-9764-EAC9E56C1D49}" type="datetimeFigureOut">
               <a:rPr lang="en-US" smtClean="0"/>
-              <a:t>10/11/17</a:t>
+              <a:t>11/12/2017</a:t>
             </a:fld>
             <a:endParaRPr lang="en-US"/>
           </a:p>
@@ -2239,7 +2240,7 @@
           <a:p>
             <a:fld id="{78C97017-6FC3-485B-9764-EAC9E56C1D49}" type="datetimeFigureOut">
               <a:rPr lang="en-US" smtClean="0"/>
-              <a:t>10/11/17</a:t>
+              <a:t>11/12/2017</a:t>
             </a:fld>
             <a:endParaRPr lang="en-US"/>
           </a:p>
@@ -2334,7 +2335,7 @@
           <a:p>
             <a:fld id="{78C97017-6FC3-485B-9764-EAC9E56C1D49}" type="datetimeFigureOut">
               <a:rPr lang="en-US" smtClean="0"/>
-              <a:t>10/11/17</a:t>
+              <a:t>11/12/2017</a:t>
             </a:fld>
             <a:endParaRPr lang="en-US"/>
           </a:p>
@@ -2609,7 +2610,7 @@
           <a:p>
             <a:fld id="{78C97017-6FC3-485B-9764-EAC9E56C1D49}" type="datetimeFigureOut">
               <a:rPr lang="en-US" smtClean="0"/>
-              <a:t>10/11/17</a:t>
+              <a:t>11/12/2017</a:t>
             </a:fld>
             <a:endParaRPr lang="en-US"/>
           </a:p>
@@ -2861,7 +2862,7 @@
           <a:p>
             <a:fld id="{78C97017-6FC3-485B-9764-EAC9E56C1D49}" type="datetimeFigureOut">
               <a:rPr lang="en-US" smtClean="0"/>
-              <a:t>10/11/17</a:t>
+              <a:t>11/12/2017</a:t>
             </a:fld>
             <a:endParaRPr lang="en-US"/>
           </a:p>
@@ -3072,7 +3073,7 @@
           <a:p>
             <a:fld id="{78C97017-6FC3-485B-9764-EAC9E56C1D49}" type="datetimeFigureOut">
               <a:rPr lang="en-US" smtClean="0"/>
-              <a:t>10/11/17</a:t>
+              <a:t>11/12/2017</a:t>
             </a:fld>
             <a:endParaRPr lang="en-US"/>
           </a:p>
@@ -3861,28 +3862,12 @@
           <a:p>
             <a:pPr algn="ctr"/>
             <a:r>
-              <a:rPr lang="en-US" sz="1600" dirty="0" err="1" smtClean="0">
+              <a:rPr lang="en-US" sz="1600" dirty="0" err="1">
                 <a:solidFill>
                   <a:schemeClr val="bg1"/>
                 </a:solidFill>
               </a:rPr>
-              <a:t>lc</a:t>
-            </a:r>
-            <a:r>
-              <a:rPr lang="en-US" sz="1600" dirty="0" err="1" smtClean="0">
-                <a:solidFill>
-                  <a:schemeClr val="bg1"/>
-                </a:solidFill>
-              </a:rPr>
-              <a:t>:Locate</a:t>
-            </a:r>
-            <a:r>
-              <a:rPr lang="en-US" sz="1600" dirty="0">
-                <a:solidFill>
-                  <a:schemeClr val="bg1"/>
-                </a:solidFill>
-              </a:rPr>
-              <a:t/>
+              <a:t>lc:Locate</a:t>
             </a:r>
             <a:br>
               <a:rPr lang="en-US" sz="1600" dirty="0">
@@ -4094,39 +4079,7 @@
                   <a:srgbClr val="0070C0"/>
                 </a:solidFill>
               </a:rPr>
-              <a:t>execute(</a:t>
-            </a:r>
-            <a:r>
-              <a:rPr lang="en-US" sz="1400" dirty="0" smtClean="0">
-                <a:solidFill>
-                  <a:srgbClr val="0070C0"/>
-                </a:solidFill>
-              </a:rPr>
-              <a:t>“</a:t>
-            </a:r>
-            <a:r>
-              <a:rPr lang="en-US" sz="1400" dirty="0" smtClean="0">
-                <a:solidFill>
-                  <a:srgbClr val="0070C0"/>
-                </a:solidFill>
-              </a:rPr>
-              <a:t>locate</a:t>
-            </a:r>
-            <a:r>
-              <a:rPr lang="en-US" sz="1400" dirty="0" smtClean="0">
-                <a:solidFill>
-                  <a:srgbClr val="0070C0"/>
-                </a:solidFill>
-              </a:rPr>
-              <a:t> </a:t>
-            </a:r>
-            <a:r>
-              <a:rPr lang="en-US" sz="1400" dirty="0">
-                <a:solidFill>
-                  <a:srgbClr val="0070C0"/>
-                </a:solidFill>
-              </a:rPr>
-              <a:t>1”)</a:t>
+              <a:t>execute(“locate 1”)</a:t>
             </a:r>
           </a:p>
         </p:txBody>
@@ -4512,15 +4465,15 @@
           </a:lstStyle>
           <a:p>
             <a:r>
-              <a:rPr lang="en-US" dirty="0" smtClean="0"/>
+              <a:rPr lang="en-US" dirty="0"/>
               <a:t>post(</a:t>
             </a:r>
             <a:r>
-              <a:rPr lang="en-US" dirty="0" err="1" smtClean="0"/>
+              <a:rPr lang="en-US" dirty="0" err="1"/>
               <a:t>JumpToListRequestEvent</a:t>
             </a:r>
             <a:r>
-              <a:rPr lang="en-US" dirty="0" smtClean="0"/>
+              <a:rPr lang="en-US" dirty="0"/>
               <a:t>)</a:t>
             </a:r>
             <a:endParaRPr lang="en-US" dirty="0">
@@ -4606,23 +4559,7 @@
           <a:p>
             <a:r>
               <a:rPr lang="en-US" dirty="0"/>
-              <a:t>parse(</a:t>
-            </a:r>
-            <a:r>
-              <a:rPr lang="en-US" dirty="0" smtClean="0"/>
-              <a:t>“</a:t>
-            </a:r>
-            <a:r>
-              <a:rPr lang="en-US" dirty="0" smtClean="0"/>
-              <a:t>locate</a:t>
-            </a:r>
-            <a:r>
-              <a:rPr lang="en-US" dirty="0" smtClean="0"/>
-              <a:t> </a:t>
-            </a:r>
-            <a:r>
-              <a:rPr lang="en-US" dirty="0"/>
-              <a:t>1”)</a:t>
+              <a:t>parse(“locate 1”)</a:t>
             </a:r>
           </a:p>
         </p:txBody>
@@ -4893,7 +4830,7 @@
           </a:lstStyle>
           <a:p>
             <a:r>
-              <a:rPr lang="en-US" dirty="0" err="1" smtClean="0"/>
+              <a:rPr lang="en-US" dirty="0" err="1"/>
               <a:t>lc</a:t>
             </a:r>
             <a:endParaRPr lang="en-US" dirty="0"/>
@@ -4944,7 +4881,7 @@
           <a:p>
             <a:pPr algn="ctr"/>
             <a:r>
-              <a:rPr lang="en-US" sz="1600" dirty="0" smtClean="0">
+              <a:rPr lang="en-US" sz="1600" dirty="0">
                 <a:solidFill>
                   <a:schemeClr val="bg1"/>
                 </a:solidFill>
@@ -4952,20 +4889,12 @@
               <a:t>:</a:t>
             </a:r>
             <a:r>
-              <a:rPr lang="en-US" sz="1600" dirty="0" err="1" smtClean="0">
+              <a:rPr lang="en-US" sz="1600" dirty="0" err="1">
                 <a:solidFill>
                   <a:schemeClr val="bg1"/>
                 </a:solidFill>
               </a:rPr>
-              <a:t>Locate</a:t>
-            </a:r>
-            <a:r>
-              <a:rPr lang="en-US" sz="1600" dirty="0" err="1" smtClean="0">
-                <a:solidFill>
-                  <a:schemeClr val="bg1"/>
-                </a:solidFill>
-              </a:rPr>
-              <a:t>Command</a:t>
+              <a:t>LocateCommand</a:t>
             </a:r>
             <a:endParaRPr lang="en-US" sz="1600" dirty="0">
               <a:solidFill>
@@ -5385,7 +5314,7 @@
           <a:p>
             <a:pPr algn="ctr"/>
             <a:r>
-              <a:rPr lang="en-US" sz="1600" dirty="0" smtClean="0">
+              <a:rPr lang="en-US" sz="1600" dirty="0">
                 <a:solidFill>
                   <a:schemeClr val="bg1"/>
                 </a:solidFill>
@@ -5393,7 +5322,7 @@
               <a:t>:</a:t>
             </a:r>
             <a:r>
-              <a:rPr lang="en-US" sz="1600" dirty="0" err="1" smtClean="0">
+              <a:rPr lang="en-US" sz="1600" dirty="0" err="1">
                 <a:solidFill>
                   <a:schemeClr val="bg1"/>
                 </a:solidFill>
@@ -5986,28 +5915,12 @@
           <a:p>
             <a:pPr algn="ctr"/>
             <a:r>
-              <a:rPr lang="en-US" sz="1600" dirty="0" err="1" smtClean="0">
+              <a:rPr lang="en-US" sz="1600" dirty="0" err="1">
                 <a:solidFill>
                   <a:schemeClr val="bg1"/>
                 </a:solidFill>
               </a:rPr>
-              <a:t>lc</a:t>
-            </a:r>
-            <a:r>
-              <a:rPr lang="en-US" sz="1600" dirty="0" err="1" smtClean="0">
-                <a:solidFill>
-                  <a:schemeClr val="bg1"/>
-                </a:solidFill>
-              </a:rPr>
-              <a:t>:Locate</a:t>
-            </a:r>
-            <a:r>
-              <a:rPr lang="en-US" sz="1600" dirty="0">
-                <a:solidFill>
-                  <a:schemeClr val="bg1"/>
-                </a:solidFill>
-              </a:rPr>
-              <a:t/>
+              <a:t>lc:Locate</a:t>
             </a:r>
             <a:br>
               <a:rPr lang="en-US" sz="1600" dirty="0">
@@ -6219,39 +6132,7 @@
                   <a:srgbClr val="0070C0"/>
                 </a:solidFill>
               </a:rPr>
-              <a:t>execute(</a:t>
-            </a:r>
-            <a:r>
-              <a:rPr lang="en-US" sz="1400" dirty="0" smtClean="0">
-                <a:solidFill>
-                  <a:srgbClr val="0070C0"/>
-                </a:solidFill>
-              </a:rPr>
-              <a:t>“</a:t>
-            </a:r>
-            <a:r>
-              <a:rPr lang="en-US" sz="1400" dirty="0" smtClean="0">
-                <a:solidFill>
-                  <a:srgbClr val="0070C0"/>
-                </a:solidFill>
-              </a:rPr>
-              <a:t>locate</a:t>
-            </a:r>
-            <a:r>
-              <a:rPr lang="en-US" sz="1400" dirty="0" smtClean="0">
-                <a:solidFill>
-                  <a:srgbClr val="0070C0"/>
-                </a:solidFill>
-              </a:rPr>
-              <a:t> </a:t>
-            </a:r>
-            <a:r>
-              <a:rPr lang="en-US" sz="1400" dirty="0">
-                <a:solidFill>
-                  <a:srgbClr val="0070C0"/>
-                </a:solidFill>
-              </a:rPr>
-              <a:t>1”)</a:t>
+              <a:t>execute(“locate 1”)</a:t>
             </a:r>
           </a:p>
         </p:txBody>
@@ -6501,15 +6382,7 @@
                   <a:schemeClr val="bg1"/>
                 </a:solidFill>
               </a:rPr>
-              <a:t>:</a:t>
-            </a:r>
-            <a:r>
-              <a:rPr lang="en-US" sz="1600" dirty="0" smtClean="0">
-                <a:solidFill>
-                  <a:schemeClr val="bg1"/>
-                </a:solidFill>
-              </a:rPr>
-              <a:t>Model</a:t>
+              <a:t>:Model</a:t>
             </a:r>
             <a:endParaRPr lang="en-SG" sz="1600" dirty="0">
               <a:solidFill>
@@ -6941,23 +6814,7 @@
           <a:p>
             <a:r>
               <a:rPr lang="en-US" dirty="0"/>
-              <a:t>parse(</a:t>
-            </a:r>
-            <a:r>
-              <a:rPr lang="en-US" dirty="0" smtClean="0"/>
-              <a:t>“</a:t>
-            </a:r>
-            <a:r>
-              <a:rPr lang="en-US" dirty="0" smtClean="0"/>
-              <a:t>locate</a:t>
-            </a:r>
-            <a:r>
-              <a:rPr lang="en-US" dirty="0" smtClean="0"/>
-              <a:t> </a:t>
-            </a:r>
-            <a:r>
-              <a:rPr lang="en-US" dirty="0"/>
-              <a:t>1”)</a:t>
+              <a:t>parse(“locate 1”)</a:t>
             </a:r>
           </a:p>
         </p:txBody>
@@ -7228,7 +7085,7 @@
           </a:lstStyle>
           <a:p>
             <a:r>
-              <a:rPr lang="en-US" dirty="0" err="1" smtClean="0"/>
+              <a:rPr lang="en-US" dirty="0" err="1"/>
               <a:t>lc</a:t>
             </a:r>
             <a:endParaRPr lang="en-US" dirty="0"/>
@@ -7279,7 +7136,7 @@
           <a:p>
             <a:pPr algn="ctr"/>
             <a:r>
-              <a:rPr lang="en-US" sz="1600" dirty="0" smtClean="0">
+              <a:rPr lang="en-US" sz="1600" dirty="0">
                 <a:solidFill>
                   <a:schemeClr val="bg1"/>
                 </a:solidFill>
@@ -7287,20 +7144,12 @@
               <a:t>:</a:t>
             </a:r>
             <a:r>
-              <a:rPr lang="en-US" sz="1600" dirty="0" err="1" smtClean="0">
+              <a:rPr lang="en-US" sz="1600" dirty="0" err="1">
                 <a:solidFill>
                   <a:schemeClr val="bg1"/>
                 </a:solidFill>
               </a:rPr>
-              <a:t>Locate</a:t>
-            </a:r>
-            <a:r>
-              <a:rPr lang="en-US" sz="1600" dirty="0" err="1" smtClean="0">
-                <a:solidFill>
-                  <a:schemeClr val="bg1"/>
-                </a:solidFill>
-              </a:rPr>
-              <a:t>Command</a:t>
+              <a:t>LocateCommand</a:t>
             </a:r>
             <a:endParaRPr lang="en-US" sz="1600" dirty="0">
               <a:solidFill>
@@ -7720,7 +7569,7 @@
           <a:p>
             <a:pPr algn="ctr"/>
             <a:r>
-              <a:rPr lang="en-US" sz="1600" dirty="0" smtClean="0">
+              <a:rPr lang="en-US" sz="1600" dirty="0">
                 <a:solidFill>
                   <a:schemeClr val="bg1"/>
                 </a:solidFill>
@@ -7728,7 +7577,7 @@
               <a:t>:</a:t>
             </a:r>
             <a:r>
-              <a:rPr lang="en-US" sz="1600" dirty="0" err="1" smtClean="0">
+              <a:rPr lang="en-US" sz="1600" dirty="0" err="1">
                 <a:solidFill>
                   <a:schemeClr val="bg1"/>
                 </a:solidFill>
@@ -7747,6 +7596,2001 @@
     <p:extLst>
       <p:ext uri="{BB962C8B-B14F-4D97-AF65-F5344CB8AC3E}">
         <p14:creationId xmlns:p14="http://schemas.microsoft.com/office/powerpoint/2010/main" val="355617953"/>
+      </p:ext>
+    </p:extLst>
+  </p:cSld>
+  <p:clrMapOvr>
+    <a:masterClrMapping/>
+  </p:clrMapOvr>
+</p:sld>
+</file>
+
+<file path=ppt/slides/slide3.xml><?xml version="1.0" encoding="utf-8"?>
+<p:sld xmlns:a="http://schemas.openxmlformats.org/drawingml/2006/main" xmlns:r="http://schemas.openxmlformats.org/officeDocument/2006/relationships" xmlns:p="http://schemas.openxmlformats.org/presentationml/2006/main">
+  <p:cSld>
+    <p:spTree>
+      <p:nvGrpSpPr>
+        <p:cNvPr id="1" name=""/>
+        <p:cNvGrpSpPr/>
+        <p:nvPr/>
+      </p:nvGrpSpPr>
+      <p:grpSpPr>
+        <a:xfrm>
+          <a:off x="0" y="0"/>
+          <a:ext cx="0" cy="0"/>
+          <a:chOff x="0" y="0"/>
+          <a:chExt cx="0" cy="0"/>
+        </a:xfrm>
+      </p:grpSpPr>
+      <p:sp>
+        <p:nvSpPr>
+          <p:cNvPr id="2" name="Rectangle 65">
+            <a:extLst>
+              <a:ext uri="{FF2B5EF4-FFF2-40B4-BE49-F238E27FC236}">
+                <a16:creationId xmlns:a16="http://schemas.microsoft.com/office/drawing/2014/main" id="{D9926ADE-642A-4492-920F-493D3BDED679}"/>
+              </a:ext>
+            </a:extLst>
+          </p:cNvPr>
+          <p:cNvSpPr/>
+          <p:nvPr/>
+        </p:nvSpPr>
+        <p:spPr>
+          <a:xfrm>
+            <a:off x="914400" y="1905000"/>
+            <a:ext cx="7315200" cy="4152686"/>
+          </a:xfrm>
+          <a:prstGeom prst="roundRect">
+            <a:avLst>
+              <a:gd name="adj" fmla="val 3484"/>
+            </a:avLst>
+          </a:prstGeom>
+          <a:solidFill>
+            <a:schemeClr val="accent1">
+              <a:lumMod val="20000"/>
+              <a:lumOff val="80000"/>
+            </a:schemeClr>
+          </a:solidFill>
+          <a:ln w="19050">
+            <a:noFill/>
+          </a:ln>
+          <a:effectLst/>
+        </p:spPr>
+        <p:style>
+          <a:lnRef idx="1">
+            <a:schemeClr val="accent2"/>
+          </a:lnRef>
+          <a:fillRef idx="2">
+            <a:schemeClr val="accent2"/>
+          </a:fillRef>
+          <a:effectRef idx="1">
+            <a:schemeClr val="accent2"/>
+          </a:effectRef>
+          <a:fontRef idx="minor">
+            <a:schemeClr val="dk1"/>
+          </a:fontRef>
+        </p:style>
+        <p:txBody>
+          <a:bodyPr rtlCol="0" anchor="t"/>
+          <a:lstStyle/>
+          <a:p>
+            <a:r>
+              <a:rPr lang="en-US" sz="1200" b="1" dirty="0">
+                <a:solidFill>
+                  <a:srgbClr val="0070C0"/>
+                </a:solidFill>
+              </a:rPr>
+              <a:t>Logic</a:t>
+            </a:r>
+            <a:endParaRPr lang="en-SG" sz="1200" b="1" dirty="0">
+              <a:solidFill>
+                <a:srgbClr val="0070C0"/>
+              </a:solidFill>
+            </a:endParaRPr>
+          </a:p>
+        </p:txBody>
+      </p:sp>
+      <p:sp>
+        <p:nvSpPr>
+          <p:cNvPr id="3" name="Rectangle 62">
+            <a:extLst>
+              <a:ext uri="{FF2B5EF4-FFF2-40B4-BE49-F238E27FC236}">
+                <a16:creationId xmlns:a16="http://schemas.microsoft.com/office/drawing/2014/main" id="{BC93E0E6-40AC-4ACD-90C4-91645AC3F300}"/>
+              </a:ext>
+            </a:extLst>
+          </p:cNvPr>
+          <p:cNvSpPr/>
+          <p:nvPr/>
+        </p:nvSpPr>
+        <p:spPr>
+          <a:xfrm>
+            <a:off x="1199158" y="2303332"/>
+            <a:ext cx="1455629" cy="346760"/>
+          </a:xfrm>
+          <a:prstGeom prst="rect">
+            <a:avLst/>
+          </a:prstGeom>
+          <a:solidFill>
+            <a:srgbClr val="0070C0"/>
+          </a:solidFill>
+          <a:ln w="19050">
+            <a:solidFill>
+              <a:srgbClr val="0070C0"/>
+            </a:solidFill>
+          </a:ln>
+          <a:effectLst/>
+        </p:spPr>
+        <p:style>
+          <a:lnRef idx="1">
+            <a:schemeClr val="accent2"/>
+          </a:lnRef>
+          <a:fillRef idx="2">
+            <a:schemeClr val="accent2"/>
+          </a:fillRef>
+          <a:effectRef idx="1">
+            <a:schemeClr val="accent2"/>
+          </a:effectRef>
+          <a:fontRef idx="minor">
+            <a:schemeClr val="dk1"/>
+          </a:fontRef>
+        </p:style>
+        <p:txBody>
+          <a:bodyPr rtlCol="0" anchor="ctr"/>
+          <a:lstStyle/>
+          <a:p>
+            <a:pPr algn="ctr"/>
+            <a:r>
+              <a:rPr lang="en-US" sz="1600" dirty="0">
+                <a:solidFill>
+                  <a:schemeClr val="bg1"/>
+                </a:solidFill>
+              </a:rPr>
+              <a:t>:</a:t>
+            </a:r>
+            <a:r>
+              <a:rPr lang="en-US" sz="1600" dirty="0" err="1">
+                <a:solidFill>
+                  <a:schemeClr val="bg1"/>
+                </a:solidFill>
+              </a:rPr>
+              <a:t>LogicManager</a:t>
+            </a:r>
+            <a:endParaRPr lang="en-SG" sz="1600" dirty="0">
+              <a:solidFill>
+                <a:schemeClr val="bg1"/>
+              </a:solidFill>
+            </a:endParaRPr>
+          </a:p>
+        </p:txBody>
+      </p:sp>
+      <p:cxnSp>
+        <p:nvCxnSpPr>
+          <p:cNvPr id="4" name="Straight Connector 3">
+            <a:extLst>
+              <a:ext uri="{FF2B5EF4-FFF2-40B4-BE49-F238E27FC236}">
+                <a16:creationId xmlns:a16="http://schemas.microsoft.com/office/drawing/2014/main" id="{896A0448-C390-427A-B80D-BC3651724F65}"/>
+              </a:ext>
+            </a:extLst>
+          </p:cNvPr>
+          <p:cNvCxnSpPr/>
+          <p:nvPr/>
+        </p:nvCxnSpPr>
+        <p:spPr>
+          <a:xfrm>
+            <a:off x="1877659" y="2660217"/>
+            <a:ext cx="0" cy="2597583"/>
+          </a:xfrm>
+          <a:prstGeom prst="line">
+            <a:avLst/>
+          </a:prstGeom>
+          <a:ln w="19050">
+            <a:solidFill>
+              <a:srgbClr val="0070C0"/>
+            </a:solidFill>
+            <a:prstDash val="sysDash"/>
+          </a:ln>
+          <a:effectLst/>
+        </p:spPr>
+        <p:style>
+          <a:lnRef idx="1">
+            <a:schemeClr val="accent1"/>
+          </a:lnRef>
+          <a:fillRef idx="2">
+            <a:schemeClr val="accent1"/>
+          </a:fillRef>
+          <a:effectRef idx="1">
+            <a:schemeClr val="accent1"/>
+          </a:effectRef>
+          <a:fontRef idx="minor">
+            <a:schemeClr val="dk1"/>
+          </a:fontRef>
+        </p:style>
+      </p:cxnSp>
+      <p:sp>
+        <p:nvSpPr>
+          <p:cNvPr id="5" name="Rectangle 4">
+            <a:extLst>
+              <a:ext uri="{FF2B5EF4-FFF2-40B4-BE49-F238E27FC236}">
+                <a16:creationId xmlns:a16="http://schemas.microsoft.com/office/drawing/2014/main" id="{6A54D27B-CF7E-4ED9-9DD1-309373206491}"/>
+              </a:ext>
+            </a:extLst>
+          </p:cNvPr>
+          <p:cNvSpPr/>
+          <p:nvPr/>
+        </p:nvSpPr>
+        <p:spPr>
+          <a:xfrm>
+            <a:off x="1805651" y="3010911"/>
+            <a:ext cx="152400" cy="2780287"/>
+          </a:xfrm>
+          <a:prstGeom prst="rect">
+            <a:avLst/>
+          </a:prstGeom>
+          <a:solidFill>
+            <a:srgbClr val="0070C0"/>
+          </a:solidFill>
+          <a:ln>
+            <a:solidFill>
+              <a:srgbClr val="0070C0"/>
+            </a:solidFill>
+          </a:ln>
+          <a:effectLst/>
+        </p:spPr>
+        <p:style>
+          <a:lnRef idx="1">
+            <a:schemeClr val="accent3"/>
+          </a:lnRef>
+          <a:fillRef idx="2">
+            <a:schemeClr val="accent3"/>
+          </a:fillRef>
+          <a:effectRef idx="1">
+            <a:schemeClr val="accent3"/>
+          </a:effectRef>
+          <a:fontRef idx="minor">
+            <a:schemeClr val="dk1"/>
+          </a:fontRef>
+        </p:style>
+        <p:txBody>
+          <a:bodyPr rtlCol="0" anchor="ctr"/>
+          <a:lstStyle/>
+          <a:p>
+            <a:pPr algn="ctr"/>
+            <a:endParaRPr lang="en-SG" sz="1400"/>
+          </a:p>
+        </p:txBody>
+      </p:sp>
+      <p:sp>
+        <p:nvSpPr>
+          <p:cNvPr id="6" name="Rectangle 62">
+            <a:extLst>
+              <a:ext uri="{FF2B5EF4-FFF2-40B4-BE49-F238E27FC236}">
+                <a16:creationId xmlns:a16="http://schemas.microsoft.com/office/drawing/2014/main" id="{7E9F615B-E051-4413-BA08-DE71594EA67D}"/>
+              </a:ext>
+            </a:extLst>
+          </p:cNvPr>
+          <p:cNvSpPr/>
+          <p:nvPr/>
+        </p:nvSpPr>
+        <p:spPr>
+          <a:xfrm>
+            <a:off x="3048000" y="2179309"/>
+            <a:ext cx="1219200" cy="467684"/>
+          </a:xfrm>
+          <a:prstGeom prst="rect">
+            <a:avLst/>
+          </a:prstGeom>
+          <a:solidFill>
+            <a:srgbClr val="0070C0"/>
+          </a:solidFill>
+          <a:ln w="19050">
+            <a:solidFill>
+              <a:srgbClr val="0070C0"/>
+            </a:solidFill>
+          </a:ln>
+          <a:effectLst/>
+        </p:spPr>
+        <p:style>
+          <a:lnRef idx="1">
+            <a:schemeClr val="accent2"/>
+          </a:lnRef>
+          <a:fillRef idx="2">
+            <a:schemeClr val="accent2"/>
+          </a:fillRef>
+          <a:effectRef idx="1">
+            <a:schemeClr val="accent2"/>
+          </a:effectRef>
+          <a:fontRef idx="minor">
+            <a:schemeClr val="dk1"/>
+          </a:fontRef>
+        </p:style>
+        <p:txBody>
+          <a:bodyPr rtlCol="0" anchor="ctr"/>
+          <a:lstStyle/>
+          <a:p>
+            <a:pPr algn="ctr"/>
+            <a:r>
+              <a:rPr lang="en-US" sz="1600" dirty="0">
+                <a:solidFill>
+                  <a:schemeClr val="bg1"/>
+                </a:solidFill>
+              </a:rPr>
+              <a:t>:Address</a:t>
+            </a:r>
+          </a:p>
+          <a:p>
+            <a:pPr algn="ctr"/>
+            <a:r>
+              <a:rPr lang="en-US" sz="1600" dirty="0" err="1">
+                <a:solidFill>
+                  <a:schemeClr val="bg1"/>
+                </a:solidFill>
+              </a:rPr>
+              <a:t>BookParser</a:t>
+            </a:r>
+            <a:endParaRPr lang="en-SG" sz="1600" dirty="0">
+              <a:solidFill>
+                <a:schemeClr val="bg1"/>
+              </a:solidFill>
+            </a:endParaRPr>
+          </a:p>
+        </p:txBody>
+      </p:sp>
+      <p:cxnSp>
+        <p:nvCxnSpPr>
+          <p:cNvPr id="7" name="Straight Connector 6">
+            <a:extLst>
+              <a:ext uri="{FF2B5EF4-FFF2-40B4-BE49-F238E27FC236}">
+                <a16:creationId xmlns:a16="http://schemas.microsoft.com/office/drawing/2014/main" id="{E205965E-C042-4653-92D4-C2082C0DCC51}"/>
+              </a:ext>
+            </a:extLst>
+          </p:cNvPr>
+          <p:cNvCxnSpPr/>
+          <p:nvPr/>
+        </p:nvCxnSpPr>
+        <p:spPr>
+          <a:xfrm>
+            <a:off x="3661399" y="2663904"/>
+            <a:ext cx="0" cy="1695374"/>
+          </a:xfrm>
+          <a:prstGeom prst="line">
+            <a:avLst/>
+          </a:prstGeom>
+          <a:ln w="19050">
+            <a:solidFill>
+              <a:srgbClr val="0070C0"/>
+            </a:solidFill>
+            <a:prstDash val="sysDash"/>
+          </a:ln>
+          <a:effectLst/>
+        </p:spPr>
+        <p:style>
+          <a:lnRef idx="1">
+            <a:schemeClr val="accent1"/>
+          </a:lnRef>
+          <a:fillRef idx="2">
+            <a:schemeClr val="accent1"/>
+          </a:fillRef>
+          <a:effectRef idx="1">
+            <a:schemeClr val="accent1"/>
+          </a:effectRef>
+          <a:fontRef idx="minor">
+            <a:schemeClr val="dk1"/>
+          </a:fontRef>
+        </p:style>
+      </p:cxnSp>
+      <p:sp>
+        <p:nvSpPr>
+          <p:cNvPr id="8" name="Rectangle 7">
+            <a:extLst>
+              <a:ext uri="{FF2B5EF4-FFF2-40B4-BE49-F238E27FC236}">
+                <a16:creationId xmlns:a16="http://schemas.microsoft.com/office/drawing/2014/main" id="{D21A5422-A99D-4208-9B2F-F921F8BDDC43}"/>
+              </a:ext>
+            </a:extLst>
+          </p:cNvPr>
+          <p:cNvSpPr/>
+          <p:nvPr/>
+        </p:nvSpPr>
+        <p:spPr>
+          <a:xfrm>
+            <a:off x="3589390" y="3122096"/>
+            <a:ext cx="174929" cy="1129459"/>
+          </a:xfrm>
+          <a:prstGeom prst="rect">
+            <a:avLst/>
+          </a:prstGeom>
+          <a:solidFill>
+            <a:srgbClr val="0070C0"/>
+          </a:solidFill>
+          <a:ln>
+            <a:solidFill>
+              <a:srgbClr val="0070C0"/>
+            </a:solidFill>
+          </a:ln>
+          <a:effectLst/>
+        </p:spPr>
+        <p:style>
+          <a:lnRef idx="1">
+            <a:schemeClr val="accent3"/>
+          </a:lnRef>
+          <a:fillRef idx="2">
+            <a:schemeClr val="accent3"/>
+          </a:fillRef>
+          <a:effectRef idx="1">
+            <a:schemeClr val="accent3"/>
+          </a:effectRef>
+          <a:fontRef idx="minor">
+            <a:schemeClr val="dk1"/>
+          </a:fontRef>
+        </p:style>
+        <p:txBody>
+          <a:bodyPr rtlCol="0" anchor="ctr"/>
+          <a:lstStyle/>
+          <a:p>
+            <a:pPr algn="ctr"/>
+            <a:endParaRPr lang="en-SG" sz="1400">
+              <a:solidFill>
+                <a:schemeClr val="dk1"/>
+              </a:solidFill>
+            </a:endParaRPr>
+          </a:p>
+        </p:txBody>
+      </p:sp>
+      <p:sp>
+        <p:nvSpPr>
+          <p:cNvPr id="9" name="Rectangle 62">
+            <a:extLst>
+              <a:ext uri="{FF2B5EF4-FFF2-40B4-BE49-F238E27FC236}">
+                <a16:creationId xmlns:a16="http://schemas.microsoft.com/office/drawing/2014/main" id="{D5500173-8C7D-443F-8F0C-E15DAD03F8D8}"/>
+              </a:ext>
+            </a:extLst>
+          </p:cNvPr>
+          <p:cNvSpPr/>
+          <p:nvPr/>
+        </p:nvSpPr>
+        <p:spPr>
+          <a:xfrm>
+            <a:off x="6526365" y="3312740"/>
+            <a:ext cx="1093635" cy="461538"/>
+          </a:xfrm>
+          <a:prstGeom prst="rect">
+            <a:avLst/>
+          </a:prstGeom>
+          <a:solidFill>
+            <a:srgbClr val="0070C0"/>
+          </a:solidFill>
+          <a:ln w="19050">
+            <a:solidFill>
+              <a:srgbClr val="0070C0"/>
+            </a:solidFill>
+          </a:ln>
+          <a:effectLst/>
+        </p:spPr>
+        <p:style>
+          <a:lnRef idx="1">
+            <a:schemeClr val="accent2"/>
+          </a:lnRef>
+          <a:fillRef idx="2">
+            <a:schemeClr val="accent2"/>
+          </a:fillRef>
+          <a:effectRef idx="1">
+            <a:schemeClr val="accent2"/>
+          </a:effectRef>
+          <a:fontRef idx="minor">
+            <a:schemeClr val="dk1"/>
+          </a:fontRef>
+        </p:style>
+        <p:txBody>
+          <a:bodyPr rtlCol="0" anchor="ctr"/>
+          <a:lstStyle/>
+          <a:p>
+            <a:pPr algn="ctr"/>
+            <a:r>
+              <a:rPr lang="en-US" sz="1600" dirty="0">
+                <a:solidFill>
+                  <a:schemeClr val="bg1"/>
+                </a:solidFill>
+              </a:rPr>
+              <a:t>h:Help</a:t>
+            </a:r>
+            <a:br>
+              <a:rPr lang="en-US" sz="1600" dirty="0">
+                <a:solidFill>
+                  <a:schemeClr val="bg1"/>
+                </a:solidFill>
+              </a:rPr>
+            </a:br>
+            <a:r>
+              <a:rPr lang="en-US" sz="1600" dirty="0">
+                <a:solidFill>
+                  <a:schemeClr val="bg1"/>
+                </a:solidFill>
+              </a:rPr>
+              <a:t>Command</a:t>
+            </a:r>
+            <a:endParaRPr lang="en-SG" sz="1600" dirty="0">
+              <a:solidFill>
+                <a:schemeClr val="bg1"/>
+              </a:solidFill>
+            </a:endParaRPr>
+          </a:p>
+        </p:txBody>
+      </p:sp>
+      <p:cxnSp>
+        <p:nvCxnSpPr>
+          <p:cNvPr id="10" name="Straight Connector 9">
+            <a:extLst>
+              <a:ext uri="{FF2B5EF4-FFF2-40B4-BE49-F238E27FC236}">
+                <a16:creationId xmlns:a16="http://schemas.microsoft.com/office/drawing/2014/main" id="{4CB29EB8-A49C-4C12-B678-6BB24261169D}"/>
+              </a:ext>
+            </a:extLst>
+          </p:cNvPr>
+          <p:cNvCxnSpPr>
+            <a:stCxn id="11" idx="0"/>
+          </p:cNvCxnSpPr>
+          <p:nvPr/>
+        </p:nvCxnSpPr>
+        <p:spPr>
+          <a:xfrm>
+            <a:off x="7077374" y="3774278"/>
+            <a:ext cx="0" cy="1940722"/>
+          </a:xfrm>
+          <a:prstGeom prst="line">
+            <a:avLst/>
+          </a:prstGeom>
+          <a:ln w="19050">
+            <a:solidFill>
+              <a:srgbClr val="0070C0"/>
+            </a:solidFill>
+            <a:prstDash val="sysDash"/>
+          </a:ln>
+          <a:effectLst/>
+        </p:spPr>
+        <p:style>
+          <a:lnRef idx="1">
+            <a:schemeClr val="accent1"/>
+          </a:lnRef>
+          <a:fillRef idx="2">
+            <a:schemeClr val="accent1"/>
+          </a:fillRef>
+          <a:effectRef idx="1">
+            <a:schemeClr val="accent1"/>
+          </a:effectRef>
+          <a:fontRef idx="minor">
+            <a:schemeClr val="dk1"/>
+          </a:fontRef>
+        </p:style>
+      </p:cxnSp>
+      <p:sp>
+        <p:nvSpPr>
+          <p:cNvPr id="11" name="Rectangle 10">
+            <a:extLst>
+              <a:ext uri="{FF2B5EF4-FFF2-40B4-BE49-F238E27FC236}">
+                <a16:creationId xmlns:a16="http://schemas.microsoft.com/office/drawing/2014/main" id="{8836FC42-E97F-4DEE-8AE7-BBC0275A7973}"/>
+              </a:ext>
+            </a:extLst>
+          </p:cNvPr>
+          <p:cNvSpPr/>
+          <p:nvPr/>
+        </p:nvSpPr>
+        <p:spPr>
+          <a:xfrm>
+            <a:off x="7001174" y="3774278"/>
+            <a:ext cx="152400" cy="276003"/>
+          </a:xfrm>
+          <a:prstGeom prst="rect">
+            <a:avLst/>
+          </a:prstGeom>
+          <a:solidFill>
+            <a:srgbClr val="0070C0"/>
+          </a:solidFill>
+          <a:ln>
+            <a:solidFill>
+              <a:srgbClr val="0070C0"/>
+            </a:solidFill>
+          </a:ln>
+          <a:effectLst/>
+        </p:spPr>
+        <p:style>
+          <a:lnRef idx="1">
+            <a:schemeClr val="accent3"/>
+          </a:lnRef>
+          <a:fillRef idx="2">
+            <a:schemeClr val="accent3"/>
+          </a:fillRef>
+          <a:effectRef idx="1">
+            <a:schemeClr val="accent3"/>
+          </a:effectRef>
+          <a:fontRef idx="minor">
+            <a:schemeClr val="dk1"/>
+          </a:fontRef>
+        </p:style>
+        <p:txBody>
+          <a:bodyPr rtlCol="0" anchor="ctr"/>
+          <a:lstStyle/>
+          <a:p>
+            <a:pPr algn="ctr"/>
+            <a:endParaRPr lang="en-SG" sz="1400"/>
+          </a:p>
+        </p:txBody>
+      </p:sp>
+      <p:cxnSp>
+        <p:nvCxnSpPr>
+          <p:cNvPr id="12" name="Straight Arrow Connector 11">
+            <a:extLst>
+              <a:ext uri="{FF2B5EF4-FFF2-40B4-BE49-F238E27FC236}">
+                <a16:creationId xmlns:a16="http://schemas.microsoft.com/office/drawing/2014/main" id="{45121102-D01E-4D7D-A0DF-238D9714889F}"/>
+              </a:ext>
+            </a:extLst>
+          </p:cNvPr>
+          <p:cNvCxnSpPr>
+            <a:cxnSpLocks/>
+          </p:cNvCxnSpPr>
+          <p:nvPr/>
+        </p:nvCxnSpPr>
+        <p:spPr>
+          <a:xfrm>
+            <a:off x="304800" y="3010911"/>
+            <a:ext cx="1500851" cy="3688"/>
+          </a:xfrm>
+          <a:prstGeom prst="straightConnector1">
+            <a:avLst/>
+          </a:prstGeom>
+          <a:ln w="19050">
+            <a:solidFill>
+              <a:srgbClr val="00B050"/>
+            </a:solidFill>
+            <a:tailEnd type="arrow"/>
+          </a:ln>
+        </p:spPr>
+        <p:style>
+          <a:lnRef idx="1">
+            <a:schemeClr val="accent1"/>
+          </a:lnRef>
+          <a:fillRef idx="0">
+            <a:schemeClr val="accent1"/>
+          </a:fillRef>
+          <a:effectRef idx="0">
+            <a:schemeClr val="accent1"/>
+          </a:effectRef>
+          <a:fontRef idx="minor">
+            <a:schemeClr val="tx1"/>
+          </a:fontRef>
+        </p:style>
+      </p:cxnSp>
+      <p:cxnSp>
+        <p:nvCxnSpPr>
+          <p:cNvPr id="13" name="Straight Arrow Connector 12">
+            <a:extLst>
+              <a:ext uri="{FF2B5EF4-FFF2-40B4-BE49-F238E27FC236}">
+                <a16:creationId xmlns:a16="http://schemas.microsoft.com/office/drawing/2014/main" id="{DA0F4D5A-5F9B-4B5C-83D7-0D4BB418E922}"/>
+              </a:ext>
+            </a:extLst>
+          </p:cNvPr>
+          <p:cNvCxnSpPr/>
+          <p:nvPr/>
+        </p:nvCxnSpPr>
+        <p:spPr>
+          <a:xfrm flipV="1">
+            <a:off x="1958051" y="3122097"/>
+            <a:ext cx="1596514" cy="1"/>
+          </a:xfrm>
+          <a:prstGeom prst="straightConnector1">
+            <a:avLst/>
+          </a:prstGeom>
+          <a:ln w="19050">
+            <a:solidFill>
+              <a:srgbClr val="0070C0"/>
+            </a:solidFill>
+            <a:tailEnd type="arrow"/>
+          </a:ln>
+        </p:spPr>
+        <p:style>
+          <a:lnRef idx="1">
+            <a:schemeClr val="accent1"/>
+          </a:lnRef>
+          <a:fillRef idx="0">
+            <a:schemeClr val="accent1"/>
+          </a:fillRef>
+          <a:effectRef idx="0">
+            <a:schemeClr val="accent1"/>
+          </a:effectRef>
+          <a:fontRef idx="minor">
+            <a:schemeClr val="tx1"/>
+          </a:fontRef>
+        </p:style>
+      </p:cxnSp>
+      <p:sp>
+        <p:nvSpPr>
+          <p:cNvPr id="14" name="TextBox 13">
+            <a:extLst>
+              <a:ext uri="{FF2B5EF4-FFF2-40B4-BE49-F238E27FC236}">
+                <a16:creationId xmlns:a16="http://schemas.microsoft.com/office/drawing/2014/main" id="{3DE6AEA3-D439-43FC-AC4E-BDDBAB161AF6}"/>
+              </a:ext>
+            </a:extLst>
+          </p:cNvPr>
+          <p:cNvSpPr txBox="1"/>
+          <p:nvPr/>
+        </p:nvSpPr>
+        <p:spPr>
+          <a:xfrm>
+            <a:off x="128586" y="2743200"/>
+            <a:ext cx="1601060" cy="215444"/>
+          </a:xfrm>
+          <a:prstGeom prst="rect">
+            <a:avLst/>
+          </a:prstGeom>
+          <a:noFill/>
+        </p:spPr>
+        <p:txBody>
+          <a:bodyPr wrap="square" lIns="0" tIns="0" rIns="0" bIns="0" rtlCol="0">
+            <a:spAutoFit/>
+          </a:bodyPr>
+          <a:lstStyle/>
+          <a:p>
+            <a:pPr algn="r"/>
+            <a:r>
+              <a:rPr lang="en-US" sz="1400" dirty="0">
+                <a:solidFill>
+                  <a:srgbClr val="0070C0"/>
+                </a:solidFill>
+              </a:rPr>
+              <a:t>execute(“help add”)</a:t>
+            </a:r>
+          </a:p>
+        </p:txBody>
+      </p:sp>
+      <p:cxnSp>
+        <p:nvCxnSpPr>
+          <p:cNvPr id="15" name="Straight Arrow Connector 14">
+            <a:extLst>
+              <a:ext uri="{FF2B5EF4-FFF2-40B4-BE49-F238E27FC236}">
+                <a16:creationId xmlns:a16="http://schemas.microsoft.com/office/drawing/2014/main" id="{D5F243ED-FDA8-4F4D-91D1-1E4D51621AF9}"/>
+              </a:ext>
+            </a:extLst>
+          </p:cNvPr>
+          <p:cNvCxnSpPr/>
+          <p:nvPr/>
+        </p:nvCxnSpPr>
+        <p:spPr>
+          <a:xfrm flipV="1">
+            <a:off x="5562018" y="3703214"/>
+            <a:ext cx="922392" cy="1"/>
+          </a:xfrm>
+          <a:prstGeom prst="straightConnector1">
+            <a:avLst/>
+          </a:prstGeom>
+          <a:ln w="19050">
+            <a:solidFill>
+              <a:srgbClr val="0070C0"/>
+            </a:solidFill>
+            <a:tailEnd type="arrow"/>
+          </a:ln>
+        </p:spPr>
+        <p:style>
+          <a:lnRef idx="1">
+            <a:schemeClr val="accent1"/>
+          </a:lnRef>
+          <a:fillRef idx="0">
+            <a:schemeClr val="accent1"/>
+          </a:fillRef>
+          <a:effectRef idx="0">
+            <a:schemeClr val="accent1"/>
+          </a:effectRef>
+          <a:fontRef idx="minor">
+            <a:schemeClr val="tx1"/>
+          </a:fontRef>
+        </p:style>
+      </p:cxnSp>
+      <p:sp>
+        <p:nvSpPr>
+          <p:cNvPr id="16" name="TextBox 15">
+            <a:extLst>
+              <a:ext uri="{FF2B5EF4-FFF2-40B4-BE49-F238E27FC236}">
+                <a16:creationId xmlns:a16="http://schemas.microsoft.com/office/drawing/2014/main" id="{6112631E-2FBD-4EA2-B6E7-C4AE7DF419F0}"/>
+              </a:ext>
+            </a:extLst>
+          </p:cNvPr>
+          <p:cNvSpPr txBox="1"/>
+          <p:nvPr/>
+        </p:nvSpPr>
+        <p:spPr>
+          <a:xfrm>
+            <a:off x="4562382" y="4251556"/>
+            <a:ext cx="855809" cy="215444"/>
+          </a:xfrm>
+          <a:prstGeom prst="rect">
+            <a:avLst/>
+          </a:prstGeom>
+          <a:noFill/>
+        </p:spPr>
+        <p:txBody>
+          <a:bodyPr wrap="square" lIns="0" tIns="0" rIns="0" bIns="0" rtlCol="0">
+            <a:spAutoFit/>
+          </a:bodyPr>
+          <a:lstStyle>
+            <a:defPPr>
+              <a:defRPr lang="en-US"/>
+            </a:defPPr>
+            <a:lvl1pPr algn="r">
+              <a:defRPr sz="1400">
+                <a:solidFill>
+                  <a:srgbClr val="0070C0"/>
+                </a:solidFill>
+              </a:defRPr>
+            </a:lvl1pPr>
+          </a:lstStyle>
+          <a:p>
+            <a:r>
+              <a:rPr lang="en-US" dirty="0"/>
+              <a:t>execute()</a:t>
+            </a:r>
+          </a:p>
+        </p:txBody>
+      </p:sp>
+      <p:cxnSp>
+        <p:nvCxnSpPr>
+          <p:cNvPr id="17" name="Straight Arrow Connector 16">
+            <a:extLst>
+              <a:ext uri="{FF2B5EF4-FFF2-40B4-BE49-F238E27FC236}">
+                <a16:creationId xmlns:a16="http://schemas.microsoft.com/office/drawing/2014/main" id="{804047D8-24A9-47B1-918F-253C54770D44}"/>
+              </a:ext>
+            </a:extLst>
+          </p:cNvPr>
+          <p:cNvCxnSpPr/>
+          <p:nvPr/>
+        </p:nvCxnSpPr>
+        <p:spPr>
+          <a:xfrm>
+            <a:off x="5562600" y="4050281"/>
+            <a:ext cx="1492974" cy="0"/>
+          </a:xfrm>
+          <a:prstGeom prst="straightConnector1">
+            <a:avLst/>
+          </a:prstGeom>
+          <a:ln w="19050">
+            <a:solidFill>
+              <a:srgbClr val="0070C0"/>
+            </a:solidFill>
+            <a:prstDash val="sysDash"/>
+            <a:headEnd type="arrow" w="med" len="med"/>
+            <a:tailEnd type="none" w="med" len="med"/>
+          </a:ln>
+        </p:spPr>
+        <p:style>
+          <a:lnRef idx="1">
+            <a:schemeClr val="accent1"/>
+          </a:lnRef>
+          <a:fillRef idx="0">
+            <a:schemeClr val="accent1"/>
+          </a:fillRef>
+          <a:effectRef idx="0">
+            <a:schemeClr val="accent1"/>
+          </a:effectRef>
+          <a:fontRef idx="minor">
+            <a:schemeClr val="tx1"/>
+          </a:fontRef>
+        </p:style>
+      </p:cxnSp>
+      <p:cxnSp>
+        <p:nvCxnSpPr>
+          <p:cNvPr id="18" name="Straight Arrow Connector 17">
+            <a:extLst>
+              <a:ext uri="{FF2B5EF4-FFF2-40B4-BE49-F238E27FC236}">
+                <a16:creationId xmlns:a16="http://schemas.microsoft.com/office/drawing/2014/main" id="{EFBC9080-C13E-46B7-A8D5-A06594BCCFCC}"/>
+              </a:ext>
+            </a:extLst>
+          </p:cNvPr>
+          <p:cNvCxnSpPr/>
+          <p:nvPr/>
+        </p:nvCxnSpPr>
+        <p:spPr>
+          <a:xfrm flipV="1">
+            <a:off x="1974986" y="4243231"/>
+            <a:ext cx="1596514" cy="5378"/>
+          </a:xfrm>
+          <a:prstGeom prst="straightConnector1">
+            <a:avLst/>
+          </a:prstGeom>
+          <a:ln w="19050">
+            <a:solidFill>
+              <a:srgbClr val="0070C0"/>
+            </a:solidFill>
+            <a:prstDash val="sysDash"/>
+            <a:headEnd type="arrow" w="med" len="med"/>
+            <a:tailEnd type="none" w="med" len="med"/>
+          </a:ln>
+        </p:spPr>
+        <p:style>
+          <a:lnRef idx="1">
+            <a:schemeClr val="accent1"/>
+          </a:lnRef>
+          <a:fillRef idx="0">
+            <a:schemeClr val="accent1"/>
+          </a:fillRef>
+          <a:effectRef idx="0">
+            <a:schemeClr val="accent1"/>
+          </a:effectRef>
+          <a:fontRef idx="minor">
+            <a:schemeClr val="tx1"/>
+          </a:fontRef>
+        </p:style>
+      </p:cxnSp>
+      <p:cxnSp>
+        <p:nvCxnSpPr>
+          <p:cNvPr id="19" name="Straight Arrow Connector 18">
+            <a:extLst>
+              <a:ext uri="{FF2B5EF4-FFF2-40B4-BE49-F238E27FC236}">
+                <a16:creationId xmlns:a16="http://schemas.microsoft.com/office/drawing/2014/main" id="{7C671CE4-FDB7-4707-9183-734677524F53}"/>
+              </a:ext>
+            </a:extLst>
+          </p:cNvPr>
+          <p:cNvCxnSpPr/>
+          <p:nvPr/>
+        </p:nvCxnSpPr>
+        <p:spPr>
+          <a:xfrm>
+            <a:off x="609600" y="5791200"/>
+            <a:ext cx="1196051" cy="0"/>
+          </a:xfrm>
+          <a:prstGeom prst="straightConnector1">
+            <a:avLst/>
+          </a:prstGeom>
+          <a:ln w="19050">
+            <a:solidFill>
+              <a:schemeClr val="accent1"/>
+            </a:solidFill>
+            <a:prstDash val="sysDash"/>
+            <a:headEnd type="arrow" w="med" len="med"/>
+            <a:tailEnd type="none" w="med" len="med"/>
+          </a:ln>
+        </p:spPr>
+        <p:style>
+          <a:lnRef idx="1">
+            <a:schemeClr val="accent1"/>
+          </a:lnRef>
+          <a:fillRef idx="0">
+            <a:schemeClr val="accent1"/>
+          </a:fillRef>
+          <a:effectRef idx="0">
+            <a:schemeClr val="accent1"/>
+          </a:effectRef>
+          <a:fontRef idx="minor">
+            <a:schemeClr val="tx1"/>
+          </a:fontRef>
+        </p:style>
+      </p:cxnSp>
+      <p:cxnSp>
+        <p:nvCxnSpPr>
+          <p:cNvPr id="20" name="Straight Arrow Connector 19">
+            <a:extLst>
+              <a:ext uri="{FF2B5EF4-FFF2-40B4-BE49-F238E27FC236}">
+                <a16:creationId xmlns:a16="http://schemas.microsoft.com/office/drawing/2014/main" id="{3E839FFA-170A-4B13-A484-A5E26EC6E2A7}"/>
+              </a:ext>
+            </a:extLst>
+          </p:cNvPr>
+          <p:cNvCxnSpPr/>
+          <p:nvPr/>
+        </p:nvCxnSpPr>
+        <p:spPr>
+          <a:xfrm>
+            <a:off x="1958051" y="4495317"/>
+            <a:ext cx="5043123" cy="0"/>
+          </a:xfrm>
+          <a:prstGeom prst="straightConnector1">
+            <a:avLst/>
+          </a:prstGeom>
+          <a:ln w="19050">
+            <a:solidFill>
+              <a:srgbClr val="0070C0"/>
+            </a:solidFill>
+            <a:tailEnd type="arrow"/>
+          </a:ln>
+        </p:spPr>
+        <p:style>
+          <a:lnRef idx="1">
+            <a:schemeClr val="accent1"/>
+          </a:lnRef>
+          <a:fillRef idx="0">
+            <a:schemeClr val="accent1"/>
+          </a:fillRef>
+          <a:effectRef idx="0">
+            <a:schemeClr val="accent1"/>
+          </a:effectRef>
+          <a:fontRef idx="minor">
+            <a:schemeClr val="tx1"/>
+          </a:fontRef>
+        </p:style>
+      </p:cxnSp>
+      <p:sp>
+        <p:nvSpPr>
+          <p:cNvPr id="21" name="Rectangle 20">
+            <a:extLst>
+              <a:ext uri="{FF2B5EF4-FFF2-40B4-BE49-F238E27FC236}">
+                <a16:creationId xmlns:a16="http://schemas.microsoft.com/office/drawing/2014/main" id="{55E4DA0D-E006-4A63-938A-94C968C9D770}"/>
+              </a:ext>
+            </a:extLst>
+          </p:cNvPr>
+          <p:cNvSpPr/>
+          <p:nvPr/>
+        </p:nvSpPr>
+        <p:spPr>
+          <a:xfrm>
+            <a:off x="6992252" y="4467000"/>
+            <a:ext cx="161322" cy="1019400"/>
+          </a:xfrm>
+          <a:prstGeom prst="rect">
+            <a:avLst/>
+          </a:prstGeom>
+          <a:solidFill>
+            <a:srgbClr val="0070C0"/>
+          </a:solidFill>
+          <a:ln>
+            <a:solidFill>
+              <a:srgbClr val="0070C0"/>
+            </a:solidFill>
+          </a:ln>
+          <a:effectLst/>
+        </p:spPr>
+        <p:style>
+          <a:lnRef idx="1">
+            <a:schemeClr val="accent3"/>
+          </a:lnRef>
+          <a:fillRef idx="2">
+            <a:schemeClr val="accent3"/>
+          </a:fillRef>
+          <a:effectRef idx="1">
+            <a:schemeClr val="accent3"/>
+          </a:effectRef>
+          <a:fontRef idx="minor">
+            <a:schemeClr val="dk1"/>
+          </a:fontRef>
+        </p:style>
+        <p:txBody>
+          <a:bodyPr rtlCol="0" anchor="ctr"/>
+          <a:lstStyle/>
+          <a:p>
+            <a:pPr algn="ctr"/>
+            <a:endParaRPr lang="en-SG" sz="1400"/>
+          </a:p>
+        </p:txBody>
+      </p:sp>
+      <p:cxnSp>
+        <p:nvCxnSpPr>
+          <p:cNvPr id="23" name="Straight Arrow Connector 22">
+            <a:extLst>
+              <a:ext uri="{FF2B5EF4-FFF2-40B4-BE49-F238E27FC236}">
+                <a16:creationId xmlns:a16="http://schemas.microsoft.com/office/drawing/2014/main" id="{AE74C377-6E48-4CF4-BCE3-CA1F2B17CA8D}"/>
+              </a:ext>
+            </a:extLst>
+          </p:cNvPr>
+          <p:cNvCxnSpPr/>
+          <p:nvPr/>
+        </p:nvCxnSpPr>
+        <p:spPr>
+          <a:xfrm>
+            <a:off x="1958051" y="5486400"/>
+            <a:ext cx="5052349" cy="0"/>
+          </a:xfrm>
+          <a:prstGeom prst="straightConnector1">
+            <a:avLst/>
+          </a:prstGeom>
+          <a:ln w="19050">
+            <a:solidFill>
+              <a:srgbClr val="0070C0"/>
+            </a:solidFill>
+            <a:prstDash val="sysDash"/>
+            <a:headEnd type="arrow" w="med" len="med"/>
+            <a:tailEnd type="none" w="med" len="med"/>
+          </a:ln>
+        </p:spPr>
+        <p:style>
+          <a:lnRef idx="1">
+            <a:schemeClr val="accent1"/>
+          </a:lnRef>
+          <a:fillRef idx="0">
+            <a:schemeClr val="accent1"/>
+          </a:fillRef>
+          <a:effectRef idx="0">
+            <a:schemeClr val="accent1"/>
+          </a:effectRef>
+          <a:fontRef idx="minor">
+            <a:schemeClr val="tx1"/>
+          </a:fontRef>
+        </p:style>
+      </p:cxnSp>
+      <p:sp>
+        <p:nvSpPr>
+          <p:cNvPr id="25" name="TextBox 24">
+            <a:extLst>
+              <a:ext uri="{FF2B5EF4-FFF2-40B4-BE49-F238E27FC236}">
+                <a16:creationId xmlns:a16="http://schemas.microsoft.com/office/drawing/2014/main" id="{E43051CC-2900-402B-B543-48D121F73955}"/>
+              </a:ext>
+            </a:extLst>
+          </p:cNvPr>
+          <p:cNvSpPr txBox="1"/>
+          <p:nvPr/>
+        </p:nvSpPr>
+        <p:spPr>
+          <a:xfrm>
+            <a:off x="4152351" y="3657600"/>
+            <a:ext cx="848892" cy="184666"/>
+          </a:xfrm>
+          <a:prstGeom prst="rect">
+            <a:avLst/>
+          </a:prstGeom>
+          <a:noFill/>
+        </p:spPr>
+        <p:txBody>
+          <a:bodyPr wrap="square" lIns="0" tIns="0" rIns="0" bIns="0" rtlCol="0">
+            <a:spAutoFit/>
+          </a:bodyPr>
+          <a:lstStyle>
+            <a:defPPr>
+              <a:defRPr lang="en-US"/>
+            </a:defPPr>
+            <a:lvl1pPr algn="r">
+              <a:defRPr sz="1400">
+                <a:solidFill>
+                  <a:srgbClr val="0070C0"/>
+                </a:solidFill>
+              </a:defRPr>
+            </a:lvl1pPr>
+          </a:lstStyle>
+          <a:p>
+            <a:r>
+              <a:rPr lang="en-US" sz="1200" dirty="0"/>
+              <a:t>parse(“add”)</a:t>
+            </a:r>
+          </a:p>
+        </p:txBody>
+      </p:sp>
+      <p:sp>
+        <p:nvSpPr>
+          <p:cNvPr id="26" name="TextBox 25">
+            <a:extLst>
+              <a:ext uri="{FF2B5EF4-FFF2-40B4-BE49-F238E27FC236}">
+                <a16:creationId xmlns:a16="http://schemas.microsoft.com/office/drawing/2014/main" id="{A5E4B687-95E9-44FD-870D-EA6246D15BA9}"/>
+              </a:ext>
+            </a:extLst>
+          </p:cNvPr>
+          <p:cNvSpPr txBox="1"/>
+          <p:nvPr/>
+        </p:nvSpPr>
+        <p:spPr>
+          <a:xfrm>
+            <a:off x="2047782" y="2850922"/>
+            <a:ext cx="1424846" cy="215444"/>
+          </a:xfrm>
+          <a:prstGeom prst="rect">
+            <a:avLst/>
+          </a:prstGeom>
+          <a:noFill/>
+        </p:spPr>
+        <p:txBody>
+          <a:bodyPr wrap="square" lIns="0" tIns="0" rIns="0" bIns="0" rtlCol="0">
+            <a:spAutoFit/>
+          </a:bodyPr>
+          <a:lstStyle>
+            <a:defPPr>
+              <a:defRPr lang="en-US"/>
+            </a:defPPr>
+            <a:lvl1pPr algn="r">
+              <a:defRPr sz="1400">
+                <a:solidFill>
+                  <a:srgbClr val="0070C0"/>
+                </a:solidFill>
+              </a:defRPr>
+            </a:lvl1pPr>
+          </a:lstStyle>
+          <a:p>
+            <a:r>
+              <a:rPr lang="en-US" dirty="0"/>
+              <a:t>parse(“help add”)</a:t>
+            </a:r>
+          </a:p>
+        </p:txBody>
+      </p:sp>
+      <p:sp>
+        <p:nvSpPr>
+          <p:cNvPr id="27" name="TextBox 26">
+            <a:extLst>
+              <a:ext uri="{FF2B5EF4-FFF2-40B4-BE49-F238E27FC236}">
+                <a16:creationId xmlns:a16="http://schemas.microsoft.com/office/drawing/2014/main" id="{6F5082C4-2F53-458B-B416-31B3CC5ACED1}"/>
+              </a:ext>
+            </a:extLst>
+          </p:cNvPr>
+          <p:cNvSpPr txBox="1"/>
+          <p:nvPr/>
+        </p:nvSpPr>
+        <p:spPr>
+          <a:xfrm>
+            <a:off x="4644937" y="5255323"/>
+            <a:ext cx="621216" cy="215444"/>
+          </a:xfrm>
+          <a:prstGeom prst="rect">
+            <a:avLst/>
+          </a:prstGeom>
+          <a:noFill/>
+        </p:spPr>
+        <p:txBody>
+          <a:bodyPr wrap="square" lIns="0" tIns="0" rIns="0" bIns="0" rtlCol="0">
+            <a:spAutoFit/>
+          </a:bodyPr>
+          <a:lstStyle>
+            <a:defPPr>
+              <a:defRPr lang="en-US"/>
+            </a:defPPr>
+            <a:lvl1pPr algn="r">
+              <a:defRPr sz="1400">
+                <a:solidFill>
+                  <a:srgbClr val="0070C0"/>
+                </a:solidFill>
+              </a:defRPr>
+            </a:lvl1pPr>
+          </a:lstStyle>
+          <a:p>
+            <a:r>
+              <a:rPr lang="en-US" dirty="0"/>
+              <a:t>result</a:t>
+            </a:r>
+          </a:p>
+        </p:txBody>
+      </p:sp>
+      <p:sp>
+        <p:nvSpPr>
+          <p:cNvPr id="28" name="TextBox 27">
+            <a:extLst>
+              <a:ext uri="{FF2B5EF4-FFF2-40B4-BE49-F238E27FC236}">
+                <a16:creationId xmlns:a16="http://schemas.microsoft.com/office/drawing/2014/main" id="{95BF9A39-556F-431D-94D0-FCB3E75279C6}"/>
+              </a:ext>
+            </a:extLst>
+          </p:cNvPr>
+          <p:cNvSpPr txBox="1"/>
+          <p:nvPr/>
+        </p:nvSpPr>
+        <p:spPr>
+          <a:xfrm>
+            <a:off x="904783" y="5538488"/>
+            <a:ext cx="762000" cy="215444"/>
+          </a:xfrm>
+          <a:prstGeom prst="rect">
+            <a:avLst/>
+          </a:prstGeom>
+          <a:noFill/>
+        </p:spPr>
+        <p:txBody>
+          <a:bodyPr wrap="square" lIns="0" tIns="0" rIns="0" bIns="0" rtlCol="0">
+            <a:spAutoFit/>
+          </a:bodyPr>
+          <a:lstStyle>
+            <a:defPPr>
+              <a:defRPr lang="en-US"/>
+            </a:defPPr>
+            <a:lvl1pPr algn="r">
+              <a:defRPr sz="1400">
+                <a:solidFill>
+                  <a:srgbClr val="0070C0"/>
+                </a:solidFill>
+              </a:defRPr>
+            </a:lvl1pPr>
+          </a:lstStyle>
+          <a:p>
+            <a:r>
+              <a:rPr lang="en-US" dirty="0"/>
+              <a:t>result</a:t>
+            </a:r>
+          </a:p>
+        </p:txBody>
+      </p:sp>
+      <p:sp>
+        <p:nvSpPr>
+          <p:cNvPr id="29" name="Rectangle 62">
+            <a:extLst>
+              <a:ext uri="{FF2B5EF4-FFF2-40B4-BE49-F238E27FC236}">
+                <a16:creationId xmlns:a16="http://schemas.microsoft.com/office/drawing/2014/main" id="{ECFDDF23-F057-4E42-89C7-780E2CB29DDB}"/>
+              </a:ext>
+            </a:extLst>
+          </p:cNvPr>
+          <p:cNvSpPr/>
+          <p:nvPr/>
+        </p:nvSpPr>
+        <p:spPr>
+          <a:xfrm>
+            <a:off x="7325046" y="4777286"/>
+            <a:ext cx="1590354" cy="461538"/>
+          </a:xfrm>
+          <a:prstGeom prst="rect">
+            <a:avLst/>
+          </a:prstGeom>
+          <a:solidFill>
+            <a:srgbClr val="0070C0"/>
+          </a:solidFill>
+          <a:ln w="19050">
+            <a:solidFill>
+              <a:srgbClr val="0070C0"/>
+            </a:solidFill>
+          </a:ln>
+          <a:effectLst/>
+        </p:spPr>
+        <p:style>
+          <a:lnRef idx="1">
+            <a:schemeClr val="accent2"/>
+          </a:lnRef>
+          <a:fillRef idx="2">
+            <a:schemeClr val="accent2"/>
+          </a:fillRef>
+          <a:effectRef idx="1">
+            <a:schemeClr val="accent2"/>
+          </a:effectRef>
+          <a:fontRef idx="minor">
+            <a:schemeClr val="dk1"/>
+          </a:fontRef>
+        </p:style>
+        <p:txBody>
+          <a:bodyPr rtlCol="0" anchor="ctr"/>
+          <a:lstStyle/>
+          <a:p>
+            <a:pPr algn="ctr"/>
+            <a:r>
+              <a:rPr lang="en-US" sz="1600" dirty="0" err="1">
+                <a:solidFill>
+                  <a:schemeClr val="bg1"/>
+                </a:solidFill>
+              </a:rPr>
+              <a:t>result:Command</a:t>
+            </a:r>
+            <a:r>
+              <a:rPr lang="en-US" sz="1600" dirty="0">
+                <a:solidFill>
+                  <a:schemeClr val="bg1"/>
+                </a:solidFill>
+              </a:rPr>
+              <a:t> Result</a:t>
+            </a:r>
+            <a:endParaRPr lang="en-SG" sz="1600" dirty="0">
+              <a:solidFill>
+                <a:schemeClr val="bg1"/>
+              </a:solidFill>
+            </a:endParaRPr>
+          </a:p>
+        </p:txBody>
+      </p:sp>
+      <p:sp>
+        <p:nvSpPr>
+          <p:cNvPr id="30" name="Rectangle 29">
+            <a:extLst>
+              <a:ext uri="{FF2B5EF4-FFF2-40B4-BE49-F238E27FC236}">
+                <a16:creationId xmlns:a16="http://schemas.microsoft.com/office/drawing/2014/main" id="{FC29F18A-1870-4CFC-B736-9C4B0DC1894F}"/>
+              </a:ext>
+            </a:extLst>
+          </p:cNvPr>
+          <p:cNvSpPr/>
+          <p:nvPr/>
+        </p:nvSpPr>
+        <p:spPr>
+          <a:xfrm>
+            <a:off x="8082123" y="5238824"/>
+            <a:ext cx="152400" cy="171376"/>
+          </a:xfrm>
+          <a:prstGeom prst="rect">
+            <a:avLst/>
+          </a:prstGeom>
+          <a:solidFill>
+            <a:srgbClr val="0070C0"/>
+          </a:solidFill>
+          <a:ln>
+            <a:solidFill>
+              <a:srgbClr val="0070C0"/>
+            </a:solidFill>
+          </a:ln>
+          <a:effectLst/>
+        </p:spPr>
+        <p:style>
+          <a:lnRef idx="1">
+            <a:schemeClr val="accent3"/>
+          </a:lnRef>
+          <a:fillRef idx="2">
+            <a:schemeClr val="accent3"/>
+          </a:fillRef>
+          <a:effectRef idx="1">
+            <a:schemeClr val="accent3"/>
+          </a:effectRef>
+          <a:fontRef idx="minor">
+            <a:schemeClr val="dk1"/>
+          </a:fontRef>
+        </p:style>
+        <p:txBody>
+          <a:bodyPr rtlCol="0" anchor="ctr"/>
+          <a:lstStyle/>
+          <a:p>
+            <a:pPr algn="ctr"/>
+            <a:endParaRPr lang="en-SG" sz="1400"/>
+          </a:p>
+        </p:txBody>
+      </p:sp>
+      <p:cxnSp>
+        <p:nvCxnSpPr>
+          <p:cNvPr id="31" name="Straight Arrow Connector 30">
+            <a:extLst>
+              <a:ext uri="{FF2B5EF4-FFF2-40B4-BE49-F238E27FC236}">
+                <a16:creationId xmlns:a16="http://schemas.microsoft.com/office/drawing/2014/main" id="{C030B6A0-6A19-4A0E-BAE3-AEAC145A5006}"/>
+              </a:ext>
+            </a:extLst>
+          </p:cNvPr>
+          <p:cNvCxnSpPr/>
+          <p:nvPr/>
+        </p:nvCxnSpPr>
+        <p:spPr>
+          <a:xfrm>
+            <a:off x="7162800" y="5410200"/>
+            <a:ext cx="966624" cy="0"/>
+          </a:xfrm>
+          <a:prstGeom prst="straightConnector1">
+            <a:avLst/>
+          </a:prstGeom>
+          <a:ln w="19050">
+            <a:solidFill>
+              <a:srgbClr val="0070C0"/>
+            </a:solidFill>
+            <a:prstDash val="sysDash"/>
+            <a:headEnd type="arrow" w="med" len="med"/>
+            <a:tailEnd type="none" w="med" len="med"/>
+          </a:ln>
+        </p:spPr>
+        <p:style>
+          <a:lnRef idx="1">
+            <a:schemeClr val="accent1"/>
+          </a:lnRef>
+          <a:fillRef idx="0">
+            <a:schemeClr val="accent1"/>
+          </a:fillRef>
+          <a:effectRef idx="0">
+            <a:schemeClr val="accent1"/>
+          </a:effectRef>
+          <a:fontRef idx="minor">
+            <a:schemeClr val="tx1"/>
+          </a:fontRef>
+        </p:style>
+      </p:cxnSp>
+      <p:sp>
+        <p:nvSpPr>
+          <p:cNvPr id="32" name="TextBox 31">
+            <a:extLst>
+              <a:ext uri="{FF2B5EF4-FFF2-40B4-BE49-F238E27FC236}">
+                <a16:creationId xmlns:a16="http://schemas.microsoft.com/office/drawing/2014/main" id="{94B8DD40-2EED-46FF-A635-F297A5F1A14A}"/>
+              </a:ext>
+            </a:extLst>
+          </p:cNvPr>
+          <p:cNvSpPr txBox="1"/>
+          <p:nvPr/>
+        </p:nvSpPr>
+        <p:spPr>
+          <a:xfrm>
+            <a:off x="2978645" y="4027787"/>
+            <a:ext cx="220343" cy="215444"/>
+          </a:xfrm>
+          <a:prstGeom prst="rect">
+            <a:avLst/>
+          </a:prstGeom>
+          <a:noFill/>
+        </p:spPr>
+        <p:txBody>
+          <a:bodyPr wrap="square" lIns="0" tIns="0" rIns="0" bIns="0" rtlCol="0">
+            <a:spAutoFit/>
+          </a:bodyPr>
+          <a:lstStyle>
+            <a:defPPr>
+              <a:defRPr lang="en-US"/>
+            </a:defPPr>
+            <a:lvl1pPr algn="r">
+              <a:defRPr sz="1400">
+                <a:solidFill>
+                  <a:srgbClr val="0070C0"/>
+                </a:solidFill>
+              </a:defRPr>
+            </a:lvl1pPr>
+          </a:lstStyle>
+          <a:p>
+            <a:r>
+              <a:rPr lang="en-US" dirty="0" err="1"/>
+              <a:t>lc</a:t>
+            </a:r>
+            <a:endParaRPr lang="en-US" dirty="0"/>
+          </a:p>
+        </p:txBody>
+      </p:sp>
+      <p:sp>
+        <p:nvSpPr>
+          <p:cNvPr id="33" name="Rectangle 62">
+            <a:extLst>
+              <a:ext uri="{FF2B5EF4-FFF2-40B4-BE49-F238E27FC236}">
+                <a16:creationId xmlns:a16="http://schemas.microsoft.com/office/drawing/2014/main" id="{2DF20F4E-211E-484C-AA14-A92EF5F646F5}"/>
+              </a:ext>
+            </a:extLst>
+          </p:cNvPr>
+          <p:cNvSpPr/>
+          <p:nvPr/>
+        </p:nvSpPr>
+        <p:spPr>
+          <a:xfrm>
+            <a:off x="4536781" y="2929839"/>
+            <a:ext cx="1778201" cy="432035"/>
+          </a:xfrm>
+          <a:prstGeom prst="rect">
+            <a:avLst/>
+          </a:prstGeom>
+          <a:solidFill>
+            <a:srgbClr val="0070C0"/>
+          </a:solidFill>
+          <a:ln w="19050">
+            <a:solidFill>
+              <a:srgbClr val="0070C0"/>
+            </a:solidFill>
+          </a:ln>
+          <a:effectLst/>
+        </p:spPr>
+        <p:style>
+          <a:lnRef idx="1">
+            <a:schemeClr val="accent2"/>
+          </a:lnRef>
+          <a:fillRef idx="2">
+            <a:schemeClr val="accent2"/>
+          </a:fillRef>
+          <a:effectRef idx="1">
+            <a:schemeClr val="accent2"/>
+          </a:effectRef>
+          <a:fontRef idx="minor">
+            <a:schemeClr val="dk1"/>
+          </a:fontRef>
+        </p:style>
+        <p:txBody>
+          <a:bodyPr rtlCol="0" anchor="ctr"/>
+          <a:lstStyle/>
+          <a:p>
+            <a:pPr algn="ctr"/>
+            <a:r>
+              <a:rPr lang="en-US" sz="1600" dirty="0">
+                <a:solidFill>
+                  <a:schemeClr val="bg1"/>
+                </a:solidFill>
+              </a:rPr>
+              <a:t>:</a:t>
+            </a:r>
+            <a:r>
+              <a:rPr lang="en-US" sz="1600" dirty="0" err="1">
+                <a:solidFill>
+                  <a:schemeClr val="bg1"/>
+                </a:solidFill>
+              </a:rPr>
+              <a:t>HelpCommand</a:t>
+            </a:r>
+            <a:endParaRPr lang="en-US" sz="1600" dirty="0">
+              <a:solidFill>
+                <a:schemeClr val="bg1"/>
+              </a:solidFill>
+            </a:endParaRPr>
+          </a:p>
+          <a:p>
+            <a:pPr algn="ctr"/>
+            <a:r>
+              <a:rPr lang="en-US" sz="1600" dirty="0">
+                <a:solidFill>
+                  <a:schemeClr val="bg1"/>
+                </a:solidFill>
+              </a:rPr>
+              <a:t>Parser</a:t>
+            </a:r>
+            <a:endParaRPr lang="en-SG" sz="1600" dirty="0">
+              <a:solidFill>
+                <a:schemeClr val="bg1"/>
+              </a:solidFill>
+            </a:endParaRPr>
+          </a:p>
+        </p:txBody>
+      </p:sp>
+      <p:cxnSp>
+        <p:nvCxnSpPr>
+          <p:cNvPr id="34" name="Straight Arrow Connector 33">
+            <a:extLst>
+              <a:ext uri="{FF2B5EF4-FFF2-40B4-BE49-F238E27FC236}">
+                <a16:creationId xmlns:a16="http://schemas.microsoft.com/office/drawing/2014/main" id="{3544A6C8-CCC3-4D5E-AA59-51D51CCA3C8D}"/>
+              </a:ext>
+            </a:extLst>
+          </p:cNvPr>
+          <p:cNvCxnSpPr/>
+          <p:nvPr/>
+        </p:nvCxnSpPr>
+        <p:spPr>
+          <a:xfrm>
+            <a:off x="3767391" y="3657600"/>
+            <a:ext cx="1597356" cy="1"/>
+          </a:xfrm>
+          <a:prstGeom prst="straightConnector1">
+            <a:avLst/>
+          </a:prstGeom>
+          <a:ln w="19050">
+            <a:headEnd type="none" w="med" len="med"/>
+            <a:tailEnd type="arrow" w="med" len="med"/>
+          </a:ln>
+        </p:spPr>
+        <p:style>
+          <a:lnRef idx="1">
+            <a:schemeClr val="accent1"/>
+          </a:lnRef>
+          <a:fillRef idx="0">
+            <a:schemeClr val="accent1"/>
+          </a:fillRef>
+          <a:effectRef idx="0">
+            <a:schemeClr val="accent1"/>
+          </a:effectRef>
+          <a:fontRef idx="minor">
+            <a:schemeClr val="tx1"/>
+          </a:fontRef>
+        </p:style>
+      </p:cxnSp>
+      <p:sp>
+        <p:nvSpPr>
+          <p:cNvPr id="35" name="Rectangle 34">
+            <a:extLst>
+              <a:ext uri="{FF2B5EF4-FFF2-40B4-BE49-F238E27FC236}">
+                <a16:creationId xmlns:a16="http://schemas.microsoft.com/office/drawing/2014/main" id="{6901C566-5B43-468F-ADB0-F439871458B1}"/>
+              </a:ext>
+            </a:extLst>
+          </p:cNvPr>
+          <p:cNvSpPr/>
+          <p:nvPr/>
+        </p:nvSpPr>
+        <p:spPr>
+          <a:xfrm>
+            <a:off x="5364747" y="3352800"/>
+            <a:ext cx="205843" cy="123165"/>
+          </a:xfrm>
+          <a:prstGeom prst="rect">
+            <a:avLst/>
+          </a:prstGeom>
+          <a:solidFill>
+            <a:srgbClr val="0070C0"/>
+          </a:solidFill>
+          <a:ln>
+            <a:solidFill>
+              <a:srgbClr val="0070C0"/>
+            </a:solidFill>
+          </a:ln>
+          <a:effectLst/>
+        </p:spPr>
+        <p:style>
+          <a:lnRef idx="1">
+            <a:schemeClr val="accent3"/>
+          </a:lnRef>
+          <a:fillRef idx="2">
+            <a:schemeClr val="accent3"/>
+          </a:fillRef>
+          <a:effectRef idx="1">
+            <a:schemeClr val="accent3"/>
+          </a:effectRef>
+          <a:fontRef idx="minor">
+            <a:schemeClr val="dk1"/>
+          </a:fontRef>
+        </p:style>
+        <p:txBody>
+          <a:bodyPr rtlCol="0" anchor="ctr"/>
+          <a:lstStyle/>
+          <a:p>
+            <a:pPr algn="ctr"/>
+            <a:endParaRPr lang="en-SG" sz="1400"/>
+          </a:p>
+        </p:txBody>
+      </p:sp>
+      <p:cxnSp>
+        <p:nvCxnSpPr>
+          <p:cNvPr id="36" name="Straight Connector 35">
+            <a:extLst>
+              <a:ext uri="{FF2B5EF4-FFF2-40B4-BE49-F238E27FC236}">
+                <a16:creationId xmlns:a16="http://schemas.microsoft.com/office/drawing/2014/main" id="{187B5FC6-EB17-42F4-86B9-29A10BA7C2AE}"/>
+              </a:ext>
+            </a:extLst>
+          </p:cNvPr>
+          <p:cNvCxnSpPr>
+            <a:stCxn id="35" idx="0"/>
+          </p:cNvCxnSpPr>
+          <p:nvPr/>
+        </p:nvCxnSpPr>
+        <p:spPr>
+          <a:xfrm>
+            <a:off x="5467669" y="3352800"/>
+            <a:ext cx="0" cy="990600"/>
+          </a:xfrm>
+          <a:prstGeom prst="line">
+            <a:avLst/>
+          </a:prstGeom>
+          <a:ln w="19050">
+            <a:solidFill>
+              <a:srgbClr val="0070C0"/>
+            </a:solidFill>
+            <a:prstDash val="sysDash"/>
+          </a:ln>
+          <a:effectLst/>
+        </p:spPr>
+        <p:style>
+          <a:lnRef idx="1">
+            <a:schemeClr val="accent1"/>
+          </a:lnRef>
+          <a:fillRef idx="2">
+            <a:schemeClr val="accent1"/>
+          </a:fillRef>
+          <a:effectRef idx="1">
+            <a:schemeClr val="accent1"/>
+          </a:effectRef>
+          <a:fontRef idx="minor">
+            <a:schemeClr val="dk1"/>
+          </a:fontRef>
+        </p:style>
+      </p:cxnSp>
+      <p:sp>
+        <p:nvSpPr>
+          <p:cNvPr id="37" name="Rectangle 36">
+            <a:extLst>
+              <a:ext uri="{FF2B5EF4-FFF2-40B4-BE49-F238E27FC236}">
+                <a16:creationId xmlns:a16="http://schemas.microsoft.com/office/drawing/2014/main" id="{D54DABAB-1023-460A-BB31-22717A82833B}"/>
+              </a:ext>
+            </a:extLst>
+          </p:cNvPr>
+          <p:cNvSpPr/>
+          <p:nvPr/>
+        </p:nvSpPr>
+        <p:spPr>
+          <a:xfrm>
+            <a:off x="5364747" y="3657601"/>
+            <a:ext cx="205843" cy="533400"/>
+          </a:xfrm>
+          <a:prstGeom prst="rect">
+            <a:avLst/>
+          </a:prstGeom>
+          <a:solidFill>
+            <a:srgbClr val="0070C0"/>
+          </a:solidFill>
+          <a:ln>
+            <a:solidFill>
+              <a:srgbClr val="0070C0"/>
+            </a:solidFill>
+          </a:ln>
+          <a:effectLst/>
+        </p:spPr>
+        <p:style>
+          <a:lnRef idx="1">
+            <a:schemeClr val="accent3"/>
+          </a:lnRef>
+          <a:fillRef idx="2">
+            <a:schemeClr val="accent3"/>
+          </a:fillRef>
+          <a:effectRef idx="1">
+            <a:schemeClr val="accent3"/>
+          </a:effectRef>
+          <a:fontRef idx="minor">
+            <a:schemeClr val="dk1"/>
+          </a:fontRef>
+        </p:style>
+        <p:txBody>
+          <a:bodyPr rtlCol="0" anchor="ctr"/>
+          <a:lstStyle/>
+          <a:p>
+            <a:pPr algn="ctr"/>
+            <a:endParaRPr lang="en-SG" sz="1400"/>
+          </a:p>
+        </p:txBody>
+      </p:sp>
+      <p:cxnSp>
+        <p:nvCxnSpPr>
+          <p:cNvPr id="38" name="Straight Arrow Connector 37">
+            <a:extLst>
+              <a:ext uri="{FF2B5EF4-FFF2-40B4-BE49-F238E27FC236}">
+                <a16:creationId xmlns:a16="http://schemas.microsoft.com/office/drawing/2014/main" id="{07B1EF5C-98C3-4A65-91A3-F4156DB0E08C}"/>
+              </a:ext>
+            </a:extLst>
+          </p:cNvPr>
+          <p:cNvCxnSpPr/>
+          <p:nvPr/>
+        </p:nvCxnSpPr>
+        <p:spPr>
+          <a:xfrm>
+            <a:off x="3804182" y="4185073"/>
+            <a:ext cx="1667219" cy="0"/>
+          </a:xfrm>
+          <a:prstGeom prst="straightConnector1">
+            <a:avLst/>
+          </a:prstGeom>
+          <a:ln w="19050">
+            <a:solidFill>
+              <a:srgbClr val="0070C0"/>
+            </a:solidFill>
+            <a:prstDash val="sysDash"/>
+            <a:headEnd type="arrow" w="med" len="med"/>
+            <a:tailEnd type="none" w="med" len="med"/>
+          </a:ln>
+        </p:spPr>
+        <p:style>
+          <a:lnRef idx="1">
+            <a:schemeClr val="accent1"/>
+          </a:lnRef>
+          <a:fillRef idx="0">
+            <a:schemeClr val="accent1"/>
+          </a:fillRef>
+          <a:effectRef idx="0">
+            <a:schemeClr val="accent1"/>
+          </a:effectRef>
+          <a:fontRef idx="minor">
+            <a:schemeClr val="tx1"/>
+          </a:fontRef>
+        </p:style>
+      </p:cxnSp>
+      <p:cxnSp>
+        <p:nvCxnSpPr>
+          <p:cNvPr id="39" name="Straight Arrow Connector 38">
+            <a:extLst>
+              <a:ext uri="{FF2B5EF4-FFF2-40B4-BE49-F238E27FC236}">
+                <a16:creationId xmlns:a16="http://schemas.microsoft.com/office/drawing/2014/main" id="{596674E4-34B3-4BF4-90D7-A61D1AD71480}"/>
+              </a:ext>
+            </a:extLst>
+          </p:cNvPr>
+          <p:cNvCxnSpPr/>
+          <p:nvPr/>
+        </p:nvCxnSpPr>
+        <p:spPr>
+          <a:xfrm>
+            <a:off x="7162800" y="5029200"/>
+            <a:ext cx="162246" cy="0"/>
+          </a:xfrm>
+          <a:prstGeom prst="straightConnector1">
+            <a:avLst/>
+          </a:prstGeom>
+          <a:ln w="19050">
+            <a:headEnd type="none" w="med" len="med"/>
+            <a:tailEnd type="arrow" w="med" len="med"/>
+          </a:ln>
+        </p:spPr>
+        <p:style>
+          <a:lnRef idx="1">
+            <a:schemeClr val="accent1"/>
+          </a:lnRef>
+          <a:fillRef idx="0">
+            <a:schemeClr val="accent1"/>
+          </a:fillRef>
+          <a:effectRef idx="0">
+            <a:schemeClr val="accent1"/>
+          </a:effectRef>
+          <a:fontRef idx="minor">
+            <a:schemeClr val="tx1"/>
+          </a:fontRef>
+        </p:style>
+      </p:cxnSp>
+      <p:cxnSp>
+        <p:nvCxnSpPr>
+          <p:cNvPr id="40" name="Straight Arrow Connector 39">
+            <a:extLst>
+              <a:ext uri="{FF2B5EF4-FFF2-40B4-BE49-F238E27FC236}">
+                <a16:creationId xmlns:a16="http://schemas.microsoft.com/office/drawing/2014/main" id="{935A98C4-502D-44C9-93BB-F1A3816D4790}"/>
+              </a:ext>
+            </a:extLst>
+          </p:cNvPr>
+          <p:cNvCxnSpPr/>
+          <p:nvPr/>
+        </p:nvCxnSpPr>
+        <p:spPr>
+          <a:xfrm>
+            <a:off x="3717225" y="3173004"/>
+            <a:ext cx="819556" cy="1"/>
+          </a:xfrm>
+          <a:prstGeom prst="straightConnector1">
+            <a:avLst/>
+          </a:prstGeom>
+          <a:ln w="19050">
+            <a:solidFill>
+              <a:srgbClr val="0070C0"/>
+            </a:solidFill>
+            <a:tailEnd type="arrow"/>
+          </a:ln>
+        </p:spPr>
+        <p:style>
+          <a:lnRef idx="1">
+            <a:schemeClr val="accent1"/>
+          </a:lnRef>
+          <a:fillRef idx="0">
+            <a:schemeClr val="accent1"/>
+          </a:fillRef>
+          <a:effectRef idx="0">
+            <a:schemeClr val="accent1"/>
+          </a:effectRef>
+          <a:fontRef idx="minor">
+            <a:schemeClr val="tx1"/>
+          </a:fontRef>
+        </p:style>
+      </p:cxnSp>
+      <p:cxnSp>
+        <p:nvCxnSpPr>
+          <p:cNvPr id="41" name="Straight Arrow Connector 40">
+            <a:extLst>
+              <a:ext uri="{FF2B5EF4-FFF2-40B4-BE49-F238E27FC236}">
+                <a16:creationId xmlns:a16="http://schemas.microsoft.com/office/drawing/2014/main" id="{A3B28FAC-E376-4FBE-BA79-09F75474CA5B}"/>
+              </a:ext>
+            </a:extLst>
+          </p:cNvPr>
+          <p:cNvCxnSpPr/>
+          <p:nvPr/>
+        </p:nvCxnSpPr>
+        <p:spPr>
+          <a:xfrm>
+            <a:off x="3764319" y="3475965"/>
+            <a:ext cx="1600428" cy="0"/>
+          </a:xfrm>
+          <a:prstGeom prst="straightConnector1">
+            <a:avLst/>
+          </a:prstGeom>
+          <a:ln w="19050">
+            <a:solidFill>
+              <a:srgbClr val="0070C0"/>
+            </a:solidFill>
+            <a:prstDash val="sysDash"/>
+            <a:headEnd type="arrow" w="med" len="med"/>
+            <a:tailEnd type="none" w="med" len="med"/>
+          </a:ln>
+        </p:spPr>
+        <p:style>
+          <a:lnRef idx="1">
+            <a:schemeClr val="accent1"/>
+          </a:lnRef>
+          <a:fillRef idx="0">
+            <a:schemeClr val="accent1"/>
+          </a:fillRef>
+          <a:effectRef idx="0">
+            <a:schemeClr val="accent1"/>
+          </a:effectRef>
+          <a:fontRef idx="minor">
+            <a:schemeClr val="tx1"/>
+          </a:fontRef>
+        </p:style>
+      </p:cxnSp>
+      <p:sp>
+        <p:nvSpPr>
+          <p:cNvPr id="42" name="TextBox 41">
+            <a:extLst>
+              <a:ext uri="{FF2B5EF4-FFF2-40B4-BE49-F238E27FC236}">
+                <a16:creationId xmlns:a16="http://schemas.microsoft.com/office/drawing/2014/main" id="{60639397-D642-4779-9877-E8BDCB17BE8C}"/>
+              </a:ext>
+            </a:extLst>
+          </p:cNvPr>
+          <p:cNvSpPr txBox="1"/>
+          <p:nvPr/>
+        </p:nvSpPr>
+        <p:spPr>
+          <a:xfrm>
+            <a:off x="5338465" y="4199590"/>
+            <a:ext cx="258404" cy="261610"/>
+          </a:xfrm>
+          <a:prstGeom prst="rect">
+            <a:avLst/>
+          </a:prstGeom>
+          <a:noFill/>
+        </p:spPr>
+        <p:txBody>
+          <a:bodyPr wrap="none" rtlCol="0">
+            <a:spAutoFit/>
+          </a:bodyPr>
+          <a:lstStyle/>
+          <a:p>
+            <a:r>
+              <a:rPr lang="en-SG" sz="1100" dirty="0">
+                <a:solidFill>
+                  <a:srgbClr val="002060"/>
+                </a:solidFill>
+              </a:rPr>
+              <a:t>X</a:t>
+            </a:r>
+          </a:p>
+        </p:txBody>
+      </p:sp>
+    </p:spTree>
+    <p:extLst>
+      <p:ext uri="{BB962C8B-B14F-4D97-AF65-F5344CB8AC3E}">
+        <p14:creationId xmlns:p14="http://schemas.microsoft.com/office/powerpoint/2010/main" val="2990680355"/>
       </p:ext>
     </p:extLst>
   </p:cSld>

</xml_diff>

<commit_message>
Pull Merge from upstream
</commit_message>
<xml_diff>
--- a/docs/diagrams/LogicComponentSequenceDiagram.pptx
+++ b/docs/diagrams/LogicComponentSequenceDiagram.pptx
@@ -212,7 +212,7 @@
           <a:p>
             <a:fld id="{F5CC4B3F-88C1-4FFA-B1B6-F41C21DC6924}" type="datetimeFigureOut">
               <a:rPr lang="en-US" smtClean="0"/>
-              <a:t>7/11/2017</a:t>
+              <a:t>11/12/2017</a:t>
             </a:fld>
             <a:endParaRPr lang="en-US"/>
           </a:p>
@@ -658,7 +658,7 @@
           <a:p>
             <a:fld id="{78C97017-6FC3-485B-9764-EAC9E56C1D49}" type="datetimeFigureOut">
               <a:rPr lang="en-US" smtClean="0"/>
-              <a:t>7/11/2017</a:t>
+              <a:t>11/12/2017</a:t>
             </a:fld>
             <a:endParaRPr lang="en-US"/>
           </a:p>
@@ -826,7 +826,7 @@
           <a:p>
             <a:fld id="{78C97017-6FC3-485B-9764-EAC9E56C1D49}" type="datetimeFigureOut">
               <a:rPr lang="en-US" smtClean="0"/>
-              <a:t>7/11/2017</a:t>
+              <a:t>11/12/2017</a:t>
             </a:fld>
             <a:endParaRPr lang="en-US"/>
           </a:p>
@@ -1004,7 +1004,7 @@
           <a:p>
             <a:fld id="{78C97017-6FC3-485B-9764-EAC9E56C1D49}" type="datetimeFigureOut">
               <a:rPr lang="en-US" smtClean="0"/>
-              <a:t>7/11/2017</a:t>
+              <a:t>11/12/2017</a:t>
             </a:fld>
             <a:endParaRPr lang="en-US"/>
           </a:p>
@@ -1172,7 +1172,7 @@
           <a:p>
             <a:fld id="{78C97017-6FC3-485B-9764-EAC9E56C1D49}" type="datetimeFigureOut">
               <a:rPr lang="en-US" smtClean="0"/>
-              <a:t>7/11/2017</a:t>
+              <a:t>11/12/2017</a:t>
             </a:fld>
             <a:endParaRPr lang="en-US"/>
           </a:p>
@@ -1417,7 +1417,7 @@
           <a:p>
             <a:fld id="{78C97017-6FC3-485B-9764-EAC9E56C1D49}" type="datetimeFigureOut">
               <a:rPr lang="en-US" smtClean="0"/>
-              <a:t>7/11/2017</a:t>
+              <a:t>11/12/2017</a:t>
             </a:fld>
             <a:endParaRPr lang="en-US"/>
           </a:p>
@@ -1702,7 +1702,7 @@
           <a:p>
             <a:fld id="{78C97017-6FC3-485B-9764-EAC9E56C1D49}" type="datetimeFigureOut">
               <a:rPr lang="en-US" smtClean="0"/>
-              <a:t>7/11/2017</a:t>
+              <a:t>11/12/2017</a:t>
             </a:fld>
             <a:endParaRPr lang="en-US"/>
           </a:p>
@@ -2121,7 +2121,7 @@
           <a:p>
             <a:fld id="{78C97017-6FC3-485B-9764-EAC9E56C1D49}" type="datetimeFigureOut">
               <a:rPr lang="en-US" smtClean="0"/>
-              <a:t>7/11/2017</a:t>
+              <a:t>11/12/2017</a:t>
             </a:fld>
             <a:endParaRPr lang="en-US"/>
           </a:p>
@@ -2238,7 +2238,7 @@
           <a:p>
             <a:fld id="{78C97017-6FC3-485B-9764-EAC9E56C1D49}" type="datetimeFigureOut">
               <a:rPr lang="en-US" smtClean="0"/>
-              <a:t>7/11/2017</a:t>
+              <a:t>11/12/2017</a:t>
             </a:fld>
             <a:endParaRPr lang="en-US"/>
           </a:p>
@@ -2333,7 +2333,7 @@
           <a:p>
             <a:fld id="{78C97017-6FC3-485B-9764-EAC9E56C1D49}" type="datetimeFigureOut">
               <a:rPr lang="en-US" smtClean="0"/>
-              <a:t>7/11/2017</a:t>
+              <a:t>11/12/2017</a:t>
             </a:fld>
             <a:endParaRPr lang="en-US"/>
           </a:p>
@@ -2608,7 +2608,7 @@
           <a:p>
             <a:fld id="{78C97017-6FC3-485B-9764-EAC9E56C1D49}" type="datetimeFigureOut">
               <a:rPr lang="en-US" smtClean="0"/>
-              <a:t>7/11/2017</a:t>
+              <a:t>11/12/2017</a:t>
             </a:fld>
             <a:endParaRPr lang="en-US"/>
           </a:p>
@@ -2860,7 +2860,7 @@
           <a:p>
             <a:fld id="{78C97017-6FC3-485B-9764-EAC9E56C1D49}" type="datetimeFigureOut">
               <a:rPr lang="en-US" smtClean="0"/>
-              <a:t>7/11/2017</a:t>
+              <a:t>11/12/2017</a:t>
             </a:fld>
             <a:endParaRPr lang="en-US"/>
           </a:p>
@@ -3071,7 +3071,7 @@
           <a:p>
             <a:fld id="{78C97017-6FC3-485B-9764-EAC9E56C1D49}" type="datetimeFigureOut">
               <a:rPr lang="en-US" smtClean="0"/>
-              <a:t>7/11/2017</a:t>
+              <a:t>11/12/2017</a:t>
             </a:fld>
             <a:endParaRPr lang="en-US"/>
           </a:p>

</xml_diff>

<commit_message>
updated sequence diagram for choose command
</commit_message>
<xml_diff>
--- a/docs/diagrams/LogicComponentSequenceDiagram.pptx
+++ b/docs/diagrams/LogicComponentSequenceDiagram.pptx
@@ -8633,7 +8633,7 @@
         </p:nvSpPr>
         <p:spPr>
           <a:xfrm>
-            <a:off x="10287000" y="4524597"/>
+            <a:off x="10300252" y="4521285"/>
             <a:ext cx="152400" cy="199803"/>
           </a:xfrm>
           <a:prstGeom prst="rect">
@@ -8730,7 +8730,7 @@
         </p:nvCxnSpPr>
         <p:spPr>
           <a:xfrm flipH="1">
-            <a:off x="8915400" y="4648200"/>
+            <a:off x="8915400" y="4532244"/>
             <a:ext cx="1405239" cy="0"/>
           </a:xfrm>
           <a:prstGeom prst="straightConnector1">
@@ -8738,12 +8738,11 @@
           </a:prstGeom>
           <a:ln w="19050">
             <a:solidFill>
-              <a:schemeClr val="accent4">
-                <a:lumMod val="60000"/>
-                <a:lumOff val="40000"/>
+              <a:schemeClr val="accent3">
+                <a:lumMod val="75000"/>
               </a:schemeClr>
             </a:solidFill>
-            <a:prstDash val="sysDash"/>
+            <a:prstDash val="solid"/>
             <a:headEnd type="arrow" w="med" len="med"/>
             <a:tailEnd type="none" w="med" len="med"/>
           </a:ln>
@@ -8809,8 +8808,8 @@
         </p:nvSpPr>
         <p:spPr>
           <a:xfrm>
-            <a:off x="6680157" y="4267200"/>
-            <a:ext cx="1424846" cy="215444"/>
+            <a:off x="6629400" y="4267200"/>
+            <a:ext cx="2244165" cy="430887"/>
           </a:xfrm>
           <a:prstGeom prst="rect">
             <a:avLst/>
@@ -8840,7 +8839,23 @@
                   <a:schemeClr val="tx2"/>
                 </a:solidFill>
               </a:rPr>
-              <a:t>post(new Event)</a:t>
+              <a:t>post(</a:t>
+            </a:r>
+            <a:r>
+              <a:rPr lang="en-US" dirty="0" err="1">
+                <a:solidFill>
+                  <a:schemeClr val="tx2"/>
+                </a:solidFill>
+              </a:rPr>
+              <a:t>JumpToBrowserListEvent</a:t>
+            </a:r>
+            <a:r>
+              <a:rPr lang="en-US" dirty="0">
+                <a:solidFill>
+                  <a:schemeClr val="tx2"/>
+                </a:solidFill>
+              </a:rPr>
+              <a:t>))</a:t>
             </a:r>
           </a:p>
         </p:txBody>
@@ -9029,8 +9044,8 @@
         </p:nvSpPr>
         <p:spPr>
           <a:xfrm>
-            <a:off x="6715446" y="4777286"/>
-            <a:ext cx="1590354" cy="461538"/>
+            <a:off x="6715445" y="5042452"/>
+            <a:ext cx="2136333" cy="211350"/>
           </a:xfrm>
           <a:prstGeom prst="rect">
             <a:avLst/>
@@ -9510,7 +9525,7 @@
         </p:nvCxnSpPr>
         <p:spPr>
           <a:xfrm>
-            <a:off x="6553200" y="5029200"/>
+            <a:off x="6553200" y="5105400"/>
             <a:ext cx="162246" cy="0"/>
           </a:xfrm>
           <a:prstGeom prst="straightConnector1">
@@ -9730,7 +9745,7 @@
         </p:nvSpPr>
         <p:spPr>
           <a:xfrm>
-            <a:off x="8839200" y="4418776"/>
+            <a:off x="8839200" y="4508228"/>
             <a:ext cx="228600" cy="305624"/>
           </a:xfrm>
           <a:prstGeom prst="rect">
@@ -9812,6 +9827,103 @@
           </a:effectRef>
           <a:fontRef idx="minor">
             <a:schemeClr val="dk1"/>
+          </a:fontRef>
+        </p:style>
+      </p:cxnSp>
+      <p:cxnSp>
+        <p:nvCxnSpPr>
+          <p:cNvPr id="54" name="Straight Arrow Connector 53">
+            <a:extLst>
+              <a:ext uri="{FF2B5EF4-FFF2-40B4-BE49-F238E27FC236}">
+                <a16:creationId xmlns:a16="http://schemas.microsoft.com/office/drawing/2014/main" id="{8A431F69-F479-4529-BCE4-C430D928B9C0}"/>
+              </a:ext>
+            </a:extLst>
+          </p:cNvPr>
+          <p:cNvCxnSpPr>
+            <a:cxnSpLocks/>
+          </p:cNvCxnSpPr>
+          <p:nvPr/>
+        </p:nvCxnSpPr>
+        <p:spPr>
+          <a:xfrm>
+            <a:off x="9028044" y="4714460"/>
+            <a:ext cx="1411356" cy="0"/>
+          </a:xfrm>
+          <a:prstGeom prst="straightConnector1">
+            <a:avLst/>
+          </a:prstGeom>
+          <a:ln w="19050">
+            <a:solidFill>
+              <a:schemeClr val="accent4">
+                <a:lumMod val="60000"/>
+                <a:lumOff val="40000"/>
+              </a:schemeClr>
+            </a:solidFill>
+            <a:prstDash val="dashDot"/>
+            <a:headEnd type="arrow" w="med" len="med"/>
+            <a:tailEnd type="none" w="med" len="med"/>
+          </a:ln>
+        </p:spPr>
+        <p:style>
+          <a:lnRef idx="1">
+            <a:schemeClr val="accent1"/>
+          </a:lnRef>
+          <a:fillRef idx="0">
+            <a:schemeClr val="accent1"/>
+          </a:fillRef>
+          <a:effectRef idx="0">
+            <a:schemeClr val="accent1"/>
+          </a:effectRef>
+          <a:fontRef idx="minor">
+            <a:schemeClr val="tx1"/>
+          </a:fontRef>
+        </p:style>
+      </p:cxnSp>
+      <p:cxnSp>
+        <p:nvCxnSpPr>
+          <p:cNvPr id="56" name="Straight Arrow Connector 55">
+            <a:extLst>
+              <a:ext uri="{FF2B5EF4-FFF2-40B4-BE49-F238E27FC236}">
+                <a16:creationId xmlns:a16="http://schemas.microsoft.com/office/drawing/2014/main" id="{B15DFA39-1915-4FDE-8640-1E52C6C85CBE}"/>
+              </a:ext>
+            </a:extLst>
+          </p:cNvPr>
+          <p:cNvCxnSpPr>
+            <a:cxnSpLocks/>
+          </p:cNvCxnSpPr>
+          <p:nvPr/>
+        </p:nvCxnSpPr>
+        <p:spPr>
+          <a:xfrm>
+            <a:off x="6543974" y="4787348"/>
+            <a:ext cx="2447626" cy="0"/>
+          </a:xfrm>
+          <a:prstGeom prst="straightConnector1">
+            <a:avLst/>
+          </a:prstGeom>
+          <a:ln w="19050">
+            <a:solidFill>
+              <a:schemeClr val="accent3">
+                <a:lumMod val="75000"/>
+              </a:schemeClr>
+            </a:solidFill>
+            <a:prstDash val="dash"/>
+            <a:headEnd type="arrow" w="med" len="med"/>
+            <a:tailEnd type="none" w="med" len="med"/>
+          </a:ln>
+        </p:spPr>
+        <p:style>
+          <a:lnRef idx="1">
+            <a:schemeClr val="accent1"/>
+          </a:lnRef>
+          <a:fillRef idx="0">
+            <a:schemeClr val="accent1"/>
+          </a:fillRef>
+          <a:effectRef idx="0">
+            <a:schemeClr val="accent1"/>
+          </a:effectRef>
+          <a:fontRef idx="minor">
+            <a:schemeClr val="tx1"/>
           </a:fontRef>
         </p:style>
       </p:cxnSp>

</xml_diff>